<commit_message>
Deploy website Wed Jan 24 13:59:06 PST 2024
</commit_message>
<xml_diff>
--- a/assets/slides/sp24/03-Loops.pptx
+++ b/assets/slides/sp24/03-Loops.pptx
@@ -2,18 +2,18 @@
 <file path=ppt/presentation.xml><?xml version="1.0" encoding="utf-8"?>
 <p:presentation xmlns:a="http://schemas.openxmlformats.org/drawingml/2006/main" xmlns:r="http://schemas.openxmlformats.org/officeDocument/2006/relationships" xmlns:p="http://schemas.openxmlformats.org/presentationml/2006/main" showSpecialPlsOnTitleSld="0" strictFirstAndLastChars="0" saveSubsetFonts="1" autoCompressPictures="0">
   <p:sldMasterIdLst>
-    <p:sldMasterId id="2147484028" r:id="rId1"/>
+    <p:sldMasterId id="2147484051" r:id="rId1"/>
   </p:sldMasterIdLst>
   <p:notesMasterIdLst>
-    <p:notesMasterId r:id="rId35"/>
+    <p:notesMasterId r:id="rId36"/>
   </p:notesMasterIdLst>
   <p:handoutMasterIdLst>
-    <p:handoutMasterId r:id="rId36"/>
+    <p:handoutMasterId r:id="rId37"/>
   </p:handoutMasterIdLst>
   <p:sldIdLst>
     <p:sldId id="396" r:id="rId2"/>
-    <p:sldId id="406" r:id="rId3"/>
-    <p:sldId id="405" r:id="rId4"/>
+    <p:sldId id="405" r:id="rId3"/>
+    <p:sldId id="413" r:id="rId4"/>
     <p:sldId id="412" r:id="rId5"/>
     <p:sldId id="391" r:id="rId6"/>
     <p:sldId id="390" r:id="rId7"/>
@@ -29,21 +29,22 @@
     <p:sldId id="399" r:id="rId17"/>
     <p:sldId id="407" r:id="rId18"/>
     <p:sldId id="408" r:id="rId19"/>
-    <p:sldId id="392" r:id="rId20"/>
-    <p:sldId id="400" r:id="rId21"/>
-    <p:sldId id="367" r:id="rId22"/>
-    <p:sldId id="402" r:id="rId23"/>
-    <p:sldId id="287" r:id="rId24"/>
-    <p:sldId id="293" r:id="rId25"/>
-    <p:sldId id="266" r:id="rId26"/>
-    <p:sldId id="289" r:id="rId27"/>
-    <p:sldId id="265" r:id="rId28"/>
-    <p:sldId id="288" r:id="rId29"/>
-    <p:sldId id="401" r:id="rId30"/>
-    <p:sldId id="403" r:id="rId31"/>
-    <p:sldId id="366" r:id="rId32"/>
-    <p:sldId id="404" r:id="rId33"/>
-    <p:sldId id="384" r:id="rId34"/>
+    <p:sldId id="414" r:id="rId20"/>
+    <p:sldId id="392" r:id="rId21"/>
+    <p:sldId id="400" r:id="rId22"/>
+    <p:sldId id="367" r:id="rId23"/>
+    <p:sldId id="402" r:id="rId24"/>
+    <p:sldId id="287" r:id="rId25"/>
+    <p:sldId id="293" r:id="rId26"/>
+    <p:sldId id="266" r:id="rId27"/>
+    <p:sldId id="289" r:id="rId28"/>
+    <p:sldId id="265" r:id="rId29"/>
+    <p:sldId id="288" r:id="rId30"/>
+    <p:sldId id="401" r:id="rId31"/>
+    <p:sldId id="403" r:id="rId32"/>
+    <p:sldId id="366" r:id="rId33"/>
+    <p:sldId id="404" r:id="rId34"/>
+    <p:sldId id="384" r:id="rId35"/>
   </p:sldIdLst>
   <p:sldSz cx="12192000" cy="6858000"/>
   <p:notesSz cx="6997700" cy="9194800"/>
@@ -741,14 +742,14 @@
           </a:ln>
           <a:extLst>
             <a:ext uri="{909E8E84-426E-40dd-AFC4-6F175D3DCCD1}">
-              <a14:hiddenFill xmlns:a14="http://schemas.microsoft.com/office/drawing/2010/main" xmlns="">
+              <a14:hiddenFill xmlns="" xmlns:a14="http://schemas.microsoft.com/office/drawing/2010/main">
                 <a:solidFill>
                   <a:srgbClr val="FFFFFF"/>
                 </a:solidFill>
               </a14:hiddenFill>
             </a:ext>
             <a:ext uri="{91240B29-F687-4f45-9708-019B960494DF}">
-              <a14:hiddenLine xmlns:a14="http://schemas.microsoft.com/office/drawing/2010/main" xmlns="" w="9525">
+              <a14:hiddenLine xmlns="" xmlns:a14="http://schemas.microsoft.com/office/drawing/2010/main" w="9525">
                 <a:solidFill>
                   <a:srgbClr val="000000"/>
                 </a:solidFill>
@@ -822,14 +823,14 @@
           </a:ln>
           <a:extLst>
             <a:ext uri="{909E8E84-426E-40dd-AFC4-6F175D3DCCD1}">
-              <a14:hiddenFill xmlns:a14="http://schemas.microsoft.com/office/drawing/2010/main" xmlns="">
+              <a14:hiddenFill xmlns="" xmlns:a14="http://schemas.microsoft.com/office/drawing/2010/main">
                 <a:solidFill>
                   <a:srgbClr val="FFFFFF"/>
                 </a:solidFill>
               </a14:hiddenFill>
             </a:ext>
             <a:ext uri="{FAA26D3D-D897-4be2-8F04-BA451C77F1D7}">
-              <ma14:placeholderFlag xmlns:ma14="http://schemas.microsoft.com/office/mac/drawingml/2011/main" xmlns="" val="1"/>
+              <ma14:placeholderFlag xmlns="" xmlns:ma14="http://schemas.microsoft.com/office/mac/drawingml/2011/main" val="1"/>
             </a:ext>
           </a:extLst>
         </p:spPr>
@@ -1086,14 +1087,14 @@
           <a:ln/>
           <a:extLst>
             <a:ext uri="{909E8E84-426E-40dd-AFC4-6F175D3DCCD1}">
-              <a14:hiddenFill xmlns="" xmlns:a14="http://schemas.microsoft.com/office/drawing/2010/main">
+              <a14:hiddenFill xmlns:a14="http://schemas.microsoft.com/office/drawing/2010/main" xmlns="">
                 <a:solidFill>
                   <a:srgbClr val="FFFFFF"/>
                 </a:solidFill>
               </a14:hiddenFill>
             </a:ext>
             <a:ext uri="{91240B29-F687-4f45-9708-019B960494DF}">
-              <a14:hiddenLine xmlns="" xmlns:a14="http://schemas.microsoft.com/office/drawing/2010/main" w="9525">
+              <a14:hiddenLine xmlns:a14="http://schemas.microsoft.com/office/drawing/2010/main" xmlns="" w="9525">
                 <a:solidFill>
                   <a:srgbClr val="000000"/>
                 </a:solidFill>
@@ -1261,14 +1262,14 @@
           <a:ln/>
           <a:extLst>
             <a:ext uri="{909E8E84-426E-40dd-AFC4-6F175D3DCCD1}">
-              <a14:hiddenFill xmlns="" xmlns:a14="http://schemas.microsoft.com/office/drawing/2010/main">
+              <a14:hiddenFill xmlns:a14="http://schemas.microsoft.com/office/drawing/2010/main" xmlns="">
                 <a:solidFill>
                   <a:srgbClr val="FFFFFF"/>
                 </a:solidFill>
               </a14:hiddenFill>
             </a:ext>
             <a:ext uri="{91240B29-F687-4f45-9708-019B960494DF}">
-              <a14:hiddenLine xmlns="" xmlns:a14="http://schemas.microsoft.com/office/drawing/2010/main" w="9525">
+              <a14:hiddenLine xmlns:a14="http://schemas.microsoft.com/office/drawing/2010/main" xmlns="" w="9525">
                 <a:solidFill>
                   <a:srgbClr val="000000"/>
                 </a:solidFill>
@@ -1278,7 +1279,7 @@
               </a14:hiddenLine>
             </a:ext>
             <a:ext uri="{FAA26D3D-D897-4be2-8F04-BA451C77F1D7}">
-              <ma14:placeholderFlag xmlns="" xmlns:ma14="http://schemas.microsoft.com/office/mac/drawingml/2011/main" val="1"/>
+              <ma14:placeholderFlag xmlns:ma14="http://schemas.microsoft.com/office/mac/drawingml/2011/main" xmlns="" val="1"/>
             </a:ext>
           </a:extLst>
         </p:spPr>
@@ -1326,6 +1327,259 @@
       </p:grpSpPr>
       <p:sp>
         <p:nvSpPr>
+          <p:cNvPr id="18433" name="Rectangle 5"/>
+          <p:cNvSpPr>
+            <a:spLocks noGrp="1" noChangeArrowheads="1"/>
+          </p:cNvSpPr>
+          <p:nvPr>
+            <p:ph type="sldNum" sz="quarter" idx="5"/>
+          </p:nvPr>
+        </p:nvSpPr>
+        <p:spPr>
+          <a:noFill/>
+          <a:ln/>
+          <a:extLst>
+            <a:ext uri="{909E8E84-426E-40dd-AFC4-6F175D3DCCD1}">
+              <a14:hiddenFill xmlns="" xmlns:a14="http://schemas.microsoft.com/office/drawing/2010/main">
+                <a:solidFill>
+                  <a:srgbClr val="FFFFFF"/>
+                </a:solidFill>
+              </a14:hiddenFill>
+            </a:ext>
+            <a:ext uri="{91240B29-F687-4f45-9708-019B960494DF}">
+              <a14:hiddenLine xmlns="" xmlns:a14="http://schemas.microsoft.com/office/drawing/2010/main" w="9525">
+                <a:solidFill>
+                  <a:srgbClr val="000000"/>
+                </a:solidFill>
+                <a:miter lim="800000"/>
+                <a:headEnd/>
+                <a:tailEnd/>
+              </a14:hiddenLine>
+            </a:ext>
+          </a:extLst>
+        </p:spPr>
+        <p:txBody>
+          <a:bodyPr/>
+          <a:lstStyle>
+            <a:lvl1pPr defTabSz="823913">
+              <a:defRPr sz="2400">
+                <a:solidFill>
+                  <a:schemeClr val="tx1"/>
+                </a:solidFill>
+                <a:latin typeface="Arial" charset="0"/>
+                <a:ea typeface="ＭＳ Ｐゴシック" charset="0"/>
+                <a:cs typeface="ＭＳ Ｐゴシック" charset="0"/>
+              </a:defRPr>
+            </a:lvl1pPr>
+            <a:lvl2pPr marL="742950" indent="-285750" defTabSz="823913">
+              <a:defRPr sz="2400">
+                <a:solidFill>
+                  <a:schemeClr val="tx1"/>
+                </a:solidFill>
+                <a:latin typeface="Arial" charset="0"/>
+                <a:ea typeface="ＭＳ Ｐゴシック" charset="0"/>
+              </a:defRPr>
+            </a:lvl2pPr>
+            <a:lvl3pPr marL="1143000" indent="-228600" defTabSz="823913">
+              <a:defRPr sz="2400">
+                <a:solidFill>
+                  <a:schemeClr val="tx1"/>
+                </a:solidFill>
+                <a:latin typeface="Arial" charset="0"/>
+                <a:ea typeface="ＭＳ Ｐゴシック" charset="0"/>
+              </a:defRPr>
+            </a:lvl3pPr>
+            <a:lvl4pPr marL="1600200" indent="-228600" defTabSz="823913">
+              <a:defRPr sz="2400">
+                <a:solidFill>
+                  <a:schemeClr val="tx1"/>
+                </a:solidFill>
+                <a:latin typeface="Arial" charset="0"/>
+                <a:ea typeface="ＭＳ Ｐゴシック" charset="0"/>
+              </a:defRPr>
+            </a:lvl4pPr>
+            <a:lvl5pPr marL="2057400" indent="-228600" defTabSz="823913">
+              <a:defRPr sz="2400">
+                <a:solidFill>
+                  <a:schemeClr val="tx1"/>
+                </a:solidFill>
+                <a:latin typeface="Arial" charset="0"/>
+                <a:ea typeface="ＭＳ Ｐゴシック" charset="0"/>
+              </a:defRPr>
+            </a:lvl5pPr>
+            <a:lvl6pPr marL="2514600" indent="-228600" defTabSz="823913" eaLnBrk="0" fontAlgn="base" hangingPunct="0">
+              <a:spcBef>
+                <a:spcPct val="0"/>
+              </a:spcBef>
+              <a:spcAft>
+                <a:spcPct val="0"/>
+              </a:spcAft>
+              <a:defRPr sz="2400">
+                <a:solidFill>
+                  <a:schemeClr val="tx1"/>
+                </a:solidFill>
+                <a:latin typeface="Arial" charset="0"/>
+                <a:ea typeface="ＭＳ Ｐゴシック" charset="0"/>
+              </a:defRPr>
+            </a:lvl6pPr>
+            <a:lvl7pPr marL="2971800" indent="-228600" defTabSz="823913" eaLnBrk="0" fontAlgn="base" hangingPunct="0">
+              <a:spcBef>
+                <a:spcPct val="0"/>
+              </a:spcBef>
+              <a:spcAft>
+                <a:spcPct val="0"/>
+              </a:spcAft>
+              <a:defRPr sz="2400">
+                <a:solidFill>
+                  <a:schemeClr val="tx1"/>
+                </a:solidFill>
+                <a:latin typeface="Arial" charset="0"/>
+                <a:ea typeface="ＭＳ Ｐゴシック" charset="0"/>
+              </a:defRPr>
+            </a:lvl7pPr>
+            <a:lvl8pPr marL="3429000" indent="-228600" defTabSz="823913" eaLnBrk="0" fontAlgn="base" hangingPunct="0">
+              <a:spcBef>
+                <a:spcPct val="0"/>
+              </a:spcBef>
+              <a:spcAft>
+                <a:spcPct val="0"/>
+              </a:spcAft>
+              <a:defRPr sz="2400">
+                <a:solidFill>
+                  <a:schemeClr val="tx1"/>
+                </a:solidFill>
+                <a:latin typeface="Arial" charset="0"/>
+                <a:ea typeface="ＭＳ Ｐゴシック" charset="0"/>
+              </a:defRPr>
+            </a:lvl8pPr>
+            <a:lvl9pPr marL="3886200" indent="-228600" defTabSz="823913" eaLnBrk="0" fontAlgn="base" hangingPunct="0">
+              <a:spcBef>
+                <a:spcPct val="0"/>
+              </a:spcBef>
+              <a:spcAft>
+                <a:spcPct val="0"/>
+              </a:spcAft>
+              <a:defRPr sz="2400">
+                <a:solidFill>
+                  <a:schemeClr val="tx1"/>
+                </a:solidFill>
+                <a:latin typeface="Arial" charset="0"/>
+                <a:ea typeface="ＭＳ Ｐゴシック" charset="0"/>
+              </a:defRPr>
+            </a:lvl9pPr>
+          </a:lstStyle>
+          <a:p>
+            <a:fld id="{2BDF7928-D1E0-C947-A399-519A47F33460}" type="slidenum">
+              <a:rPr lang="en-US" sz="900">
+                <a:latin typeface="Open Sans" panose="020B0606030504020204" pitchFamily="34" charset="0"/>
+              </a:rPr>
+              <a:pPr/>
+              <a:t>30</a:t>
+            </a:fld>
+            <a:endParaRPr lang="en-US" sz="900" dirty="0">
+              <a:latin typeface="Open Sans" panose="020B0606030504020204" pitchFamily="34" charset="0"/>
+            </a:endParaRPr>
+          </a:p>
+        </p:txBody>
+      </p:sp>
+      <p:sp>
+        <p:nvSpPr>
+          <p:cNvPr id="18434" name="Rectangle 2"/>
+          <p:cNvSpPr>
+            <a:spLocks noGrp="1" noRot="1" noChangeAspect="1" noChangeArrowheads="1" noTextEdit="1"/>
+          </p:cNvSpPr>
+          <p:nvPr>
+            <p:ph type="sldImg"/>
+          </p:nvPr>
+        </p:nvSpPr>
+        <p:spPr>
+          <a:xfrm>
+            <a:off x="777875" y="882650"/>
+            <a:ext cx="5441950" cy="3062288"/>
+          </a:xfrm>
+          <a:ln/>
+        </p:spPr>
+      </p:sp>
+      <p:sp>
+        <p:nvSpPr>
+          <p:cNvPr id="18435" name="Rectangle 3"/>
+          <p:cNvSpPr>
+            <a:spLocks noGrp="1" noChangeArrowheads="1"/>
+          </p:cNvSpPr>
+          <p:nvPr>
+            <p:ph type="body" idx="1"/>
+          </p:nvPr>
+        </p:nvSpPr>
+        <p:spPr>
+          <a:noFill/>
+          <a:ln/>
+          <a:extLst>
+            <a:ext uri="{909E8E84-426E-40dd-AFC4-6F175D3DCCD1}">
+              <a14:hiddenFill xmlns="" xmlns:a14="http://schemas.microsoft.com/office/drawing/2010/main">
+                <a:solidFill>
+                  <a:srgbClr val="FFFFFF"/>
+                </a:solidFill>
+              </a14:hiddenFill>
+            </a:ext>
+            <a:ext uri="{91240B29-F687-4f45-9708-019B960494DF}">
+              <a14:hiddenLine xmlns="" xmlns:a14="http://schemas.microsoft.com/office/drawing/2010/main" w="9525">
+                <a:solidFill>
+                  <a:srgbClr val="000000"/>
+                </a:solidFill>
+                <a:miter lim="800000"/>
+                <a:headEnd/>
+                <a:tailEnd/>
+              </a14:hiddenLine>
+            </a:ext>
+            <a:ext uri="{FAA26D3D-D897-4be2-8F04-BA451C77F1D7}">
+              <ma14:placeholderFlag xmlns="" xmlns:ma14="http://schemas.microsoft.com/office/mac/drawingml/2011/main" val="1"/>
+            </a:ext>
+          </a:extLst>
+        </p:spPr>
+        <p:txBody>
+          <a:bodyPr/>
+          <a:lstStyle/>
+          <a:p>
+            <a:pPr eaLnBrk="1" hangingPunct="1"/>
+            <a:endParaRPr lang="en-US" dirty="0">
+              <a:ea typeface="ＭＳ Ｐゴシック" charset="0"/>
+              <a:cs typeface="ＭＳ Ｐゴシック" charset="0"/>
+            </a:endParaRPr>
+          </a:p>
+        </p:txBody>
+      </p:sp>
+    </p:spTree>
+    <p:extLst>
+      <p:ext uri="{BB962C8B-B14F-4D97-AF65-F5344CB8AC3E}">
+        <p14:creationId xmlns:p14="http://schemas.microsoft.com/office/powerpoint/2010/main" val="1891070338"/>
+      </p:ext>
+    </p:extLst>
+  </p:cSld>
+  <p:clrMapOvr>
+    <a:masterClrMapping/>
+  </p:clrMapOvr>
+</p:notes>
+</file>
+
+<file path=ppt/notesSlides/notesSlide11.xml><?xml version="1.0" encoding="utf-8"?>
+<p:notes xmlns:a="http://schemas.openxmlformats.org/drawingml/2006/main" xmlns:r="http://schemas.openxmlformats.org/officeDocument/2006/relationships" xmlns:p="http://schemas.openxmlformats.org/presentationml/2006/main">
+  <p:cSld>
+    <p:spTree>
+      <p:nvGrpSpPr>
+        <p:cNvPr id="1" name=""/>
+        <p:cNvGrpSpPr/>
+        <p:nvPr/>
+      </p:nvGrpSpPr>
+      <p:grpSpPr>
+        <a:xfrm>
+          <a:off x="0" y="0"/>
+          <a:ext cx="0" cy="0"/>
+          <a:chOff x="0" y="0"/>
+          <a:chExt cx="0" cy="0"/>
+        </a:xfrm>
+      </p:grpSpPr>
+      <p:sp>
+        <p:nvSpPr>
           <p:cNvPr id="2" name="Slide Image Placeholder 1"/>
           <p:cNvSpPr>
             <a:spLocks noGrp="1" noRot="1" noChangeAspect="1"/>
@@ -1383,7 +1637,7 @@
               <a:pPr>
                 <a:defRPr/>
               </a:pPr>
-              <a:t>31</a:t>
+              <a:t>32</a:t>
             </a:fld>
             <a:endParaRPr lang="en-US"/>
           </a:p>
@@ -1568,7 +1822,7 @@
                 <a:latin typeface="Open Sans" panose="020B0606030504020204" pitchFamily="34" charset="0"/>
               </a:rPr>
               <a:pPr/>
-              <a:t>5</a:t>
+              <a:t>3</a:t>
             </a:fld>
             <a:endParaRPr lang="en-US" sz="900" dirty="0">
               <a:latin typeface="Open Sans" panose="020B0606030504020204" pitchFamily="34" charset="0"/>
@@ -1645,7 +1899,7 @@
     </p:spTree>
     <p:extLst>
       <p:ext uri="{BB962C8B-B14F-4D97-AF65-F5344CB8AC3E}">
-        <p14:creationId xmlns:p14="http://schemas.microsoft.com/office/powerpoint/2010/main" val="3708743070"/>
+        <p14:creationId xmlns:p14="http://schemas.microsoft.com/office/powerpoint/2010/main" val="76426466"/>
       </p:ext>
     </p:extLst>
   </p:cSld>
@@ -1674,9 +1928,166 @@
       </p:grpSpPr>
       <p:sp>
         <p:nvSpPr>
-          <p:cNvPr id="2" name="Slide Image Placeholder 1"/>
+          <p:cNvPr id="18433" name="Rectangle 5"/>
           <p:cNvSpPr>
-            <a:spLocks noGrp="1" noRot="1" noChangeAspect="1"/>
+            <a:spLocks noGrp="1" noChangeArrowheads="1"/>
+          </p:cNvSpPr>
+          <p:nvPr>
+            <p:ph type="sldNum" sz="quarter" idx="5"/>
+          </p:nvPr>
+        </p:nvSpPr>
+        <p:spPr>
+          <a:noFill/>
+          <a:ln/>
+          <a:extLst>
+            <a:ext uri="{909E8E84-426E-40dd-AFC4-6F175D3DCCD1}">
+              <a14:hiddenFill xmlns="" xmlns:a14="http://schemas.microsoft.com/office/drawing/2010/main">
+                <a:solidFill>
+                  <a:srgbClr val="FFFFFF"/>
+                </a:solidFill>
+              </a14:hiddenFill>
+            </a:ext>
+            <a:ext uri="{91240B29-F687-4f45-9708-019B960494DF}">
+              <a14:hiddenLine xmlns="" xmlns:a14="http://schemas.microsoft.com/office/drawing/2010/main" w="9525">
+                <a:solidFill>
+                  <a:srgbClr val="000000"/>
+                </a:solidFill>
+                <a:miter lim="800000"/>
+                <a:headEnd/>
+                <a:tailEnd/>
+              </a14:hiddenLine>
+            </a:ext>
+          </a:extLst>
+        </p:spPr>
+        <p:txBody>
+          <a:bodyPr/>
+          <a:lstStyle>
+            <a:lvl1pPr defTabSz="823913">
+              <a:defRPr sz="2400">
+                <a:solidFill>
+                  <a:schemeClr val="tx1"/>
+                </a:solidFill>
+                <a:latin typeface="Arial" charset="0"/>
+                <a:ea typeface="ＭＳ Ｐゴシック" charset="0"/>
+                <a:cs typeface="ＭＳ Ｐゴシック" charset="0"/>
+              </a:defRPr>
+            </a:lvl1pPr>
+            <a:lvl2pPr marL="742950" indent="-285750" defTabSz="823913">
+              <a:defRPr sz="2400">
+                <a:solidFill>
+                  <a:schemeClr val="tx1"/>
+                </a:solidFill>
+                <a:latin typeface="Arial" charset="0"/>
+                <a:ea typeface="ＭＳ Ｐゴシック" charset="0"/>
+              </a:defRPr>
+            </a:lvl2pPr>
+            <a:lvl3pPr marL="1143000" indent="-228600" defTabSz="823913">
+              <a:defRPr sz="2400">
+                <a:solidFill>
+                  <a:schemeClr val="tx1"/>
+                </a:solidFill>
+                <a:latin typeface="Arial" charset="0"/>
+                <a:ea typeface="ＭＳ Ｐゴシック" charset="0"/>
+              </a:defRPr>
+            </a:lvl3pPr>
+            <a:lvl4pPr marL="1600200" indent="-228600" defTabSz="823913">
+              <a:defRPr sz="2400">
+                <a:solidFill>
+                  <a:schemeClr val="tx1"/>
+                </a:solidFill>
+                <a:latin typeface="Arial" charset="0"/>
+                <a:ea typeface="ＭＳ Ｐゴシック" charset="0"/>
+              </a:defRPr>
+            </a:lvl4pPr>
+            <a:lvl5pPr marL="2057400" indent="-228600" defTabSz="823913">
+              <a:defRPr sz="2400">
+                <a:solidFill>
+                  <a:schemeClr val="tx1"/>
+                </a:solidFill>
+                <a:latin typeface="Arial" charset="0"/>
+                <a:ea typeface="ＭＳ Ｐゴシック" charset="0"/>
+              </a:defRPr>
+            </a:lvl5pPr>
+            <a:lvl6pPr marL="2514600" indent="-228600" defTabSz="823913" eaLnBrk="0" fontAlgn="base" hangingPunct="0">
+              <a:spcBef>
+                <a:spcPct val="0"/>
+              </a:spcBef>
+              <a:spcAft>
+                <a:spcPct val="0"/>
+              </a:spcAft>
+              <a:defRPr sz="2400">
+                <a:solidFill>
+                  <a:schemeClr val="tx1"/>
+                </a:solidFill>
+                <a:latin typeface="Arial" charset="0"/>
+                <a:ea typeface="ＭＳ Ｐゴシック" charset="0"/>
+              </a:defRPr>
+            </a:lvl6pPr>
+            <a:lvl7pPr marL="2971800" indent="-228600" defTabSz="823913" eaLnBrk="0" fontAlgn="base" hangingPunct="0">
+              <a:spcBef>
+                <a:spcPct val="0"/>
+              </a:spcBef>
+              <a:spcAft>
+                <a:spcPct val="0"/>
+              </a:spcAft>
+              <a:defRPr sz="2400">
+                <a:solidFill>
+                  <a:schemeClr val="tx1"/>
+                </a:solidFill>
+                <a:latin typeface="Arial" charset="0"/>
+                <a:ea typeface="ＭＳ Ｐゴシック" charset="0"/>
+              </a:defRPr>
+            </a:lvl7pPr>
+            <a:lvl8pPr marL="3429000" indent="-228600" defTabSz="823913" eaLnBrk="0" fontAlgn="base" hangingPunct="0">
+              <a:spcBef>
+                <a:spcPct val="0"/>
+              </a:spcBef>
+              <a:spcAft>
+                <a:spcPct val="0"/>
+              </a:spcAft>
+              <a:defRPr sz="2400">
+                <a:solidFill>
+                  <a:schemeClr val="tx1"/>
+                </a:solidFill>
+                <a:latin typeface="Arial" charset="0"/>
+                <a:ea typeface="ＭＳ Ｐゴシック" charset="0"/>
+              </a:defRPr>
+            </a:lvl8pPr>
+            <a:lvl9pPr marL="3886200" indent="-228600" defTabSz="823913" eaLnBrk="0" fontAlgn="base" hangingPunct="0">
+              <a:spcBef>
+                <a:spcPct val="0"/>
+              </a:spcBef>
+              <a:spcAft>
+                <a:spcPct val="0"/>
+              </a:spcAft>
+              <a:defRPr sz="2400">
+                <a:solidFill>
+                  <a:schemeClr val="tx1"/>
+                </a:solidFill>
+                <a:latin typeface="Arial" charset="0"/>
+                <a:ea typeface="ＭＳ Ｐゴシック" charset="0"/>
+              </a:defRPr>
+            </a:lvl9pPr>
+          </a:lstStyle>
+          <a:p>
+            <a:fld id="{2BDF7928-D1E0-C947-A399-519A47F33460}" type="slidenum">
+              <a:rPr lang="en-US" sz="900">
+                <a:latin typeface="Open Sans" panose="020B0606030504020204" pitchFamily="34" charset="0"/>
+              </a:rPr>
+              <a:pPr/>
+              <a:t>5</a:t>
+            </a:fld>
+            <a:endParaRPr lang="en-US" sz="900" dirty="0">
+              <a:latin typeface="Open Sans" panose="020B0606030504020204" pitchFamily="34" charset="0"/>
+            </a:endParaRPr>
+          </a:p>
+        </p:txBody>
+      </p:sp>
+      <p:sp>
+        <p:nvSpPr>
+          <p:cNvPr id="18434" name="Rectangle 2"/>
+          <p:cNvSpPr>
+            <a:spLocks noGrp="1" noRot="1" noChangeAspect="1" noChangeArrowheads="1" noTextEdit="1"/>
           </p:cNvSpPr>
           <p:nvPr>
             <p:ph type="sldImg"/>
@@ -1687,90 +2098,61 @@
             <a:off x="777875" y="882650"/>
             <a:ext cx="5441950" cy="3062288"/>
           </a:xfrm>
+          <a:ln/>
         </p:spPr>
       </p:sp>
       <p:sp>
         <p:nvSpPr>
-          <p:cNvPr id="3" name="Notes Placeholder 2"/>
+          <p:cNvPr id="18435" name="Rectangle 3"/>
           <p:cNvSpPr>
-            <a:spLocks noGrp="1"/>
+            <a:spLocks noGrp="1" noChangeArrowheads="1"/>
           </p:cNvSpPr>
           <p:nvPr>
             <p:ph type="body" idx="1"/>
           </p:nvPr>
         </p:nvSpPr>
-        <p:spPr/>
+        <p:spPr>
+          <a:noFill/>
+          <a:ln/>
+          <a:extLst>
+            <a:ext uri="{909E8E84-426E-40dd-AFC4-6F175D3DCCD1}">
+              <a14:hiddenFill xmlns="" xmlns:a14="http://schemas.microsoft.com/office/drawing/2010/main">
+                <a:solidFill>
+                  <a:srgbClr val="FFFFFF"/>
+                </a:solidFill>
+              </a14:hiddenFill>
+            </a:ext>
+            <a:ext uri="{91240B29-F687-4f45-9708-019B960494DF}">
+              <a14:hiddenLine xmlns="" xmlns:a14="http://schemas.microsoft.com/office/drawing/2010/main" w="9525">
+                <a:solidFill>
+                  <a:srgbClr val="000000"/>
+                </a:solidFill>
+                <a:miter lim="800000"/>
+                <a:headEnd/>
+                <a:tailEnd/>
+              </a14:hiddenLine>
+            </a:ext>
+            <a:ext uri="{FAA26D3D-D897-4be2-8F04-BA451C77F1D7}">
+              <ma14:placeholderFlag xmlns="" xmlns:ma14="http://schemas.microsoft.com/office/mac/drawingml/2011/main" val="1"/>
+            </a:ext>
+          </a:extLst>
+        </p:spPr>
         <p:txBody>
           <a:bodyPr/>
           <a:lstStyle/>
           <a:p>
-            <a:r>
-              <a:rPr lang="pl-PL" dirty="0"/>
-              <a:t>z = 1,2</a:t>
-            </a:r>
-          </a:p>
-          <a:p>
-            <a:r>
-              <a:rPr lang="pl-PL" dirty="0" err="1"/>
-              <a:t>x,y</a:t>
-            </a:r>
-            <a:r>
-              <a:rPr lang="pl-PL" dirty="0"/>
-              <a:t> = 3,4</a:t>
-            </a:r>
-          </a:p>
-          <a:p>
-            <a:r>
-              <a:rPr lang="pl-PL" dirty="0"/>
-              <a:t>   </a:t>
-            </a:r>
-            <a:r>
-              <a:rPr lang="pl-PL" dirty="0" err="1"/>
-              <a:t>a,b</a:t>
-            </a:r>
-            <a:r>
-              <a:rPr lang="pl-PL" dirty="0"/>
-              <a:t> = z</a:t>
-            </a:r>
-          </a:p>
-          <a:p>
-            <a:endParaRPr lang="en-US" dirty="0"/>
-          </a:p>
-        </p:txBody>
-      </p:sp>
-      <p:sp>
-        <p:nvSpPr>
-          <p:cNvPr id="4" name="Slide Number Placeholder 3"/>
-          <p:cNvSpPr>
-            <a:spLocks noGrp="1"/>
-          </p:cNvSpPr>
-          <p:nvPr>
-            <p:ph type="sldNum" sz="quarter" idx="10"/>
-          </p:nvPr>
-        </p:nvSpPr>
-        <p:spPr/>
-        <p:txBody>
-          <a:bodyPr/>
-          <a:lstStyle/>
-          <a:p>
-            <a:pPr>
-              <a:defRPr/>
-            </a:pPr>
-            <a:fld id="{7DAEA246-AA45-9741-BAF0-58C69264CAE3}" type="slidenum">
-              <a:rPr lang="en-US" smtClean="0"/>
-              <a:pPr>
-                <a:defRPr/>
-              </a:pPr>
-              <a:t>7</a:t>
-            </a:fld>
-            <a:endParaRPr lang="en-US"/>
+            <a:pPr eaLnBrk="1" hangingPunct="1"/>
+            <a:endParaRPr lang="en-US" dirty="0">
+              <a:ea typeface="ＭＳ Ｐゴシック" charset="0"/>
+              <a:cs typeface="ＭＳ Ｐゴシック" charset="0"/>
+            </a:endParaRPr>
           </a:p>
         </p:txBody>
       </p:sp>
     </p:spTree>
     <p:extLst>
       <p:ext uri="{BB962C8B-B14F-4D97-AF65-F5344CB8AC3E}">
-        <p14:creationId xmlns:p14="http://schemas.microsoft.com/office/powerpoint/2010/main" val="3787382913"/>
+        <p14:creationId xmlns:p14="http://schemas.microsoft.com/office/powerpoint/2010/main" val="3708743070"/>
       </p:ext>
     </p:extLst>
   </p:cSld>
@@ -1807,7 +2189,12 @@
             <p:ph type="sldImg"/>
           </p:nvPr>
         </p:nvSpPr>
-        <p:spPr/>
+        <p:spPr>
+          <a:xfrm>
+            <a:off x="777875" y="882650"/>
+            <a:ext cx="5441950" cy="3062288"/>
+          </a:xfrm>
+        </p:spPr>
       </p:sp>
       <p:sp>
         <p:nvSpPr>
@@ -1824,6 +2211,36 @@
           <a:bodyPr/>
           <a:lstStyle/>
           <a:p>
+            <a:r>
+              <a:rPr lang="pl-PL" dirty="0"/>
+              <a:t>z = 1,2</a:t>
+            </a:r>
+          </a:p>
+          <a:p>
+            <a:r>
+              <a:rPr lang="pl-PL" dirty="0" err="1"/>
+              <a:t>x,y</a:t>
+            </a:r>
+            <a:r>
+              <a:rPr lang="pl-PL" dirty="0"/>
+              <a:t> = 3,4</a:t>
+            </a:r>
+          </a:p>
+          <a:p>
+            <a:r>
+              <a:rPr lang="pl-PL" dirty="0"/>
+              <a:t>   </a:t>
+            </a:r>
+            <a:r>
+              <a:rPr lang="pl-PL" dirty="0" err="1"/>
+              <a:t>a,b</a:t>
+            </a:r>
+            <a:r>
+              <a:rPr lang="pl-PL" dirty="0"/>
+              <a:t> = z</a:t>
+            </a:r>
+          </a:p>
+          <a:p>
             <a:endParaRPr lang="en-US" dirty="0"/>
           </a:p>
         </p:txBody>
@@ -1835,7 +2252,7 @@
             <a:spLocks noGrp="1"/>
           </p:cNvSpPr>
           <p:nvPr>
-            <p:ph type="sldNum" sz="quarter" idx="5"/>
+            <p:ph type="sldNum" sz="quarter" idx="10"/>
           </p:nvPr>
         </p:nvSpPr>
         <p:spPr/>
@@ -1851,7 +2268,7 @@
               <a:pPr>
                 <a:defRPr/>
               </a:pPr>
-              <a:t>12</a:t>
+              <a:t>7</a:t>
             </a:fld>
             <a:endParaRPr lang="en-US"/>
           </a:p>
@@ -1860,7 +2277,7 @@
     </p:spTree>
     <p:extLst>
       <p:ext uri="{BB962C8B-B14F-4D97-AF65-F5344CB8AC3E}">
-        <p14:creationId xmlns:p14="http://schemas.microsoft.com/office/powerpoint/2010/main" val="2909599151"/>
+        <p14:creationId xmlns:p14="http://schemas.microsoft.com/office/powerpoint/2010/main" val="3787382913"/>
       </p:ext>
     </p:extLst>
   </p:cSld>
@@ -1889,231 +2306,68 @@
       </p:grpSpPr>
       <p:sp>
         <p:nvSpPr>
-          <p:cNvPr id="18433" name="Rectangle 5"/>
+          <p:cNvPr id="2" name="Slide Image Placeholder 1"/>
           <p:cNvSpPr>
-            <a:spLocks noGrp="1" noChangeArrowheads="1"/>
+            <a:spLocks noGrp="1" noRot="1" noChangeAspect="1"/>
+          </p:cNvSpPr>
+          <p:nvPr>
+            <p:ph type="sldImg"/>
+          </p:nvPr>
+        </p:nvSpPr>
+        <p:spPr/>
+      </p:sp>
+      <p:sp>
+        <p:nvSpPr>
+          <p:cNvPr id="3" name="Notes Placeholder 2"/>
+          <p:cNvSpPr>
+            <a:spLocks noGrp="1"/>
+          </p:cNvSpPr>
+          <p:nvPr>
+            <p:ph type="body" idx="1"/>
+          </p:nvPr>
+        </p:nvSpPr>
+        <p:spPr/>
+        <p:txBody>
+          <a:bodyPr/>
+          <a:lstStyle/>
+          <a:p>
+            <a:endParaRPr lang="en-US" dirty="0"/>
+          </a:p>
+        </p:txBody>
+      </p:sp>
+      <p:sp>
+        <p:nvSpPr>
+          <p:cNvPr id="4" name="Slide Number Placeholder 3"/>
+          <p:cNvSpPr>
+            <a:spLocks noGrp="1"/>
           </p:cNvSpPr>
           <p:nvPr>
             <p:ph type="sldNum" sz="quarter" idx="5"/>
           </p:nvPr>
         </p:nvSpPr>
-        <p:spPr>
-          <a:noFill/>
-          <a:ln/>
-          <a:extLst>
-            <a:ext uri="{909E8E84-426E-40dd-AFC4-6F175D3DCCD1}">
-              <a14:hiddenFill xmlns:a14="http://schemas.microsoft.com/office/drawing/2010/main" xmlns="">
-                <a:solidFill>
-                  <a:srgbClr val="FFFFFF"/>
-                </a:solidFill>
-              </a14:hiddenFill>
-            </a:ext>
-            <a:ext uri="{91240B29-F687-4f45-9708-019B960494DF}">
-              <a14:hiddenLine xmlns:a14="http://schemas.microsoft.com/office/drawing/2010/main" xmlns="" w="9525">
-                <a:solidFill>
-                  <a:srgbClr val="000000"/>
-                </a:solidFill>
-                <a:miter lim="800000"/>
-                <a:headEnd/>
-                <a:tailEnd/>
-              </a14:hiddenLine>
-            </a:ext>
-          </a:extLst>
-        </p:spPr>
-        <p:txBody>
-          <a:bodyPr/>
-          <a:lstStyle>
-            <a:lvl1pPr defTabSz="823913">
-              <a:defRPr sz="2400">
-                <a:solidFill>
-                  <a:schemeClr val="tx1"/>
-                </a:solidFill>
-                <a:latin typeface="Arial" charset="0"/>
-                <a:ea typeface="ＭＳ Ｐゴシック" charset="0"/>
-                <a:cs typeface="ＭＳ Ｐゴシック" charset="0"/>
-              </a:defRPr>
-            </a:lvl1pPr>
-            <a:lvl2pPr marL="742950" indent="-285750" defTabSz="823913">
-              <a:defRPr sz="2400">
-                <a:solidFill>
-                  <a:schemeClr val="tx1"/>
-                </a:solidFill>
-                <a:latin typeface="Arial" charset="0"/>
-                <a:ea typeface="ＭＳ Ｐゴシック" charset="0"/>
-              </a:defRPr>
-            </a:lvl2pPr>
-            <a:lvl3pPr marL="1143000" indent="-228600" defTabSz="823913">
-              <a:defRPr sz="2400">
-                <a:solidFill>
-                  <a:schemeClr val="tx1"/>
-                </a:solidFill>
-                <a:latin typeface="Arial" charset="0"/>
-                <a:ea typeface="ＭＳ Ｐゴシック" charset="0"/>
-              </a:defRPr>
-            </a:lvl3pPr>
-            <a:lvl4pPr marL="1600200" indent="-228600" defTabSz="823913">
-              <a:defRPr sz="2400">
-                <a:solidFill>
-                  <a:schemeClr val="tx1"/>
-                </a:solidFill>
-                <a:latin typeface="Arial" charset="0"/>
-                <a:ea typeface="ＭＳ Ｐゴシック" charset="0"/>
-              </a:defRPr>
-            </a:lvl4pPr>
-            <a:lvl5pPr marL="2057400" indent="-228600" defTabSz="823913">
-              <a:defRPr sz="2400">
-                <a:solidFill>
-                  <a:schemeClr val="tx1"/>
-                </a:solidFill>
-                <a:latin typeface="Arial" charset="0"/>
-                <a:ea typeface="ＭＳ Ｐゴシック" charset="0"/>
-              </a:defRPr>
-            </a:lvl5pPr>
-            <a:lvl6pPr marL="2514600" indent="-228600" defTabSz="823913" eaLnBrk="0" fontAlgn="base" hangingPunct="0">
-              <a:spcBef>
-                <a:spcPct val="0"/>
-              </a:spcBef>
-              <a:spcAft>
-                <a:spcPct val="0"/>
-              </a:spcAft>
-              <a:defRPr sz="2400">
-                <a:solidFill>
-                  <a:schemeClr val="tx1"/>
-                </a:solidFill>
-                <a:latin typeface="Arial" charset="0"/>
-                <a:ea typeface="ＭＳ Ｐゴシック" charset="0"/>
-              </a:defRPr>
-            </a:lvl6pPr>
-            <a:lvl7pPr marL="2971800" indent="-228600" defTabSz="823913" eaLnBrk="0" fontAlgn="base" hangingPunct="0">
-              <a:spcBef>
-                <a:spcPct val="0"/>
-              </a:spcBef>
-              <a:spcAft>
-                <a:spcPct val="0"/>
-              </a:spcAft>
-              <a:defRPr sz="2400">
-                <a:solidFill>
-                  <a:schemeClr val="tx1"/>
-                </a:solidFill>
-                <a:latin typeface="Arial" charset="0"/>
-                <a:ea typeface="ＭＳ Ｐゴシック" charset="0"/>
-              </a:defRPr>
-            </a:lvl7pPr>
-            <a:lvl8pPr marL="3429000" indent="-228600" defTabSz="823913" eaLnBrk="0" fontAlgn="base" hangingPunct="0">
-              <a:spcBef>
-                <a:spcPct val="0"/>
-              </a:spcBef>
-              <a:spcAft>
-                <a:spcPct val="0"/>
-              </a:spcAft>
-              <a:defRPr sz="2400">
-                <a:solidFill>
-                  <a:schemeClr val="tx1"/>
-                </a:solidFill>
-                <a:latin typeface="Arial" charset="0"/>
-                <a:ea typeface="ＭＳ Ｐゴシック" charset="0"/>
-              </a:defRPr>
-            </a:lvl8pPr>
-            <a:lvl9pPr marL="3886200" indent="-228600" defTabSz="823913" eaLnBrk="0" fontAlgn="base" hangingPunct="0">
-              <a:spcBef>
-                <a:spcPct val="0"/>
-              </a:spcBef>
-              <a:spcAft>
-                <a:spcPct val="0"/>
-              </a:spcAft>
-              <a:defRPr sz="2400">
-                <a:solidFill>
-                  <a:schemeClr val="tx1"/>
-                </a:solidFill>
-                <a:latin typeface="Arial" charset="0"/>
-                <a:ea typeface="ＭＳ Ｐゴシック" charset="0"/>
-              </a:defRPr>
-            </a:lvl9pPr>
-          </a:lstStyle>
-          <a:p>
-            <a:fld id="{2BDF7928-D1E0-C947-A399-519A47F33460}" type="slidenum">
-              <a:rPr lang="en-US" sz="900">
-                <a:latin typeface="Open Sans" panose="020B0606030504020204" pitchFamily="34" charset="0"/>
-              </a:rPr>
-              <a:pPr/>
-              <a:t>16</a:t>
-            </a:fld>
-            <a:endParaRPr lang="en-US" sz="900" dirty="0">
-              <a:latin typeface="Open Sans" panose="020B0606030504020204" pitchFamily="34" charset="0"/>
-            </a:endParaRPr>
-          </a:p>
-        </p:txBody>
-      </p:sp>
-      <p:sp>
-        <p:nvSpPr>
-          <p:cNvPr id="18434" name="Rectangle 2"/>
-          <p:cNvSpPr>
-            <a:spLocks noGrp="1" noRot="1" noChangeAspect="1" noChangeArrowheads="1" noTextEdit="1"/>
-          </p:cNvSpPr>
-          <p:nvPr>
-            <p:ph type="sldImg"/>
-          </p:nvPr>
-        </p:nvSpPr>
-        <p:spPr>
-          <a:xfrm>
-            <a:off x="777875" y="882650"/>
-            <a:ext cx="5441950" cy="3062288"/>
-          </a:xfrm>
-          <a:ln/>
-        </p:spPr>
-      </p:sp>
-      <p:sp>
-        <p:nvSpPr>
-          <p:cNvPr id="18435" name="Rectangle 3"/>
-          <p:cNvSpPr>
-            <a:spLocks noGrp="1" noChangeArrowheads="1"/>
-          </p:cNvSpPr>
-          <p:nvPr>
-            <p:ph type="body" idx="1"/>
-          </p:nvPr>
-        </p:nvSpPr>
-        <p:spPr>
-          <a:noFill/>
-          <a:ln/>
-          <a:extLst>
-            <a:ext uri="{909E8E84-426E-40dd-AFC4-6F175D3DCCD1}">
-              <a14:hiddenFill xmlns:a14="http://schemas.microsoft.com/office/drawing/2010/main" xmlns="">
-                <a:solidFill>
-                  <a:srgbClr val="FFFFFF"/>
-                </a:solidFill>
-              </a14:hiddenFill>
-            </a:ext>
-            <a:ext uri="{91240B29-F687-4f45-9708-019B960494DF}">
-              <a14:hiddenLine xmlns:a14="http://schemas.microsoft.com/office/drawing/2010/main" xmlns="" w="9525">
-                <a:solidFill>
-                  <a:srgbClr val="000000"/>
-                </a:solidFill>
-                <a:miter lim="800000"/>
-                <a:headEnd/>
-                <a:tailEnd/>
-              </a14:hiddenLine>
-            </a:ext>
-            <a:ext uri="{FAA26D3D-D897-4be2-8F04-BA451C77F1D7}">
-              <ma14:placeholderFlag xmlns:ma14="http://schemas.microsoft.com/office/mac/drawingml/2011/main" xmlns="" val="1"/>
-            </a:ext>
-          </a:extLst>
-        </p:spPr>
+        <p:spPr/>
         <p:txBody>
           <a:bodyPr/>
           <a:lstStyle/>
           <a:p>
-            <a:pPr eaLnBrk="1" hangingPunct="1"/>
-            <a:endParaRPr lang="en-US" dirty="0">
-              <a:ea typeface="ＭＳ Ｐゴシック" charset="0"/>
-              <a:cs typeface="ＭＳ Ｐゴシック" charset="0"/>
-            </a:endParaRPr>
+            <a:pPr>
+              <a:defRPr/>
+            </a:pPr>
+            <a:fld id="{7DAEA246-AA45-9741-BAF0-58C69264CAE3}" type="slidenum">
+              <a:rPr lang="en-US" smtClean="0"/>
+              <a:pPr>
+                <a:defRPr/>
+              </a:pPr>
+              <a:t>12</a:t>
+            </a:fld>
+            <a:endParaRPr lang="en-US"/>
           </a:p>
         </p:txBody>
       </p:sp>
     </p:spTree>
     <p:extLst>
       <p:ext uri="{BB962C8B-B14F-4D97-AF65-F5344CB8AC3E}">
-        <p14:creationId xmlns:p14="http://schemas.microsoft.com/office/powerpoint/2010/main" val="873623121"/>
+        <p14:creationId xmlns:p14="http://schemas.microsoft.com/office/powerpoint/2010/main" val="2909599151"/>
       </p:ext>
     </p:extLst>
   </p:cSld>
@@ -2155,14 +2409,14 @@
           <a:ln/>
           <a:extLst>
             <a:ext uri="{909E8E84-426E-40dd-AFC4-6F175D3DCCD1}">
-              <a14:hiddenFill xmlns:a14="http://schemas.microsoft.com/office/drawing/2010/main" xmlns="">
+              <a14:hiddenFill xmlns="" xmlns:a14="http://schemas.microsoft.com/office/drawing/2010/main">
                 <a:solidFill>
                   <a:srgbClr val="FFFFFF"/>
                 </a:solidFill>
               </a14:hiddenFill>
             </a:ext>
             <a:ext uri="{91240B29-F687-4f45-9708-019B960494DF}">
-              <a14:hiddenLine xmlns:a14="http://schemas.microsoft.com/office/drawing/2010/main" xmlns="" w="9525">
+              <a14:hiddenLine xmlns="" xmlns:a14="http://schemas.microsoft.com/office/drawing/2010/main" w="9525">
                 <a:solidFill>
                   <a:srgbClr val="000000"/>
                 </a:solidFill>
@@ -2289,7 +2543,7 @@
                 <a:latin typeface="Open Sans" panose="020B0606030504020204" pitchFamily="34" charset="0"/>
               </a:rPr>
               <a:pPr/>
-              <a:t>19</a:t>
+              <a:t>16</a:t>
             </a:fld>
             <a:endParaRPr lang="en-US" sz="900" dirty="0">
               <a:latin typeface="Open Sans" panose="020B0606030504020204" pitchFamily="34" charset="0"/>
@@ -2330,14 +2584,14 @@
           <a:ln/>
           <a:extLst>
             <a:ext uri="{909E8E84-426E-40dd-AFC4-6F175D3DCCD1}">
-              <a14:hiddenFill xmlns:a14="http://schemas.microsoft.com/office/drawing/2010/main" xmlns="">
+              <a14:hiddenFill xmlns="" xmlns:a14="http://schemas.microsoft.com/office/drawing/2010/main">
                 <a:solidFill>
                   <a:srgbClr val="FFFFFF"/>
                 </a:solidFill>
               </a14:hiddenFill>
             </a:ext>
             <a:ext uri="{91240B29-F687-4f45-9708-019B960494DF}">
-              <a14:hiddenLine xmlns:a14="http://schemas.microsoft.com/office/drawing/2010/main" xmlns="" w="9525">
+              <a14:hiddenLine xmlns="" xmlns:a14="http://schemas.microsoft.com/office/drawing/2010/main" w="9525">
                 <a:solidFill>
                   <a:srgbClr val="000000"/>
                 </a:solidFill>
@@ -2347,7 +2601,7 @@
               </a14:hiddenLine>
             </a:ext>
             <a:ext uri="{FAA26D3D-D897-4be2-8F04-BA451C77F1D7}">
-              <ma14:placeholderFlag xmlns:ma14="http://schemas.microsoft.com/office/mac/drawingml/2011/main" xmlns="" val="1"/>
+              <ma14:placeholderFlag xmlns="" xmlns:ma14="http://schemas.microsoft.com/office/mac/drawingml/2011/main" val="1"/>
             </a:ext>
           </a:extLst>
         </p:spPr>
@@ -2366,7 +2620,7 @@
     </p:spTree>
     <p:extLst>
       <p:ext uri="{BB962C8B-B14F-4D97-AF65-F5344CB8AC3E}">
-        <p14:creationId xmlns:p14="http://schemas.microsoft.com/office/powerpoint/2010/main" val="3416519290"/>
+        <p14:creationId xmlns:p14="http://schemas.microsoft.com/office/powerpoint/2010/main" val="873623121"/>
       </p:ext>
     </p:extLst>
   </p:cSld>
@@ -2395,93 +2649,223 @@
       </p:grpSpPr>
       <p:sp>
         <p:nvSpPr>
-          <p:cNvPr id="189" name="TextShape 1"/>
-          <p:cNvSpPr txBox="1"/>
-          <p:nvPr/>
+          <p:cNvPr id="18433" name="Rectangle 5"/>
+          <p:cNvSpPr>
+            <a:spLocks noGrp="1" noChangeArrowheads="1"/>
+          </p:cNvSpPr>
+          <p:nvPr>
+            <p:ph type="sldNum" sz="quarter" idx="5"/>
+          </p:nvPr>
+        </p:nvSpPr>
+        <p:spPr>
+          <a:noFill/>
+          <a:ln/>
+          <a:extLst>
+            <a:ext uri="{909E8E84-426E-40dd-AFC4-6F175D3DCCD1}">
+              <a14:hiddenFill xmlns="" xmlns:a14="http://schemas.microsoft.com/office/drawing/2010/main">
+                <a:solidFill>
+                  <a:srgbClr val="FFFFFF"/>
+                </a:solidFill>
+              </a14:hiddenFill>
+            </a:ext>
+            <a:ext uri="{91240B29-F687-4f45-9708-019B960494DF}">
+              <a14:hiddenLine xmlns="" xmlns:a14="http://schemas.microsoft.com/office/drawing/2010/main" w="9525">
+                <a:solidFill>
+                  <a:srgbClr val="000000"/>
+                </a:solidFill>
+                <a:miter lim="800000"/>
+                <a:headEnd/>
+                <a:tailEnd/>
+              </a14:hiddenLine>
+            </a:ext>
+          </a:extLst>
+        </p:spPr>
+        <p:txBody>
+          <a:bodyPr/>
+          <a:lstStyle>
+            <a:lvl1pPr defTabSz="823913">
+              <a:defRPr sz="2400">
+                <a:solidFill>
+                  <a:schemeClr val="tx1"/>
+                </a:solidFill>
+                <a:latin typeface="Arial" charset="0"/>
+                <a:ea typeface="ＭＳ Ｐゴシック" charset="0"/>
+                <a:cs typeface="ＭＳ Ｐゴシック" charset="0"/>
+              </a:defRPr>
+            </a:lvl1pPr>
+            <a:lvl2pPr marL="742950" indent="-285750" defTabSz="823913">
+              <a:defRPr sz="2400">
+                <a:solidFill>
+                  <a:schemeClr val="tx1"/>
+                </a:solidFill>
+                <a:latin typeface="Arial" charset="0"/>
+                <a:ea typeface="ＭＳ Ｐゴシック" charset="0"/>
+              </a:defRPr>
+            </a:lvl2pPr>
+            <a:lvl3pPr marL="1143000" indent="-228600" defTabSz="823913">
+              <a:defRPr sz="2400">
+                <a:solidFill>
+                  <a:schemeClr val="tx1"/>
+                </a:solidFill>
+                <a:latin typeface="Arial" charset="0"/>
+                <a:ea typeface="ＭＳ Ｐゴシック" charset="0"/>
+              </a:defRPr>
+            </a:lvl3pPr>
+            <a:lvl4pPr marL="1600200" indent="-228600" defTabSz="823913">
+              <a:defRPr sz="2400">
+                <a:solidFill>
+                  <a:schemeClr val="tx1"/>
+                </a:solidFill>
+                <a:latin typeface="Arial" charset="0"/>
+                <a:ea typeface="ＭＳ Ｐゴシック" charset="0"/>
+              </a:defRPr>
+            </a:lvl4pPr>
+            <a:lvl5pPr marL="2057400" indent="-228600" defTabSz="823913">
+              <a:defRPr sz="2400">
+                <a:solidFill>
+                  <a:schemeClr val="tx1"/>
+                </a:solidFill>
+                <a:latin typeface="Arial" charset="0"/>
+                <a:ea typeface="ＭＳ Ｐゴシック" charset="0"/>
+              </a:defRPr>
+            </a:lvl5pPr>
+            <a:lvl6pPr marL="2514600" indent="-228600" defTabSz="823913" eaLnBrk="0" fontAlgn="base" hangingPunct="0">
+              <a:spcBef>
+                <a:spcPct val="0"/>
+              </a:spcBef>
+              <a:spcAft>
+                <a:spcPct val="0"/>
+              </a:spcAft>
+              <a:defRPr sz="2400">
+                <a:solidFill>
+                  <a:schemeClr val="tx1"/>
+                </a:solidFill>
+                <a:latin typeface="Arial" charset="0"/>
+                <a:ea typeface="ＭＳ Ｐゴシック" charset="0"/>
+              </a:defRPr>
+            </a:lvl6pPr>
+            <a:lvl7pPr marL="2971800" indent="-228600" defTabSz="823913" eaLnBrk="0" fontAlgn="base" hangingPunct="0">
+              <a:spcBef>
+                <a:spcPct val="0"/>
+              </a:spcBef>
+              <a:spcAft>
+                <a:spcPct val="0"/>
+              </a:spcAft>
+              <a:defRPr sz="2400">
+                <a:solidFill>
+                  <a:schemeClr val="tx1"/>
+                </a:solidFill>
+                <a:latin typeface="Arial" charset="0"/>
+                <a:ea typeface="ＭＳ Ｐゴシック" charset="0"/>
+              </a:defRPr>
+            </a:lvl7pPr>
+            <a:lvl8pPr marL="3429000" indent="-228600" defTabSz="823913" eaLnBrk="0" fontAlgn="base" hangingPunct="0">
+              <a:spcBef>
+                <a:spcPct val="0"/>
+              </a:spcBef>
+              <a:spcAft>
+                <a:spcPct val="0"/>
+              </a:spcAft>
+              <a:defRPr sz="2400">
+                <a:solidFill>
+                  <a:schemeClr val="tx1"/>
+                </a:solidFill>
+                <a:latin typeface="Arial" charset="0"/>
+                <a:ea typeface="ＭＳ Ｐゴシック" charset="0"/>
+              </a:defRPr>
+            </a:lvl8pPr>
+            <a:lvl9pPr marL="3886200" indent="-228600" defTabSz="823913" eaLnBrk="0" fontAlgn="base" hangingPunct="0">
+              <a:spcBef>
+                <a:spcPct val="0"/>
+              </a:spcBef>
+              <a:spcAft>
+                <a:spcPct val="0"/>
+              </a:spcAft>
+              <a:defRPr sz="2400">
+                <a:solidFill>
+                  <a:schemeClr val="tx1"/>
+                </a:solidFill>
+                <a:latin typeface="Arial" charset="0"/>
+                <a:ea typeface="ＭＳ Ｐゴシック" charset="0"/>
+              </a:defRPr>
+            </a:lvl9pPr>
+          </a:lstStyle>
+          <a:p>
+            <a:fld id="{2BDF7928-D1E0-C947-A399-519A47F33460}" type="slidenum">
+              <a:rPr lang="en-US" sz="900">
+                <a:latin typeface="Open Sans" panose="020B0606030504020204" pitchFamily="34" charset="0"/>
+              </a:rPr>
+              <a:pPr/>
+              <a:t>20</a:t>
+            </a:fld>
+            <a:endParaRPr lang="en-US" sz="900" dirty="0">
+              <a:latin typeface="Open Sans" panose="020B0606030504020204" pitchFamily="34" charset="0"/>
+            </a:endParaRPr>
+          </a:p>
+        </p:txBody>
+      </p:sp>
+      <p:sp>
+        <p:nvSpPr>
+          <p:cNvPr id="18434" name="Rectangle 2"/>
+          <p:cNvSpPr>
+            <a:spLocks noGrp="1" noRot="1" noChangeAspect="1" noChangeArrowheads="1" noTextEdit="1"/>
+          </p:cNvSpPr>
+          <p:nvPr>
+            <p:ph type="sldImg"/>
+          </p:nvPr>
         </p:nvSpPr>
         <p:spPr>
           <a:xfrm>
-            <a:off x="3983040" y="8763120"/>
-            <a:ext cx="3038040" cy="409320"/>
+            <a:off x="777875" y="882650"/>
+            <a:ext cx="5441950" cy="3062288"/>
           </a:xfrm>
-          <a:prstGeom prst="rect">
-            <a:avLst/>
-          </a:prstGeom>
+          <a:ln/>
+        </p:spPr>
+      </p:sp>
+      <p:sp>
+        <p:nvSpPr>
+          <p:cNvPr id="18435" name="Rectangle 3"/>
+          <p:cNvSpPr>
+            <a:spLocks noGrp="1" noChangeArrowheads="1"/>
+          </p:cNvSpPr>
+          <p:nvPr>
+            <p:ph type="body" idx="1"/>
+          </p:nvPr>
+        </p:nvSpPr>
+        <p:spPr>
           <a:noFill/>
-          <a:ln>
-            <a:noFill/>
-          </a:ln>
+          <a:ln/>
+          <a:extLst>
+            <a:ext uri="{909E8E84-426E-40dd-AFC4-6F175D3DCCD1}">
+              <a14:hiddenFill xmlns="" xmlns:a14="http://schemas.microsoft.com/office/drawing/2010/main">
+                <a:solidFill>
+                  <a:srgbClr val="FFFFFF"/>
+                </a:solidFill>
+              </a14:hiddenFill>
+            </a:ext>
+            <a:ext uri="{91240B29-F687-4f45-9708-019B960494DF}">
+              <a14:hiddenLine xmlns="" xmlns:a14="http://schemas.microsoft.com/office/drawing/2010/main" w="9525">
+                <a:solidFill>
+                  <a:srgbClr val="000000"/>
+                </a:solidFill>
+                <a:miter lim="800000"/>
+                <a:headEnd/>
+                <a:tailEnd/>
+              </a14:hiddenLine>
+            </a:ext>
+            <a:ext uri="{FAA26D3D-D897-4be2-8F04-BA451C77F1D7}">
+              <ma14:placeholderFlag xmlns="" xmlns:ma14="http://schemas.microsoft.com/office/mac/drawingml/2011/main" val="1"/>
+            </a:ext>
+          </a:extLst>
         </p:spPr>
         <p:txBody>
-          <a:bodyPr lIns="17280" tIns="0" rIns="17280" bIns="0" anchor="b"/>
+          <a:bodyPr/>
           <a:lstStyle/>
           <a:p>
-            <a:pPr>
-              <a:lnSpc>
-                <a:spcPct val="100000"/>
-              </a:lnSpc>
-            </a:pPr>
-            <a:fld id="{0DFD83B9-9663-45A3-A75D-FB9D87875DE1}" type="slidenum">
-              <a:rPr lang="en-US" sz="900" strike="noStrike" spc="-1">
-                <a:solidFill>
-                  <a:srgbClr val="000000"/>
-                </a:solidFill>
-                <a:uFill>
-                  <a:solidFill>
-                    <a:srgbClr val="FFFFFF"/>
-                  </a:solidFill>
-                </a:uFill>
-                <a:latin typeface="Open Sans" panose="020B0606030504020204" pitchFamily="34" charset="0"/>
-                <a:ea typeface="ＭＳ Ｐゴシック"/>
-              </a:rPr>
-              <a:t>23</a:t>
-            </a:fld>
-            <a:endParaRPr lang="en-US" sz="2400" strike="noStrike" spc="-1" dirty="0">
-              <a:solidFill>
-                <a:srgbClr val="000000"/>
-              </a:solidFill>
-              <a:uFill>
-                <a:solidFill>
-                  <a:srgbClr val="FFFFFF"/>
-                </a:solidFill>
-              </a:uFill>
-              <a:latin typeface="Open Sans" panose="020B0606030504020204" pitchFamily="34" charset="0"/>
-            </a:endParaRPr>
-          </a:p>
-        </p:txBody>
-      </p:sp>
-      <p:sp>
-        <p:nvSpPr>
-          <p:cNvPr id="190" name="PlaceHolder 2"/>
-          <p:cNvSpPr>
-            <a:spLocks noGrp="1"/>
-          </p:cNvSpPr>
-          <p:nvPr>
-            <p:ph type="body"/>
-          </p:nvPr>
-        </p:nvSpPr>
-        <p:spPr>
-          <a:xfrm>
-            <a:off x="933480" y="4367160"/>
-            <a:ext cx="5130360" cy="4136760"/>
-          </a:xfrm>
-          <a:prstGeom prst="rect">
-            <a:avLst/>
-          </a:prstGeom>
-        </p:spPr>
-        <p:txBody>
-          <a:bodyPr lIns="92880" rIns="92880"/>
-          <a:lstStyle/>
-          <a:p>
-            <a:endParaRPr lang="en-US" sz="2000" strike="noStrike" spc="-1" dirty="0">
-              <a:solidFill>
-                <a:srgbClr val="000000"/>
-              </a:solidFill>
-              <a:uFill>
-                <a:solidFill>
-                  <a:srgbClr val="FFFFFF"/>
-                </a:solidFill>
-              </a:uFill>
+            <a:pPr eaLnBrk="1" hangingPunct="1"/>
+            <a:endParaRPr lang="en-US" dirty="0">
+              <a:ea typeface="ＭＳ Ｐゴシック" charset="0"/>
+              <a:cs typeface="ＭＳ Ｐゴシック" charset="0"/>
             </a:endParaRPr>
           </a:p>
         </p:txBody>
@@ -2489,7 +2873,7 @@
     </p:spTree>
     <p:extLst>
       <p:ext uri="{BB962C8B-B14F-4D97-AF65-F5344CB8AC3E}">
-        <p14:creationId xmlns:p14="http://schemas.microsoft.com/office/powerpoint/2010/main" val="3805064127"/>
+        <p14:creationId xmlns:p14="http://schemas.microsoft.com/office/powerpoint/2010/main" val="3416519290"/>
       </p:ext>
     </p:extLst>
   </p:cSld>
@@ -2518,67 +2902,34 @@
       </p:grpSpPr>
       <p:sp>
         <p:nvSpPr>
-          <p:cNvPr id="2" name="Slide Image Placeholder 1"/>
-          <p:cNvSpPr>
-            <a:spLocks noGrp="1" noRot="1" noChangeAspect="1"/>
-          </p:cNvSpPr>
-          <p:nvPr>
-            <p:ph type="sldImg"/>
-          </p:nvPr>
+          <p:cNvPr id="189" name="TextShape 1"/>
+          <p:cNvSpPr txBox="1"/>
+          <p:nvPr/>
         </p:nvSpPr>
         <p:spPr>
           <a:xfrm>
-            <a:off x="739775" y="1149350"/>
-            <a:ext cx="5518150" cy="3103563"/>
+            <a:off x="3983040" y="8763120"/>
+            <a:ext cx="3038040" cy="409320"/>
           </a:xfrm>
           <a:prstGeom prst="rect">
             <a:avLst/>
           </a:prstGeom>
           <a:noFill/>
-          <a:ln w="12700">
-            <a:solidFill>
-              <a:prstClr val="black"/>
-            </a:solidFill>
+          <a:ln>
+            <a:noFill/>
           </a:ln>
         </p:spPr>
-      </p:sp>
-      <p:sp>
-        <p:nvSpPr>
-          <p:cNvPr id="3" name="Notes Placeholder 2"/>
-          <p:cNvSpPr>
-            <a:spLocks noGrp="1"/>
-          </p:cNvSpPr>
-          <p:nvPr>
-            <p:ph type="body" idx="1"/>
-          </p:nvPr>
-        </p:nvSpPr>
-        <p:spPr/>
-        <p:txBody>
-          <a:bodyPr/>
+        <p:txBody>
+          <a:bodyPr lIns="17280" tIns="0" rIns="17280" bIns="0" anchor="b"/>
           <a:lstStyle/>
           <a:p>
-            <a:endParaRPr lang="en-US"/>
-          </a:p>
-        </p:txBody>
-      </p:sp>
-      <p:sp>
-        <p:nvSpPr>
-          <p:cNvPr id="4" name="Slide Number Placeholder 3"/>
-          <p:cNvSpPr>
-            <a:spLocks noGrp="1"/>
-          </p:cNvSpPr>
-          <p:nvPr>
-            <p:ph type="sldNum"/>
-          </p:nvPr>
-        </p:nvSpPr>
-        <p:spPr/>
-        <p:txBody>
-          <a:bodyPr/>
-          <a:lstStyle/>
-          <a:p>
-            <a:pPr algn="r"/>
-            <a:fld id="{1E6A0497-FA14-4881-862A-AC8598D64A92}" type="slidenum">
-              <a:rPr lang="en-US" sz="1400" strike="noStrike" spc="-1" smtClean="0">
+            <a:pPr>
+              <a:lnSpc>
+                <a:spcPct val="100000"/>
+              </a:lnSpc>
+            </a:pPr>
+            <a:fld id="{0DFD83B9-9663-45A3-A75D-FB9D87875DE1}" type="slidenum">
+              <a:rPr lang="en-US" sz="900" strike="noStrike" spc="-1">
                 <a:solidFill>
                   <a:srgbClr val="000000"/>
                 </a:solidFill>
@@ -2587,10 +2938,12 @@
                     <a:srgbClr val="FFFFFF"/>
                   </a:solidFill>
                 </a:uFill>
+                <a:latin typeface="Open Sans" panose="020B0606030504020204" pitchFamily="34" charset="0"/>
+                <a:ea typeface="ＭＳ Ｐゴシック"/>
               </a:rPr>
-              <a:t>28</a:t>
+              <a:t>24</a:t>
             </a:fld>
-            <a:endParaRPr lang="en-US" sz="1400" strike="noStrike" spc="-1" dirty="0">
+            <a:endParaRPr lang="en-US" sz="2400" strike="noStrike" spc="-1" dirty="0">
               <a:solidFill>
                 <a:srgbClr val="000000"/>
               </a:solidFill>
@@ -2599,6 +2952,43 @@
                   <a:srgbClr val="FFFFFF"/>
                 </a:solidFill>
               </a:uFill>
+              <a:latin typeface="Open Sans" panose="020B0606030504020204" pitchFamily="34" charset="0"/>
+            </a:endParaRPr>
+          </a:p>
+        </p:txBody>
+      </p:sp>
+      <p:sp>
+        <p:nvSpPr>
+          <p:cNvPr id="190" name="PlaceHolder 2"/>
+          <p:cNvSpPr>
+            <a:spLocks noGrp="1"/>
+          </p:cNvSpPr>
+          <p:nvPr>
+            <p:ph type="body"/>
+          </p:nvPr>
+        </p:nvSpPr>
+        <p:spPr>
+          <a:xfrm>
+            <a:off x="933480" y="4367160"/>
+            <a:ext cx="5130360" cy="4136760"/>
+          </a:xfrm>
+          <a:prstGeom prst="rect">
+            <a:avLst/>
+          </a:prstGeom>
+        </p:spPr>
+        <p:txBody>
+          <a:bodyPr lIns="92880" rIns="92880"/>
+          <a:lstStyle/>
+          <a:p>
+            <a:endParaRPr lang="en-US" sz="2000" strike="noStrike" spc="-1" dirty="0">
+              <a:solidFill>
+                <a:srgbClr val="000000"/>
+              </a:solidFill>
+              <a:uFill>
+                <a:solidFill>
+                  <a:srgbClr val="FFFFFF"/>
+                </a:solidFill>
+              </a:uFill>
             </a:endParaRPr>
           </a:p>
         </p:txBody>
@@ -2606,7 +2996,7 @@
     </p:spTree>
     <p:extLst>
       <p:ext uri="{BB962C8B-B14F-4D97-AF65-F5344CB8AC3E}">
-        <p14:creationId xmlns:p14="http://schemas.microsoft.com/office/powerpoint/2010/main" val="780083127"/>
+        <p14:creationId xmlns:p14="http://schemas.microsoft.com/office/powerpoint/2010/main" val="3805064127"/>
       </p:ext>
     </p:extLst>
   </p:cSld>
@@ -2635,166 +3025,9 @@
       </p:grpSpPr>
       <p:sp>
         <p:nvSpPr>
-          <p:cNvPr id="18433" name="Rectangle 5"/>
+          <p:cNvPr id="2" name="Slide Image Placeholder 1"/>
           <p:cNvSpPr>
-            <a:spLocks noGrp="1" noChangeArrowheads="1"/>
-          </p:cNvSpPr>
-          <p:nvPr>
-            <p:ph type="sldNum" sz="quarter" idx="5"/>
-          </p:nvPr>
-        </p:nvSpPr>
-        <p:spPr>
-          <a:noFill/>
-          <a:ln/>
-          <a:extLst>
-            <a:ext uri="{909E8E84-426E-40dd-AFC4-6F175D3DCCD1}">
-              <a14:hiddenFill xmlns:a14="http://schemas.microsoft.com/office/drawing/2010/main" xmlns="">
-                <a:solidFill>
-                  <a:srgbClr val="FFFFFF"/>
-                </a:solidFill>
-              </a14:hiddenFill>
-            </a:ext>
-            <a:ext uri="{91240B29-F687-4f45-9708-019B960494DF}">
-              <a14:hiddenLine xmlns:a14="http://schemas.microsoft.com/office/drawing/2010/main" xmlns="" w="9525">
-                <a:solidFill>
-                  <a:srgbClr val="000000"/>
-                </a:solidFill>
-                <a:miter lim="800000"/>
-                <a:headEnd/>
-                <a:tailEnd/>
-              </a14:hiddenLine>
-            </a:ext>
-          </a:extLst>
-        </p:spPr>
-        <p:txBody>
-          <a:bodyPr/>
-          <a:lstStyle>
-            <a:lvl1pPr defTabSz="823913">
-              <a:defRPr sz="2400">
-                <a:solidFill>
-                  <a:schemeClr val="tx1"/>
-                </a:solidFill>
-                <a:latin typeface="Arial" charset="0"/>
-                <a:ea typeface="ＭＳ Ｐゴシック" charset="0"/>
-                <a:cs typeface="ＭＳ Ｐゴシック" charset="0"/>
-              </a:defRPr>
-            </a:lvl1pPr>
-            <a:lvl2pPr marL="742950" indent="-285750" defTabSz="823913">
-              <a:defRPr sz="2400">
-                <a:solidFill>
-                  <a:schemeClr val="tx1"/>
-                </a:solidFill>
-                <a:latin typeface="Arial" charset="0"/>
-                <a:ea typeface="ＭＳ Ｐゴシック" charset="0"/>
-              </a:defRPr>
-            </a:lvl2pPr>
-            <a:lvl3pPr marL="1143000" indent="-228600" defTabSz="823913">
-              <a:defRPr sz="2400">
-                <a:solidFill>
-                  <a:schemeClr val="tx1"/>
-                </a:solidFill>
-                <a:latin typeface="Arial" charset="0"/>
-                <a:ea typeface="ＭＳ Ｐゴシック" charset="0"/>
-              </a:defRPr>
-            </a:lvl3pPr>
-            <a:lvl4pPr marL="1600200" indent="-228600" defTabSz="823913">
-              <a:defRPr sz="2400">
-                <a:solidFill>
-                  <a:schemeClr val="tx1"/>
-                </a:solidFill>
-                <a:latin typeface="Arial" charset="0"/>
-                <a:ea typeface="ＭＳ Ｐゴシック" charset="0"/>
-              </a:defRPr>
-            </a:lvl4pPr>
-            <a:lvl5pPr marL="2057400" indent="-228600" defTabSz="823913">
-              <a:defRPr sz="2400">
-                <a:solidFill>
-                  <a:schemeClr val="tx1"/>
-                </a:solidFill>
-                <a:latin typeface="Arial" charset="0"/>
-                <a:ea typeface="ＭＳ Ｐゴシック" charset="0"/>
-              </a:defRPr>
-            </a:lvl5pPr>
-            <a:lvl6pPr marL="2514600" indent="-228600" defTabSz="823913" eaLnBrk="0" fontAlgn="base" hangingPunct="0">
-              <a:spcBef>
-                <a:spcPct val="0"/>
-              </a:spcBef>
-              <a:spcAft>
-                <a:spcPct val="0"/>
-              </a:spcAft>
-              <a:defRPr sz="2400">
-                <a:solidFill>
-                  <a:schemeClr val="tx1"/>
-                </a:solidFill>
-                <a:latin typeface="Arial" charset="0"/>
-                <a:ea typeface="ＭＳ Ｐゴシック" charset="0"/>
-              </a:defRPr>
-            </a:lvl6pPr>
-            <a:lvl7pPr marL="2971800" indent="-228600" defTabSz="823913" eaLnBrk="0" fontAlgn="base" hangingPunct="0">
-              <a:spcBef>
-                <a:spcPct val="0"/>
-              </a:spcBef>
-              <a:spcAft>
-                <a:spcPct val="0"/>
-              </a:spcAft>
-              <a:defRPr sz="2400">
-                <a:solidFill>
-                  <a:schemeClr val="tx1"/>
-                </a:solidFill>
-                <a:latin typeface="Arial" charset="0"/>
-                <a:ea typeface="ＭＳ Ｐゴシック" charset="0"/>
-              </a:defRPr>
-            </a:lvl7pPr>
-            <a:lvl8pPr marL="3429000" indent="-228600" defTabSz="823913" eaLnBrk="0" fontAlgn="base" hangingPunct="0">
-              <a:spcBef>
-                <a:spcPct val="0"/>
-              </a:spcBef>
-              <a:spcAft>
-                <a:spcPct val="0"/>
-              </a:spcAft>
-              <a:defRPr sz="2400">
-                <a:solidFill>
-                  <a:schemeClr val="tx1"/>
-                </a:solidFill>
-                <a:latin typeface="Arial" charset="0"/>
-                <a:ea typeface="ＭＳ Ｐゴシック" charset="0"/>
-              </a:defRPr>
-            </a:lvl8pPr>
-            <a:lvl9pPr marL="3886200" indent="-228600" defTabSz="823913" eaLnBrk="0" fontAlgn="base" hangingPunct="0">
-              <a:spcBef>
-                <a:spcPct val="0"/>
-              </a:spcBef>
-              <a:spcAft>
-                <a:spcPct val="0"/>
-              </a:spcAft>
-              <a:defRPr sz="2400">
-                <a:solidFill>
-                  <a:schemeClr val="tx1"/>
-                </a:solidFill>
-                <a:latin typeface="Arial" charset="0"/>
-                <a:ea typeface="ＭＳ Ｐゴシック" charset="0"/>
-              </a:defRPr>
-            </a:lvl9pPr>
-          </a:lstStyle>
-          <a:p>
-            <a:fld id="{2BDF7928-D1E0-C947-A399-519A47F33460}" type="slidenum">
-              <a:rPr lang="en-US" sz="900">
-                <a:latin typeface="Open Sans" panose="020B0606030504020204" pitchFamily="34" charset="0"/>
-              </a:rPr>
-              <a:pPr/>
-              <a:t>29</a:t>
-            </a:fld>
-            <a:endParaRPr lang="en-US" sz="900" dirty="0">
-              <a:latin typeface="Open Sans" panose="020B0606030504020204" pitchFamily="34" charset="0"/>
-            </a:endParaRPr>
-          </a:p>
-        </p:txBody>
-      </p:sp>
-      <p:sp>
-        <p:nvSpPr>
-          <p:cNvPr id="18434" name="Rectangle 2"/>
-          <p:cNvSpPr>
-            <a:spLocks noGrp="1" noRot="1" noChangeAspect="1" noChangeArrowheads="1" noTextEdit="1"/>
+            <a:spLocks noGrp="1" noRot="1" noChangeAspect="1"/>
           </p:cNvSpPr>
           <p:nvPr>
             <p:ph type="sldImg"/>
@@ -2802,56 +3035,77 @@
         </p:nvSpPr>
         <p:spPr>
           <a:xfrm>
-            <a:off x="777875" y="882650"/>
-            <a:ext cx="5441950" cy="3062288"/>
+            <a:off x="739775" y="1149350"/>
+            <a:ext cx="5518150" cy="3103563"/>
           </a:xfrm>
-          <a:ln/>
+          <a:prstGeom prst="rect">
+            <a:avLst/>
+          </a:prstGeom>
+          <a:noFill/>
+          <a:ln w="12700">
+            <a:solidFill>
+              <a:prstClr val="black"/>
+            </a:solidFill>
+          </a:ln>
         </p:spPr>
       </p:sp>
       <p:sp>
         <p:nvSpPr>
-          <p:cNvPr id="18435" name="Rectangle 3"/>
+          <p:cNvPr id="3" name="Notes Placeholder 2"/>
           <p:cNvSpPr>
-            <a:spLocks noGrp="1" noChangeArrowheads="1"/>
+            <a:spLocks noGrp="1"/>
           </p:cNvSpPr>
           <p:nvPr>
             <p:ph type="body" idx="1"/>
           </p:nvPr>
         </p:nvSpPr>
-        <p:spPr>
-          <a:noFill/>
-          <a:ln/>
-          <a:extLst>
-            <a:ext uri="{909E8E84-426E-40dd-AFC4-6F175D3DCCD1}">
-              <a14:hiddenFill xmlns:a14="http://schemas.microsoft.com/office/drawing/2010/main" xmlns="">
-                <a:solidFill>
-                  <a:srgbClr val="FFFFFF"/>
-                </a:solidFill>
-              </a14:hiddenFill>
-            </a:ext>
-            <a:ext uri="{91240B29-F687-4f45-9708-019B960494DF}">
-              <a14:hiddenLine xmlns:a14="http://schemas.microsoft.com/office/drawing/2010/main" xmlns="" w="9525">
-                <a:solidFill>
-                  <a:srgbClr val="000000"/>
-                </a:solidFill>
-                <a:miter lim="800000"/>
-                <a:headEnd/>
-                <a:tailEnd/>
-              </a14:hiddenLine>
-            </a:ext>
-            <a:ext uri="{FAA26D3D-D897-4be2-8F04-BA451C77F1D7}">
-              <ma14:placeholderFlag xmlns:ma14="http://schemas.microsoft.com/office/mac/drawingml/2011/main" xmlns="" val="1"/>
-            </a:ext>
-          </a:extLst>
-        </p:spPr>
+        <p:spPr/>
         <p:txBody>
           <a:bodyPr/>
           <a:lstStyle/>
           <a:p>
-            <a:pPr eaLnBrk="1" hangingPunct="1"/>
-            <a:endParaRPr lang="en-US" dirty="0">
-              <a:ea typeface="ＭＳ Ｐゴシック" charset="0"/>
-              <a:cs typeface="ＭＳ Ｐゴシック" charset="0"/>
+            <a:endParaRPr lang="en-US"/>
+          </a:p>
+        </p:txBody>
+      </p:sp>
+      <p:sp>
+        <p:nvSpPr>
+          <p:cNvPr id="4" name="Slide Number Placeholder 3"/>
+          <p:cNvSpPr>
+            <a:spLocks noGrp="1"/>
+          </p:cNvSpPr>
+          <p:nvPr>
+            <p:ph type="sldNum"/>
+          </p:nvPr>
+        </p:nvSpPr>
+        <p:spPr/>
+        <p:txBody>
+          <a:bodyPr/>
+          <a:lstStyle/>
+          <a:p>
+            <a:pPr algn="r"/>
+            <a:fld id="{1E6A0497-FA14-4881-862A-AC8598D64A92}" type="slidenum">
+              <a:rPr lang="en-US" sz="1400" strike="noStrike" spc="-1" smtClean="0">
+                <a:solidFill>
+                  <a:srgbClr val="000000"/>
+                </a:solidFill>
+                <a:uFill>
+                  <a:solidFill>
+                    <a:srgbClr val="FFFFFF"/>
+                  </a:solidFill>
+                </a:uFill>
+              </a:rPr>
+              <a:t>29</a:t>
+            </a:fld>
+            <a:endParaRPr lang="en-US" sz="1400" strike="noStrike" spc="-1" dirty="0">
+              <a:solidFill>
+                <a:srgbClr val="000000"/>
+              </a:solidFill>
+              <a:uFill>
+                <a:solidFill>
+                  <a:srgbClr val="FFFFFF"/>
+                </a:solidFill>
+              </a:uFill>
             </a:endParaRPr>
           </a:p>
         </p:txBody>
@@ -2859,7 +3113,7 @@
     </p:spTree>
     <p:extLst>
       <p:ext uri="{BB962C8B-B14F-4D97-AF65-F5344CB8AC3E}">
-        <p14:creationId xmlns:p14="http://schemas.microsoft.com/office/powerpoint/2010/main" val="1891070338"/>
+        <p14:creationId xmlns:p14="http://schemas.microsoft.com/office/powerpoint/2010/main" val="780083127"/>
       </p:ext>
     </p:extLst>
   </p:cSld>
@@ -3048,7 +3302,7 @@
     </p:spTree>
     <p:extLst>
       <p:ext uri="{BB962C8B-B14F-4D97-AF65-F5344CB8AC3E}">
-        <p14:creationId xmlns:p14="http://schemas.microsoft.com/office/powerpoint/2010/main" val="767220529"/>
+        <p14:creationId xmlns:p14="http://schemas.microsoft.com/office/powerpoint/2010/main" val="2003632481"/>
       </p:ext>
     </p:extLst>
   </p:cSld>
@@ -3143,7 +3397,7 @@
     </p:spTree>
     <p:extLst>
       <p:ext uri="{BB962C8B-B14F-4D97-AF65-F5344CB8AC3E}">
-        <p14:creationId xmlns:p14="http://schemas.microsoft.com/office/powerpoint/2010/main" val="1890841801"/>
+        <p14:creationId xmlns:p14="http://schemas.microsoft.com/office/powerpoint/2010/main" val="1741515092"/>
       </p:ext>
     </p:extLst>
   </p:cSld>
@@ -3212,7 +3466,7 @@
     </p:spTree>
     <p:extLst>
       <p:ext uri="{BB962C8B-B14F-4D97-AF65-F5344CB8AC3E}">
-        <p14:creationId xmlns:p14="http://schemas.microsoft.com/office/powerpoint/2010/main" val="4014119087"/>
+        <p14:creationId xmlns:p14="http://schemas.microsoft.com/office/powerpoint/2010/main" val="1509201299"/>
       </p:ext>
     </p:extLst>
   </p:cSld>
@@ -3507,7 +3761,7 @@
     </p:spTree>
     <p:extLst>
       <p:ext uri="{BB962C8B-B14F-4D97-AF65-F5344CB8AC3E}">
-        <p14:creationId xmlns:p14="http://schemas.microsoft.com/office/powerpoint/2010/main" val="1931141265"/>
+        <p14:creationId xmlns:p14="http://schemas.microsoft.com/office/powerpoint/2010/main" val="4182039558"/>
       </p:ext>
     </p:extLst>
   </p:cSld>
@@ -3732,7 +3986,7 @@
     </p:spTree>
     <p:extLst>
       <p:ext uri="{BB962C8B-B14F-4D97-AF65-F5344CB8AC3E}">
-        <p14:creationId xmlns:p14="http://schemas.microsoft.com/office/powerpoint/2010/main" val="2403851461"/>
+        <p14:creationId xmlns:p14="http://schemas.microsoft.com/office/powerpoint/2010/main" val="286417706"/>
       </p:ext>
     </p:extLst>
   </p:cSld>
@@ -4131,7 +4385,7 @@
     </p:spTree>
     <p:extLst>
       <p:ext uri="{BB962C8B-B14F-4D97-AF65-F5344CB8AC3E}">
-        <p14:creationId xmlns:p14="http://schemas.microsoft.com/office/powerpoint/2010/main" val="3268816658"/>
+        <p14:creationId xmlns:p14="http://schemas.microsoft.com/office/powerpoint/2010/main" val="721607591"/>
       </p:ext>
     </p:extLst>
   </p:cSld>
@@ -4282,7 +4536,7 @@
     </p:spTree>
     <p:extLst>
       <p:ext uri="{BB962C8B-B14F-4D97-AF65-F5344CB8AC3E}">
-        <p14:creationId xmlns:p14="http://schemas.microsoft.com/office/powerpoint/2010/main" val="3921324979"/>
+        <p14:creationId xmlns:p14="http://schemas.microsoft.com/office/powerpoint/2010/main" val="1461158712"/>
       </p:ext>
     </p:extLst>
   </p:cSld>
@@ -4464,7 +4718,7 @@
     </p:spTree>
     <p:extLst>
       <p:ext uri="{BB962C8B-B14F-4D97-AF65-F5344CB8AC3E}">
-        <p14:creationId xmlns:p14="http://schemas.microsoft.com/office/powerpoint/2010/main" val="714681157"/>
+        <p14:creationId xmlns:p14="http://schemas.microsoft.com/office/powerpoint/2010/main" val="2830125424"/>
       </p:ext>
     </p:extLst>
   </p:cSld>
@@ -4726,7 +4980,7 @@
     </p:spTree>
     <p:extLst>
       <p:ext uri="{BB962C8B-B14F-4D97-AF65-F5344CB8AC3E}">
-        <p14:creationId xmlns:p14="http://schemas.microsoft.com/office/powerpoint/2010/main" val="2421990200"/>
+        <p14:creationId xmlns:p14="http://schemas.microsoft.com/office/powerpoint/2010/main" val="2851878177"/>
       </p:ext>
     </p:extLst>
   </p:cSld>
@@ -5121,7 +5375,7 @@
     </p:spTree>
     <p:extLst>
       <p:ext uri="{BB962C8B-B14F-4D97-AF65-F5344CB8AC3E}">
-        <p14:creationId xmlns:p14="http://schemas.microsoft.com/office/powerpoint/2010/main" val="1010009795"/>
+        <p14:creationId xmlns:p14="http://schemas.microsoft.com/office/powerpoint/2010/main" val="1199913624"/>
       </p:ext>
     </p:extLst>
   </p:cSld>
@@ -5516,7 +5770,7 @@
     </p:spTree>
     <p:extLst>
       <p:ext uri="{BB962C8B-B14F-4D97-AF65-F5344CB8AC3E}">
-        <p14:creationId xmlns:p14="http://schemas.microsoft.com/office/powerpoint/2010/main" val="831131470"/>
+        <p14:creationId xmlns:p14="http://schemas.microsoft.com/office/powerpoint/2010/main" val="4160091364"/>
       </p:ext>
     </p:extLst>
   </p:cSld>
@@ -5578,7 +5832,7 @@
           </a:ln>
           <a:extLst>
             <a:ext uri="{909E8E84-426E-40dd-AFC4-6F175D3DCCD1}">
-              <a14:hiddenFill xmlns:a14="http://schemas.microsoft.com/office/drawing/2010/main" xmlns="">
+              <a14:hiddenFill xmlns="" xmlns:a14="http://schemas.microsoft.com/office/drawing/2010/main">
                 <a:noFill/>
               </a14:hiddenFill>
             </a:ext>
@@ -5698,14 +5952,14 @@
           </a:ln>
           <a:extLst>
             <a:ext uri="{909E8E84-426E-40dd-AFC4-6F175D3DCCD1}">
-              <a14:hiddenFill xmlns:a14="http://schemas.microsoft.com/office/drawing/2010/main" xmlns="">
+              <a14:hiddenFill xmlns="" xmlns:a14="http://schemas.microsoft.com/office/drawing/2010/main">
                 <a:solidFill>
                   <a:srgbClr val="FFFFFF"/>
                 </a:solidFill>
               </a14:hiddenFill>
             </a:ext>
             <a:ext uri="{91240B29-F687-4f45-9708-019B960494DF}">
-              <a14:hiddenLine xmlns:a14="http://schemas.microsoft.com/office/drawing/2010/main" xmlns="" w="9525">
+              <a14:hiddenLine xmlns="" xmlns:a14="http://schemas.microsoft.com/office/drawing/2010/main" w="9525">
                 <a:solidFill>
                   <a:srgbClr val="000000"/>
                 </a:solidFill>
@@ -5715,7 +5969,7 @@
               </a14:hiddenLine>
             </a:ext>
             <a:ext uri="{FAA26D3D-D897-4be2-8F04-BA451C77F1D7}">
-              <ma14:placeholderFlag xmlns:ma14="http://schemas.microsoft.com/office/mac/drawingml/2011/main" xmlns="" val="1"/>
+              <ma14:placeholderFlag xmlns="" xmlns:ma14="http://schemas.microsoft.com/office/mac/drawingml/2011/main" val="1"/>
             </a:ext>
           </a:extLst>
         </p:spPr>
@@ -6219,7 +6473,7 @@
     </p:spTree>
     <p:extLst>
       <p:ext uri="{BB962C8B-B14F-4D97-AF65-F5344CB8AC3E}">
-        <p14:creationId xmlns:p14="http://schemas.microsoft.com/office/powerpoint/2010/main" val="3899560494"/>
+        <p14:creationId xmlns:p14="http://schemas.microsoft.com/office/powerpoint/2010/main" val="2885929388"/>
       </p:ext>
     </p:extLst>
   </p:cSld>
@@ -6273,7 +6527,7 @@
           </a:ln>
           <a:extLst>
             <a:ext uri="{909E8E84-426E-40dd-AFC4-6F175D3DCCD1}">
-              <a14:hiddenFill xmlns:a14="http://schemas.microsoft.com/office/drawing/2010/main" xmlns="">
+              <a14:hiddenFill xmlns="" xmlns:a14="http://schemas.microsoft.com/office/drawing/2010/main">
                 <a:noFill/>
               </a14:hiddenFill>
             </a:ext>
@@ -6318,14 +6572,14 @@
           </a:ln>
           <a:extLst>
             <a:ext uri="{909E8E84-426E-40dd-AFC4-6F175D3DCCD1}">
-              <a14:hiddenFill xmlns:a14="http://schemas.microsoft.com/office/drawing/2010/main" xmlns="">
+              <a14:hiddenFill xmlns="" xmlns:a14="http://schemas.microsoft.com/office/drawing/2010/main">
                 <a:solidFill>
                   <a:srgbClr val="FFFFFF"/>
                 </a:solidFill>
               </a14:hiddenFill>
             </a:ext>
             <a:ext uri="{91240B29-F687-4f45-9708-019B960494DF}">
-              <a14:hiddenLine xmlns:a14="http://schemas.microsoft.com/office/drawing/2010/main" xmlns="" w="9525">
+              <a14:hiddenLine xmlns="" xmlns:a14="http://schemas.microsoft.com/office/drawing/2010/main" w="9525">
                 <a:solidFill>
                   <a:srgbClr val="000000"/>
                 </a:solidFill>
@@ -6431,14 +6685,14 @@
           </a:ln>
           <a:extLst>
             <a:ext uri="{909E8E84-426E-40dd-AFC4-6F175D3DCCD1}">
-              <a14:hiddenFill xmlns:a14="http://schemas.microsoft.com/office/drawing/2010/main" xmlns="">
+              <a14:hiddenFill xmlns="" xmlns:a14="http://schemas.microsoft.com/office/drawing/2010/main">
                 <a:solidFill>
                   <a:srgbClr val="FFFFFF"/>
                 </a:solidFill>
               </a14:hiddenFill>
             </a:ext>
             <a:ext uri="{91240B29-F687-4f45-9708-019B960494DF}">
-              <a14:hiddenLine xmlns:a14="http://schemas.microsoft.com/office/drawing/2010/main" xmlns="" w="9525">
+              <a14:hiddenLine xmlns="" xmlns:a14="http://schemas.microsoft.com/office/drawing/2010/main" w="9525">
                 <a:solidFill>
                   <a:srgbClr val="000000"/>
                 </a:solidFill>
@@ -6448,7 +6702,7 @@
               </a14:hiddenLine>
             </a:ext>
             <a:ext uri="{FAA26D3D-D897-4be2-8F04-BA451C77F1D7}">
-              <ma14:placeholderFlag xmlns:ma14="http://schemas.microsoft.com/office/mac/drawingml/2011/main" xmlns="" val="1"/>
+              <ma14:placeholderFlag xmlns="" xmlns:ma14="http://schemas.microsoft.com/office/mac/drawingml/2011/main" val="1"/>
             </a:ext>
           </a:extLst>
         </p:spPr>
@@ -6796,14 +7050,14 @@
           </a:ln>
           <a:extLst>
             <a:ext uri="{909E8E84-426E-40dd-AFC4-6F175D3DCCD1}">
-              <a14:hiddenFill xmlns:a14="http://schemas.microsoft.com/office/drawing/2010/main" xmlns="">
+              <a14:hiddenFill xmlns="" xmlns:a14="http://schemas.microsoft.com/office/drawing/2010/main">
                 <a:solidFill>
                   <a:srgbClr val="FFFFFF"/>
                 </a:solidFill>
               </a14:hiddenFill>
             </a:ext>
             <a:ext uri="{91240B29-F687-4f45-9708-019B960494DF}">
-              <a14:hiddenLine xmlns:a14="http://schemas.microsoft.com/office/drawing/2010/main" xmlns="" w="9525">
+              <a14:hiddenLine xmlns="" xmlns:a14="http://schemas.microsoft.com/office/drawing/2010/main" w="9525">
                 <a:solidFill>
                   <a:srgbClr val="000000"/>
                 </a:solidFill>
@@ -6813,7 +7067,7 @@
               </a14:hiddenLine>
             </a:ext>
             <a:ext uri="{FAA26D3D-D897-4be2-8F04-BA451C77F1D7}">
-              <ma14:placeholderFlag xmlns:ma14="http://schemas.microsoft.com/office/mac/drawingml/2011/main" xmlns="" val="1"/>
+              <ma14:placeholderFlag xmlns="" xmlns:ma14="http://schemas.microsoft.com/office/mac/drawingml/2011/main" val="1"/>
             </a:ext>
           </a:extLst>
         </p:spPr>
@@ -7076,7 +7330,7 @@
     </p:spTree>
     <p:extLst>
       <p:ext uri="{BB962C8B-B14F-4D97-AF65-F5344CB8AC3E}">
-        <p14:creationId xmlns:p14="http://schemas.microsoft.com/office/powerpoint/2010/main" val="1546662057"/>
+        <p14:creationId xmlns:p14="http://schemas.microsoft.com/office/powerpoint/2010/main" val="1765266815"/>
       </p:ext>
     </p:extLst>
   </p:cSld>
@@ -7441,7 +7695,7 @@
     </p:spTree>
     <p:extLst>
       <p:ext uri="{BB962C8B-B14F-4D97-AF65-F5344CB8AC3E}">
-        <p14:creationId xmlns:p14="http://schemas.microsoft.com/office/powerpoint/2010/main" val="1485621555"/>
+        <p14:creationId xmlns:p14="http://schemas.microsoft.com/office/powerpoint/2010/main" val="1788956623"/>
       </p:ext>
     </p:extLst>
   </p:cSld>
@@ -7806,7 +8060,7 @@
     </p:spTree>
     <p:extLst>
       <p:ext uri="{BB962C8B-B14F-4D97-AF65-F5344CB8AC3E}">
-        <p14:creationId xmlns:p14="http://schemas.microsoft.com/office/powerpoint/2010/main" val="3491544204"/>
+        <p14:creationId xmlns:p14="http://schemas.microsoft.com/office/powerpoint/2010/main" val="442539476"/>
       </p:ext>
     </p:extLst>
   </p:cSld>
@@ -7868,7 +8122,7 @@
           </a:ln>
           <a:extLst>
             <a:ext uri="{909E8E84-426E-40dd-AFC4-6F175D3DCCD1}">
-              <a14:hiddenFill xmlns="" xmlns:a14="http://schemas.microsoft.com/office/drawing/2010/main">
+              <a14:hiddenFill xmlns:a14="http://schemas.microsoft.com/office/drawing/2010/main" xmlns="">
                 <a:noFill/>
               </a14:hiddenFill>
             </a:ext>
@@ -7988,14 +8242,14 @@
           </a:ln>
           <a:extLst>
             <a:ext uri="{909E8E84-426E-40dd-AFC4-6F175D3DCCD1}">
-              <a14:hiddenFill xmlns="" xmlns:a14="http://schemas.microsoft.com/office/drawing/2010/main">
+              <a14:hiddenFill xmlns:a14="http://schemas.microsoft.com/office/drawing/2010/main" xmlns="">
                 <a:solidFill>
                   <a:srgbClr val="FFFFFF"/>
                 </a:solidFill>
               </a14:hiddenFill>
             </a:ext>
             <a:ext uri="{91240B29-F687-4f45-9708-019B960494DF}">
-              <a14:hiddenLine xmlns="" xmlns:a14="http://schemas.microsoft.com/office/drawing/2010/main" w="9525">
+              <a14:hiddenLine xmlns:a14="http://schemas.microsoft.com/office/drawing/2010/main" xmlns="" w="9525">
                 <a:solidFill>
                   <a:srgbClr val="000000"/>
                 </a:solidFill>
@@ -8005,7 +8259,7 @@
               </a14:hiddenLine>
             </a:ext>
             <a:ext uri="{FAA26D3D-D897-4be2-8F04-BA451C77F1D7}">
-              <ma14:placeholderFlag xmlns="" xmlns:ma14="http://schemas.microsoft.com/office/mac/drawingml/2011/main" val="1"/>
+              <ma14:placeholderFlag xmlns:ma14="http://schemas.microsoft.com/office/mac/drawingml/2011/main" xmlns="" val="1"/>
             </a:ext>
           </a:extLst>
         </p:spPr>
@@ -8524,7 +8778,7 @@
     </p:spTree>
     <p:extLst>
       <p:ext uri="{BB962C8B-B14F-4D97-AF65-F5344CB8AC3E}">
-        <p14:creationId xmlns:p14="http://schemas.microsoft.com/office/powerpoint/2010/main" val="962289582"/>
+        <p14:creationId xmlns:p14="http://schemas.microsoft.com/office/powerpoint/2010/main" val="4034710169"/>
       </p:ext>
     </p:extLst>
   </p:cSld>
@@ -8710,7 +8964,7 @@
     </p:spTree>
     <p:extLst>
       <p:ext uri="{BB962C8B-B14F-4D97-AF65-F5344CB8AC3E}">
-        <p14:creationId xmlns:p14="http://schemas.microsoft.com/office/powerpoint/2010/main" val="1109568958"/>
+        <p14:creationId xmlns:p14="http://schemas.microsoft.com/office/powerpoint/2010/main" val="860749736"/>
       </p:ext>
     </p:extLst>
   </p:cSld>
@@ -8881,7 +9135,7 @@
     </p:spTree>
     <p:extLst>
       <p:ext uri="{BB962C8B-B14F-4D97-AF65-F5344CB8AC3E}">
-        <p14:creationId xmlns:p14="http://schemas.microsoft.com/office/powerpoint/2010/main" val="3158276735"/>
+        <p14:creationId xmlns:p14="http://schemas.microsoft.com/office/powerpoint/2010/main" val="1201644439"/>
       </p:ext>
     </p:extLst>
   </p:cSld>
@@ -9150,7 +9404,7 @@
     </p:spTree>
     <p:extLst>
       <p:ext uri="{BB962C8B-B14F-4D97-AF65-F5344CB8AC3E}">
-        <p14:creationId xmlns:p14="http://schemas.microsoft.com/office/powerpoint/2010/main" val="4176622368"/>
+        <p14:creationId xmlns:p14="http://schemas.microsoft.com/office/powerpoint/2010/main" val="2214249844"/>
       </p:ext>
     </p:extLst>
   </p:cSld>
@@ -9419,7 +9673,7 @@
     </p:spTree>
     <p:extLst>
       <p:ext uri="{BB962C8B-B14F-4D97-AF65-F5344CB8AC3E}">
-        <p14:creationId xmlns:p14="http://schemas.microsoft.com/office/powerpoint/2010/main" val="1266044602"/>
+        <p14:creationId xmlns:p14="http://schemas.microsoft.com/office/powerpoint/2010/main" val="2711213146"/>
       </p:ext>
     </p:extLst>
   </p:cSld>
@@ -9677,7 +9931,7 @@
     </p:spTree>
     <p:extLst>
       <p:ext uri="{BB962C8B-B14F-4D97-AF65-F5344CB8AC3E}">
-        <p14:creationId xmlns:p14="http://schemas.microsoft.com/office/powerpoint/2010/main" val="278477666"/>
+        <p14:creationId xmlns:p14="http://schemas.microsoft.com/office/powerpoint/2010/main" val="3715201103"/>
       </p:ext>
     </p:extLst>
   </p:cSld>
@@ -10076,7 +10330,7 @@
     </p:spTree>
     <p:extLst>
       <p:ext uri="{BB962C8B-B14F-4D97-AF65-F5344CB8AC3E}">
-        <p14:creationId xmlns:p14="http://schemas.microsoft.com/office/powerpoint/2010/main" val="2771484857"/>
+        <p14:creationId xmlns:p14="http://schemas.microsoft.com/office/powerpoint/2010/main" val="1848081113"/>
       </p:ext>
     </p:extLst>
   </p:cSld>
@@ -10137,14 +10391,14 @@
           </a:ln>
           <a:extLst>
             <a:ext uri="{909E8E84-426E-40dd-AFC4-6F175D3DCCD1}">
-              <a14:hiddenFill xmlns="" xmlns:a14="http://schemas.microsoft.com/office/drawing/2010/main">
+              <a14:hiddenFill xmlns:a14="http://schemas.microsoft.com/office/drawing/2010/main" xmlns="">
                 <a:solidFill>
                   <a:srgbClr val="FFFFFF"/>
                 </a:solidFill>
               </a14:hiddenFill>
             </a:ext>
             <a:ext uri="{91240B29-F687-4f45-9708-019B960494DF}">
-              <a14:hiddenLine xmlns="" xmlns:a14="http://schemas.microsoft.com/office/drawing/2010/main" w="9525">
+              <a14:hiddenLine xmlns:a14="http://schemas.microsoft.com/office/drawing/2010/main" xmlns="" w="9525">
                 <a:solidFill>
                   <a:srgbClr val="000000"/>
                 </a:solidFill>
@@ -10154,7 +10408,7 @@
               </a14:hiddenLine>
             </a:ext>
             <a:ext uri="{FAA26D3D-D897-4be2-8F04-BA451C77F1D7}">
-              <ma14:placeholderFlag xmlns="" xmlns:ma14="http://schemas.microsoft.com/office/mac/drawingml/2011/main" val="1"/>
+              <ma14:placeholderFlag xmlns:ma14="http://schemas.microsoft.com/office/mac/drawingml/2011/main" xmlns="" val="1"/>
             </a:ext>
           </a:extLst>
         </p:spPr>
@@ -10199,14 +10453,14 @@
           </a:ln>
           <a:extLst>
             <a:ext uri="{909E8E84-426E-40dd-AFC4-6F175D3DCCD1}">
-              <a14:hiddenFill xmlns="" xmlns:a14="http://schemas.microsoft.com/office/drawing/2010/main">
+              <a14:hiddenFill xmlns:a14="http://schemas.microsoft.com/office/drawing/2010/main" xmlns="">
                 <a:solidFill>
                   <a:srgbClr val="FFFFFF"/>
                 </a:solidFill>
               </a14:hiddenFill>
             </a:ext>
             <a:ext uri="{91240B29-F687-4f45-9708-019B960494DF}">
-              <a14:hiddenLine xmlns="" xmlns:a14="http://schemas.microsoft.com/office/drawing/2010/main" w="9525">
+              <a14:hiddenLine xmlns:a14="http://schemas.microsoft.com/office/drawing/2010/main" xmlns="" w="9525">
                 <a:solidFill>
                   <a:srgbClr val="000000"/>
                 </a:solidFill>
@@ -10216,7 +10470,7 @@
               </a14:hiddenLine>
             </a:ext>
             <a:ext uri="{FAA26D3D-D897-4be2-8F04-BA451C77F1D7}">
-              <ma14:placeholderFlag xmlns="" xmlns:ma14="http://schemas.microsoft.com/office/mac/drawingml/2011/main" val="1"/>
+              <ma14:placeholderFlag xmlns:ma14="http://schemas.microsoft.com/office/mac/drawingml/2011/main" xmlns="" val="1"/>
             </a:ext>
           </a:extLst>
         </p:spPr>
@@ -10314,34 +10568,34 @@
     </p:spTree>
     <p:extLst>
       <p:ext uri="{BB962C8B-B14F-4D97-AF65-F5344CB8AC3E}">
-        <p14:creationId xmlns:p14="http://schemas.microsoft.com/office/powerpoint/2010/main" val="2084436617"/>
+        <p14:creationId xmlns:p14="http://schemas.microsoft.com/office/powerpoint/2010/main" val="1355894672"/>
       </p:ext>
     </p:extLst>
   </p:cSld>
   <p:clrMap bg1="lt1" tx1="dk1" bg2="lt2" tx2="dk2" accent1="accent1" accent2="accent2" accent3="accent3" accent4="accent4" accent5="accent5" accent6="accent6" hlink="hlink" folHlink="folHlink"/>
   <p:sldLayoutIdLst>
-    <p:sldLayoutId id="2147484029" r:id="rId1"/>
-    <p:sldLayoutId id="2147484030" r:id="rId2"/>
-    <p:sldLayoutId id="2147484031" r:id="rId3"/>
-    <p:sldLayoutId id="2147484032" r:id="rId4"/>
-    <p:sldLayoutId id="2147484033" r:id="rId5"/>
-    <p:sldLayoutId id="2147484034" r:id="rId6"/>
-    <p:sldLayoutId id="2147484035" r:id="rId7"/>
-    <p:sldLayoutId id="2147484036" r:id="rId8"/>
-    <p:sldLayoutId id="2147484037" r:id="rId9"/>
-    <p:sldLayoutId id="2147484038" r:id="rId10"/>
-    <p:sldLayoutId id="2147484039" r:id="rId11"/>
-    <p:sldLayoutId id="2147484040" r:id="rId12"/>
-    <p:sldLayoutId id="2147484041" r:id="rId13"/>
-    <p:sldLayoutId id="2147484042" r:id="rId14"/>
-    <p:sldLayoutId id="2147484043" r:id="rId15"/>
-    <p:sldLayoutId id="2147484044" r:id="rId16"/>
-    <p:sldLayoutId id="2147484045" r:id="rId17"/>
-    <p:sldLayoutId id="2147484046" r:id="rId18"/>
-    <p:sldLayoutId id="2147484047" r:id="rId19"/>
-    <p:sldLayoutId id="2147484048" r:id="rId20"/>
-    <p:sldLayoutId id="2147484049" r:id="rId21"/>
-    <p:sldLayoutId id="2147484050" r:id="rId22"/>
+    <p:sldLayoutId id="2147484052" r:id="rId1"/>
+    <p:sldLayoutId id="2147484053" r:id="rId2"/>
+    <p:sldLayoutId id="2147484054" r:id="rId3"/>
+    <p:sldLayoutId id="2147484055" r:id="rId4"/>
+    <p:sldLayoutId id="2147484056" r:id="rId5"/>
+    <p:sldLayoutId id="2147484057" r:id="rId6"/>
+    <p:sldLayoutId id="2147484058" r:id="rId7"/>
+    <p:sldLayoutId id="2147484059" r:id="rId8"/>
+    <p:sldLayoutId id="2147484060" r:id="rId9"/>
+    <p:sldLayoutId id="2147484061" r:id="rId10"/>
+    <p:sldLayoutId id="2147484062" r:id="rId11"/>
+    <p:sldLayoutId id="2147484063" r:id="rId12"/>
+    <p:sldLayoutId id="2147484064" r:id="rId13"/>
+    <p:sldLayoutId id="2147484065" r:id="rId14"/>
+    <p:sldLayoutId id="2147484066" r:id="rId15"/>
+    <p:sldLayoutId id="2147484067" r:id="rId16"/>
+    <p:sldLayoutId id="2147484068" r:id="rId17"/>
+    <p:sldLayoutId id="2147484069" r:id="rId18"/>
+    <p:sldLayoutId id="2147484070" r:id="rId19"/>
+    <p:sldLayoutId id="2147484071" r:id="rId20"/>
+    <p:sldLayoutId id="2147484072" r:id="rId21"/>
+    <p:sldLayoutId id="2147484073" r:id="rId22"/>
   </p:sldLayoutIdLst>
   <p:hf sldNum="0" hdr="0" dt="0"/>
   <p:txStyles>
@@ -10855,10 +11109,10 @@
       </p:sp>
       <p:sp>
         <p:nvSpPr>
-          <p:cNvPr id="3" name="Subtitle 2">
+          <p:cNvPr id="4" name="Subtitle 3">
             <a:extLst>
               <a:ext uri="{FF2B5EF4-FFF2-40B4-BE49-F238E27FC236}">
-                <a16:creationId xmlns:a16="http://schemas.microsoft.com/office/drawing/2014/main" id="{6FDE4C94-2D9E-006F-762D-B87D2E2CCCC1}"/>
+                <a16:creationId xmlns:a16="http://schemas.microsoft.com/office/drawing/2014/main" id="{A84C7671-07A1-C965-1407-3EFE4098D00C}"/>
               </a:ext>
             </a:extLst>
           </p:cNvPr>
@@ -10874,10 +11128,7 @@
           <a:bodyPr/>
           <a:lstStyle/>
           <a:p>
-            <a:r>
-              <a:rPr lang="en-US" dirty="0"/>
-              <a:t>Announcements</a:t>
-            </a:r>
+            <a:endParaRPr lang="en-US"/>
           </a:p>
         </p:txBody>
       </p:sp>
@@ -11824,14 +12075,14 @@
           </a:ln>
           <a:extLst>
             <a:ext uri="{909E8E84-426E-40dd-AFC4-6F175D3DCCD1}">
-              <a14:hiddenFill xmlns:a14="http://schemas.microsoft.com/office/drawing/2010/main" xmlns="">
+              <a14:hiddenFill xmlns="" xmlns:a14="http://schemas.microsoft.com/office/drawing/2010/main">
                 <a:solidFill>
                   <a:srgbClr val="FFFFFF"/>
                 </a:solidFill>
               </a14:hiddenFill>
             </a:ext>
             <a:ext uri="{91240B29-F687-4f45-9708-019B960494DF}">
-              <a14:hiddenLine xmlns:a14="http://schemas.microsoft.com/office/drawing/2010/main" xmlns="" w="9525">
+              <a14:hiddenLine xmlns="" xmlns:a14="http://schemas.microsoft.com/office/drawing/2010/main" w="9525">
                 <a:solidFill>
                   <a:srgbClr val="000000"/>
                 </a:solidFill>
@@ -11841,7 +12092,7 @@
               </a14:hiddenLine>
             </a:ext>
             <a:ext uri="{FAA26D3D-D897-4be2-8F04-BA451C77F1D7}">
-              <ma14:placeholderFlag xmlns:ma14="http://schemas.microsoft.com/office/mac/drawingml/2011/main" xmlns="" val="1"/>
+              <ma14:placeholderFlag xmlns="" xmlns:ma14="http://schemas.microsoft.com/office/mac/drawingml/2011/main" val="1"/>
             </a:ext>
           </a:extLst>
         </p:spPr>
@@ -12685,7 +12936,7 @@
         <p:spPr>
           <a:xfrm>
             <a:off x="457200" y="1026160"/>
-            <a:ext cx="44013129" cy="5078313"/>
+            <a:ext cx="44013129" cy="5632311"/>
           </a:xfrm>
           <a:prstGeom prst="rect">
             <a:avLst/>
@@ -12718,40 +12969,73 @@
             </a:endParaRPr>
           </a:p>
           <a:p>
-            <a:r>
-              <a:rPr lang="en-US" sz="3600" dirty="0">
+            <a:pPr marL="0" indent="0">
+              <a:buFont typeface="Arial" panose="020B0604020202020204" pitchFamily="34" charset="0"/>
+              <a:buNone/>
+            </a:pPr>
+            <a:r>
+              <a:rPr lang="en-US" sz="3600" kern="0" dirty="0">
                 <a:latin typeface="Source Code Pro Medium" panose="020B0309030403020204" pitchFamily="34" charset="0"/>
-                <a:ea typeface="Source Code Pro Medium" panose="020B0309030403020204" pitchFamily="34" charset="0"/>
-              </a:rPr>
-              <a:t># This style is shorthand.</a:t>
-            </a:r>
-          </a:p>
-          <a:p>
-            <a:r>
-              <a:rPr lang="en-US" sz="3600" dirty="0">
-                <a:latin typeface="Source Code Pro Medium" panose="020B0309030403020204" pitchFamily="34" charset="0"/>
-                <a:ea typeface="Source Code Pro Medium" panose="020B0309030403020204" pitchFamily="34" charset="0"/>
+                <a:cs typeface="Open Sans" panose="020B0606030504020204" pitchFamily="34" charset="0"/>
               </a:rPr>
               <a:t>def max(x, y):</a:t>
             </a:r>
           </a:p>
           <a:p>
-            <a:r>
-              <a:rPr lang="en-US" sz="3600" dirty="0">
+            <a:pPr marL="0" indent="0">
+              <a:buFont typeface="Arial" panose="020B0604020202020204" pitchFamily="34" charset="0"/>
+              <a:buNone/>
+            </a:pPr>
+            <a:r>
+              <a:rPr lang="en-US" sz="3600" kern="0" dirty="0">
                 <a:latin typeface="Source Code Pro Medium" panose="020B0309030403020204" pitchFamily="34" charset="0"/>
-                <a:ea typeface="Source Code Pro Medium" panose="020B0309030403020204" pitchFamily="34" charset="0"/>
+                <a:cs typeface="Open Sans" panose="020B0606030504020204" pitchFamily="34" charset="0"/>
               </a:rPr>
-              <a:t>    return x if x &gt; y else y</a:t>
-            </a:r>
-          </a:p>
-          <a:p>
-            <a:r>
-              <a:rPr lang="en-US" sz="3600" dirty="0">
+              <a:t>    if x &gt; y:</a:t>
+            </a:r>
+          </a:p>
+          <a:p>
+            <a:pPr marL="0" indent="0">
+              <a:buFont typeface="Arial" panose="020B0604020202020204" pitchFamily="34" charset="0"/>
+              <a:buNone/>
+            </a:pPr>
+            <a:r>
+              <a:rPr lang="en-US" sz="3600" kern="0" dirty="0">
                 <a:latin typeface="Source Code Pro Medium" panose="020B0309030403020204" pitchFamily="34" charset="0"/>
-                <a:ea typeface="Source Code Pro Medium" panose="020B0309030403020204" pitchFamily="34" charset="0"/>
+                <a:cs typeface="Open Sans" panose="020B0606030504020204" pitchFamily="34" charset="0"/>
               </a:rPr>
-              <a:t>    </a:t>
-            </a:r>
+              <a:t>        return x</a:t>
+            </a:r>
+          </a:p>
+          <a:p>
+            <a:pPr marL="0" indent="0">
+              <a:buFont typeface="Arial" panose="020B0604020202020204" pitchFamily="34" charset="0"/>
+              <a:buNone/>
+            </a:pPr>
+            <a:r>
+              <a:rPr lang="en-US" sz="3600" kern="0" dirty="0">
+                <a:latin typeface="Source Code Pro Medium" panose="020B0309030403020204" pitchFamily="34" charset="0"/>
+                <a:cs typeface="Open Sans" panose="020B0606030504020204" pitchFamily="34" charset="0"/>
+              </a:rPr>
+              <a:t>    else:</a:t>
+            </a:r>
+          </a:p>
+          <a:p>
+            <a:pPr marL="0" indent="0">
+              <a:buFont typeface="Arial" panose="020B0604020202020204" pitchFamily="34" charset="0"/>
+              <a:buNone/>
+            </a:pPr>
+            <a:r>
+              <a:rPr lang="en-US" sz="3600" kern="0" dirty="0">
+                <a:latin typeface="Source Code Pro Medium" panose="020B0309030403020204" pitchFamily="34" charset="0"/>
+                <a:cs typeface="Open Sans" panose="020B0606030504020204" pitchFamily="34" charset="0"/>
+              </a:rPr>
+              <a:t>        return y</a:t>
+            </a:r>
+            <a:endParaRPr lang="en-US" sz="3600" dirty="0">
+              <a:latin typeface="Source Code Pro Medium" panose="020B0309030403020204" pitchFamily="34" charset="0"/>
+              <a:ea typeface="Source Code Pro Medium" panose="020B0309030403020204" pitchFamily="34" charset="0"/>
+            </a:endParaRPr>
           </a:p>
           <a:p>
             <a:r>
@@ -13033,14 +13317,14 @@
           <a:lstStyle/>
           <a:p>
             <a:r>
-              <a:rPr lang="en-US" dirty="0"/>
+              <a:rPr lang="en-US" sz="2000" dirty="0"/>
               <a:t>Write the docstring to explain what it does</a:t>
             </a:r>
           </a:p>
           <a:p>
             <a:pPr lvl="1"/>
             <a:r>
-              <a:rPr lang="en-US" dirty="0"/>
+              <a:rPr lang="en-US" sz="2000" dirty="0"/>
               <a:t>What does the function return? What are corner cases for parameters? </a:t>
             </a:r>
           </a:p>
@@ -13049,7 +13333,7 @@
               <a:buNone/>
             </a:pPr>
             <a:r>
-              <a:rPr lang="en-US" dirty="0">
+              <a:rPr lang="en-US" sz="2000" dirty="0">
                 <a:latin typeface="Source Code Pro" panose="020B0309030403020204" pitchFamily="34" charset="0"/>
                 <a:ea typeface="Source Code Pro" panose="020B0309030403020204" pitchFamily="34" charset="0"/>
               </a:rPr>
@@ -13061,7 +13345,7 @@
               <a:buNone/>
             </a:pPr>
             <a:r>
-              <a:rPr lang="en-US" dirty="0">
+              <a:rPr lang="en-US" sz="2000" dirty="0">
                 <a:latin typeface="Source Code Pro" panose="020B0309030403020204" pitchFamily="34" charset="0"/>
                 <a:ea typeface="Source Code Pro" panose="020B0309030403020204" pitchFamily="34" charset="0"/>
               </a:rPr>
@@ -13073,7 +13357,7 @@
               <a:buNone/>
             </a:pPr>
             <a:r>
-              <a:rPr lang="en-US" dirty="0">
+              <a:rPr lang="en-US" sz="2000" dirty="0">
                 <a:latin typeface="Source Code Pro" panose="020B0309030403020204" pitchFamily="34" charset="0"/>
                 <a:ea typeface="Source Code Pro" panose="020B0309030403020204" pitchFamily="34" charset="0"/>
               </a:rPr>
@@ -13085,7 +13369,7 @@
               <a:buNone/>
             </a:pPr>
             <a:r>
-              <a:rPr lang="en-US" dirty="0">
+              <a:rPr lang="en-US" sz="2000" dirty="0">
                 <a:latin typeface="Source Code Pro" panose="020B0309030403020204" pitchFamily="34" charset="0"/>
                 <a:ea typeface="Source Code Pro" panose="020B0309030403020204" pitchFamily="34" charset="0"/>
               </a:rPr>
@@ -13097,7 +13381,7 @@
               <a:buNone/>
             </a:pPr>
             <a:r>
-              <a:rPr lang="en-US" dirty="0">
+              <a:rPr lang="en-US" sz="2000" dirty="0">
                 <a:latin typeface="Source Code Pro" panose="020B0309030403020204" pitchFamily="34" charset="0"/>
                 <a:ea typeface="Source Code Pro" panose="020B0309030403020204" pitchFamily="34" charset="0"/>
               </a:rPr>
@@ -13109,7 +13393,7 @@
               <a:buNone/>
             </a:pPr>
             <a:r>
-              <a:rPr lang="en-US" dirty="0">
+              <a:rPr lang="en-US" sz="2000" dirty="0">
                 <a:latin typeface="Source Code Pro" panose="020B0309030403020204" pitchFamily="34" charset="0"/>
                 <a:ea typeface="Source Code Pro" panose="020B0309030403020204" pitchFamily="34" charset="0"/>
               </a:rPr>
@@ -13118,44 +13402,44 @@
           </a:p>
           <a:p>
             <a:r>
-              <a:rPr lang="en-US" dirty="0"/>
+              <a:rPr lang="en-US" sz="2000" dirty="0"/>
               <a:t>Write </a:t>
             </a:r>
             <a:r>
-              <a:rPr lang="en-US" dirty="0" err="1"/>
+              <a:rPr lang="en-US" sz="2000" dirty="0" err="1"/>
               <a:t>doctest</a:t>
             </a:r>
             <a:r>
-              <a:rPr lang="en-US" dirty="0"/>
+              <a:rPr lang="en-US" sz="2000" dirty="0"/>
               <a:t> to show what it should do</a:t>
             </a:r>
           </a:p>
           <a:p>
             <a:pPr lvl="1"/>
             <a:r>
-              <a:rPr lang="en-US" dirty="0"/>
+              <a:rPr lang="en-US" sz="2000" dirty="0"/>
               <a:t>Before you write the implementation.</a:t>
             </a:r>
           </a:p>
           <a:p>
             <a:pPr lvl="1"/>
             <a:r>
-              <a:rPr lang="en-US" dirty="0"/>
+              <a:rPr lang="en-US" sz="2000" dirty="0"/>
               <a:t>python3 –m </a:t>
             </a:r>
             <a:r>
-              <a:rPr lang="en-US" dirty="0" err="1"/>
+              <a:rPr lang="en-US" sz="2000" dirty="0" err="1"/>
               <a:t>doctest</a:t>
             </a:r>
             <a:r>
-              <a:rPr lang="en-US" dirty="0"/>
+              <a:rPr lang="en-US" sz="2000" dirty="0"/>
               <a:t> [-v] </a:t>
             </a:r>
             <a:r>
-              <a:rPr lang="en-US" dirty="0" err="1"/>
+              <a:rPr lang="en-US" sz="2000" dirty="0" err="1"/>
               <a:t>file.py</a:t>
             </a:r>
-            <a:endParaRPr lang="en-US" dirty="0"/>
+            <a:endParaRPr lang="en-US" sz="2000" dirty="0"/>
           </a:p>
         </p:txBody>
       </p:sp>
@@ -14075,7 +14359,13 @@
   <p:cSld>
     <p:spTree>
       <p:nvGrpSpPr>
-        <p:cNvPr id="1" name=""/>
+        <p:cNvPr id="1" name="">
+          <a:extLst>
+            <a:ext uri="{FF2B5EF4-FFF2-40B4-BE49-F238E27FC236}">
+              <a16:creationId xmlns:a16="http://schemas.microsoft.com/office/drawing/2014/main" id="{E8049CBB-FFAE-33EA-AB6E-2287EF67FBD9}"/>
+            </a:ext>
+          </a:extLst>
+        </p:cNvPr>
         <p:cNvGrpSpPr/>
         <p:nvPr/>
       </p:nvGrpSpPr>
@@ -14089,10 +14379,10 @@
       </p:grpSpPr>
       <p:sp>
         <p:nvSpPr>
-          <p:cNvPr id="7" name="Title 6">
+          <p:cNvPr id="2" name="Title 1">
             <a:extLst>
               <a:ext uri="{FF2B5EF4-FFF2-40B4-BE49-F238E27FC236}">
-                <a16:creationId xmlns:a16="http://schemas.microsoft.com/office/drawing/2014/main" id="{174F684A-21F3-5E4C-BD4A-9318C588BC15}"/>
+                <a16:creationId xmlns:a16="http://schemas.microsoft.com/office/drawing/2014/main" id="{32380BAD-DBD6-9C8C-6E35-3AF7F476FD52}"/>
               </a:ext>
             </a:extLst>
           </p:cNvPr>
@@ -14100,7 +14390,7 @@
             <a:spLocks noGrp="1"/>
           </p:cNvSpPr>
           <p:nvPr>
-            <p:ph type="ctrTitle"/>
+            <p:ph type="title"/>
           </p:nvPr>
         </p:nvSpPr>
         <p:spPr/>
@@ -14110,28 +14400,22 @@
           <a:p>
             <a:r>
               <a:rPr lang="en-US" dirty="0"/>
-              <a:t>Iteration with </a:t>
-            </a:r>
-            <a:r>
-              <a:rPr lang="en-US" dirty="0">
-                <a:latin typeface="Source Code Pro Medium" panose="020B0309030403020204" pitchFamily="34" charset="0"/>
-                <a:ea typeface="Source Code Pro Medium" panose="020B0309030403020204" pitchFamily="34" charset="0"/>
-              </a:rPr>
-              <a:t>while</a:t>
-            </a:r>
-            <a:r>
-              <a:rPr lang="en-US" dirty="0"/>
-              <a:t> Loops</a:t>
-            </a:r>
-          </a:p>
-        </p:txBody>
-      </p:sp>
-      <p:sp>
-        <p:nvSpPr>
-          <p:cNvPr id="3" name="Subtitle 2">
+              <a:t>Conditional Expression </a:t>
+            </a:r>
+            <a:r>
+              <a:rPr lang="en-US" dirty="0" err="1"/>
+              <a:t>Shorthuand</a:t>
+            </a:r>
+            <a:endParaRPr lang="en-US" dirty="0"/>
+          </a:p>
+        </p:txBody>
+      </p:sp>
+      <p:sp>
+        <p:nvSpPr>
+          <p:cNvPr id="8" name="Content Placeholder 7">
             <a:extLst>
               <a:ext uri="{FF2B5EF4-FFF2-40B4-BE49-F238E27FC236}">
-                <a16:creationId xmlns:a16="http://schemas.microsoft.com/office/drawing/2014/main" id="{B4F9E437-03C2-60B8-5DD5-84B18C53E757}"/>
+                <a16:creationId xmlns:a16="http://schemas.microsoft.com/office/drawing/2014/main" id="{94C7EA35-000F-DE5E-7391-CF9D15A18D7C}"/>
               </a:ext>
             </a:extLst>
           </p:cNvPr>
@@ -14139,7 +14423,7 @@
             <a:spLocks noGrp="1"/>
           </p:cNvSpPr>
           <p:nvPr>
-            <p:ph type="subTitle" idx="1"/>
+            <p:ph idx="1"/>
           </p:nvPr>
         </p:nvSpPr>
         <p:spPr/>
@@ -14147,14 +14431,341 @@
           <a:bodyPr/>
           <a:lstStyle/>
           <a:p>
-            <a:endParaRPr lang="en-US"/>
+            <a:r>
+              <a:rPr lang="en-US" dirty="0"/>
+              <a:t> Return a Value Based on some condition</a:t>
+            </a:r>
+          </a:p>
+          <a:p>
+            <a:endParaRPr lang="en-US" dirty="0"/>
+          </a:p>
+          <a:p>
+            <a:endParaRPr lang="en-US" dirty="0"/>
+          </a:p>
+          <a:p>
+            <a:endParaRPr lang="en-US" dirty="0"/>
+          </a:p>
+          <a:p>
+            <a:endParaRPr lang="en-US" dirty="0"/>
+          </a:p>
+          <a:p>
+            <a:r>
+              <a:rPr lang="en-US" dirty="0"/>
+              <a:t>Example:</a:t>
+            </a:r>
+          </a:p>
+        </p:txBody>
+      </p:sp>
+      <p:sp>
+        <p:nvSpPr>
+          <p:cNvPr id="7" name="TextBox 6">
+            <a:extLst>
+              <a:ext uri="{FF2B5EF4-FFF2-40B4-BE49-F238E27FC236}">
+                <a16:creationId xmlns:a16="http://schemas.microsoft.com/office/drawing/2014/main" id="{12A0ED0C-A9DA-3984-0F79-F4EE6D60EF07}"/>
+              </a:ext>
+            </a:extLst>
+          </p:cNvPr>
+          <p:cNvSpPr txBox="1"/>
+          <p:nvPr/>
+        </p:nvSpPr>
+        <p:spPr>
+          <a:xfrm>
+            <a:off x="990600" y="1859340"/>
+            <a:ext cx="10668000" cy="461665"/>
+          </a:xfrm>
+          <a:prstGeom prst="rect">
+            <a:avLst/>
+          </a:prstGeom>
+          <a:noFill/>
+        </p:spPr>
+        <p:txBody>
+          <a:bodyPr wrap="square" rtlCol="0">
+            <a:spAutoFit/>
+          </a:bodyPr>
+          <a:lstStyle/>
+          <a:p>
+            <a:r>
+              <a:rPr lang="en-US" sz="2400" dirty="0">
+                <a:latin typeface="Courier New"/>
+                <a:cs typeface="Courier New"/>
+              </a:rPr>
+              <a:t>&lt;true expression&gt; </a:t>
+            </a:r>
+            <a:r>
+              <a:rPr lang="en-US" sz="2400" b="1" dirty="0">
+                <a:latin typeface="Courier New"/>
+                <a:cs typeface="Courier New"/>
+              </a:rPr>
+              <a:t>if </a:t>
+            </a:r>
+            <a:r>
+              <a:rPr lang="en-US" sz="2400" dirty="0">
+                <a:latin typeface="Courier New"/>
+                <a:cs typeface="Courier New"/>
+              </a:rPr>
+              <a:t>&lt;predicate&gt; </a:t>
+            </a:r>
+            <a:r>
+              <a:rPr lang="en-US" sz="2400" b="1" dirty="0">
+                <a:latin typeface="Courier New"/>
+                <a:cs typeface="Courier New"/>
+              </a:rPr>
+              <a:t>else </a:t>
+            </a:r>
+            <a:r>
+              <a:rPr lang="en-US" sz="2400" dirty="0">
+                <a:latin typeface="Courier New"/>
+                <a:cs typeface="Courier New"/>
+              </a:rPr>
+              <a:t>&lt;false expression&gt;</a:t>
+            </a:r>
+          </a:p>
+        </p:txBody>
+      </p:sp>
+      <p:sp>
+        <p:nvSpPr>
+          <p:cNvPr id="9" name="TextBox 8">
+            <a:extLst>
+              <a:ext uri="{FF2B5EF4-FFF2-40B4-BE49-F238E27FC236}">
+                <a16:creationId xmlns:a16="http://schemas.microsoft.com/office/drawing/2014/main" id="{61320566-7BF4-CF67-2CE4-81A464D6B86D}"/>
+              </a:ext>
+            </a:extLst>
+          </p:cNvPr>
+          <p:cNvSpPr txBox="1"/>
+          <p:nvPr/>
+        </p:nvSpPr>
+        <p:spPr>
+          <a:xfrm>
+            <a:off x="1083733" y="4536996"/>
+            <a:ext cx="10668000" cy="461665"/>
+          </a:xfrm>
+          <a:prstGeom prst="rect">
+            <a:avLst/>
+          </a:prstGeom>
+          <a:noFill/>
+        </p:spPr>
+        <p:txBody>
+          <a:bodyPr wrap="square" rtlCol="0">
+            <a:spAutoFit/>
+          </a:bodyPr>
+          <a:lstStyle/>
+          <a:p>
+            <a:r>
+              <a:rPr lang="en-US" sz="2400" dirty="0">
+                <a:latin typeface="Courier New"/>
+                <a:cs typeface="Courier New"/>
+              </a:rPr>
+              <a:t>status</a:t>
+            </a:r>
+            <a:r>
+              <a:rPr lang="en-US" sz="2400" b="1" dirty="0">
+                <a:latin typeface="Courier New"/>
+                <a:cs typeface="Courier New"/>
+              </a:rPr>
+              <a:t> = "it's hot</a:t>
+            </a:r>
+            <a:r>
+              <a:rPr lang="en-US" sz="2400" dirty="0">
+                <a:latin typeface="Courier New"/>
+                <a:cs typeface="Courier New"/>
+              </a:rPr>
+              <a:t>!" </a:t>
+            </a:r>
+            <a:r>
+              <a:rPr lang="en-US" sz="2400" b="1" dirty="0">
+                <a:latin typeface="Courier New"/>
+                <a:cs typeface="Courier New"/>
+              </a:rPr>
+              <a:t>if</a:t>
+            </a:r>
+            <a:r>
+              <a:rPr lang="en-US" sz="2400" dirty="0">
+                <a:latin typeface="Courier New"/>
+                <a:cs typeface="Courier New"/>
+              </a:rPr>
+              <a:t> temperature &gt; 85</a:t>
+            </a:r>
+            <a:r>
+              <a:rPr lang="en-US" sz="2400" b="1" dirty="0">
+                <a:latin typeface="Courier New"/>
+                <a:cs typeface="Courier New"/>
+              </a:rPr>
+              <a:t> </a:t>
+            </a:r>
+            <a:r>
+              <a:rPr lang="en-US" sz="2400" dirty="0">
+                <a:latin typeface="Courier New"/>
+                <a:cs typeface="Courier New"/>
+              </a:rPr>
+              <a:t>'not hot…'</a:t>
+            </a:r>
+          </a:p>
+        </p:txBody>
+      </p:sp>
+      <p:sp>
+        <p:nvSpPr>
+          <p:cNvPr id="5" name="Footer Placeholder 2">
+            <a:extLst>
+              <a:ext uri="{FF2B5EF4-FFF2-40B4-BE49-F238E27FC236}">
+                <a16:creationId xmlns:a16="http://schemas.microsoft.com/office/drawing/2014/main" id="{5B71E2BA-0E32-1A98-14EF-CFC6148764C0}"/>
+              </a:ext>
+            </a:extLst>
+          </p:cNvPr>
+          <p:cNvSpPr txBox="1">
+            <a:spLocks/>
+          </p:cNvSpPr>
+          <p:nvPr/>
+        </p:nvSpPr>
+        <p:spPr>
+          <a:xfrm>
+            <a:off x="4038600" y="6416675"/>
+            <a:ext cx="4114800" cy="365125"/>
+          </a:xfrm>
+          <a:prstGeom prst="rect">
+            <a:avLst/>
+          </a:prstGeom>
+        </p:spPr>
+        <p:txBody>
+          <a:bodyPr vert="horz" lIns="91440" tIns="45720" rIns="91440" bIns="45720" rtlCol="0" anchor="ctr"/>
+          <a:lstStyle>
+            <a:defPPr>
+              <a:defRPr lang="en-US"/>
+            </a:defPPr>
+            <a:lvl1pPr algn="ctr" rtl="0" eaLnBrk="0" fontAlgn="base" hangingPunct="0">
+              <a:spcBef>
+                <a:spcPct val="0"/>
+              </a:spcBef>
+              <a:spcAft>
+                <a:spcPct val="0"/>
+              </a:spcAft>
+              <a:defRPr sz="1200" kern="1200">
+                <a:solidFill>
+                  <a:schemeClr val="accent3"/>
+                </a:solidFill>
+                <a:latin typeface="Arial" charset="0"/>
+                <a:ea typeface="ＭＳ Ｐゴシック" charset="0"/>
+                <a:cs typeface="ＭＳ Ｐゴシック" charset="0"/>
+              </a:defRPr>
+            </a:lvl1pPr>
+            <a:lvl2pPr marL="457200" algn="l" rtl="0" eaLnBrk="0" fontAlgn="base" hangingPunct="0">
+              <a:spcBef>
+                <a:spcPct val="0"/>
+              </a:spcBef>
+              <a:spcAft>
+                <a:spcPct val="0"/>
+              </a:spcAft>
+              <a:defRPr kern="1200">
+                <a:solidFill>
+                  <a:schemeClr val="tx1"/>
+                </a:solidFill>
+                <a:latin typeface="Arial" charset="0"/>
+                <a:ea typeface="ＭＳ Ｐゴシック" charset="0"/>
+                <a:cs typeface="ＭＳ Ｐゴシック" charset="0"/>
+              </a:defRPr>
+            </a:lvl2pPr>
+            <a:lvl3pPr marL="914400" algn="l" rtl="0" eaLnBrk="0" fontAlgn="base" hangingPunct="0">
+              <a:spcBef>
+                <a:spcPct val="0"/>
+              </a:spcBef>
+              <a:spcAft>
+                <a:spcPct val="0"/>
+              </a:spcAft>
+              <a:defRPr kern="1200">
+                <a:solidFill>
+                  <a:schemeClr val="tx1"/>
+                </a:solidFill>
+                <a:latin typeface="Arial" charset="0"/>
+                <a:ea typeface="ＭＳ Ｐゴシック" charset="0"/>
+                <a:cs typeface="ＭＳ Ｐゴシック" charset="0"/>
+              </a:defRPr>
+            </a:lvl3pPr>
+            <a:lvl4pPr marL="1371600" algn="l" rtl="0" eaLnBrk="0" fontAlgn="base" hangingPunct="0">
+              <a:spcBef>
+                <a:spcPct val="0"/>
+              </a:spcBef>
+              <a:spcAft>
+                <a:spcPct val="0"/>
+              </a:spcAft>
+              <a:defRPr kern="1200">
+                <a:solidFill>
+                  <a:schemeClr val="tx1"/>
+                </a:solidFill>
+                <a:latin typeface="Arial" charset="0"/>
+                <a:ea typeface="ＭＳ Ｐゴシック" charset="0"/>
+                <a:cs typeface="ＭＳ Ｐゴシック" charset="0"/>
+              </a:defRPr>
+            </a:lvl4pPr>
+            <a:lvl5pPr marL="1828800" algn="l" rtl="0" eaLnBrk="0" fontAlgn="base" hangingPunct="0">
+              <a:spcBef>
+                <a:spcPct val="0"/>
+              </a:spcBef>
+              <a:spcAft>
+                <a:spcPct val="0"/>
+              </a:spcAft>
+              <a:defRPr kern="1200">
+                <a:solidFill>
+                  <a:schemeClr val="tx1"/>
+                </a:solidFill>
+                <a:latin typeface="Arial" charset="0"/>
+                <a:ea typeface="ＭＳ Ｐゴシック" charset="0"/>
+                <a:cs typeface="ＭＳ Ｐゴシック" charset="0"/>
+              </a:defRPr>
+            </a:lvl5pPr>
+            <a:lvl6pPr marL="2286000" algn="l" defTabSz="457200" rtl="0" eaLnBrk="1" latinLnBrk="0" hangingPunct="1">
+              <a:defRPr kern="1200">
+                <a:solidFill>
+                  <a:schemeClr val="tx1"/>
+                </a:solidFill>
+                <a:latin typeface="Arial" charset="0"/>
+                <a:ea typeface="ＭＳ Ｐゴシック" charset="0"/>
+                <a:cs typeface="ＭＳ Ｐゴシック" charset="0"/>
+              </a:defRPr>
+            </a:lvl6pPr>
+            <a:lvl7pPr marL="2743200" algn="l" defTabSz="457200" rtl="0" eaLnBrk="1" latinLnBrk="0" hangingPunct="1">
+              <a:defRPr kern="1200">
+                <a:solidFill>
+                  <a:schemeClr val="tx1"/>
+                </a:solidFill>
+                <a:latin typeface="Arial" charset="0"/>
+                <a:ea typeface="ＭＳ Ｐゴシック" charset="0"/>
+                <a:cs typeface="ＭＳ Ｐゴシック" charset="0"/>
+              </a:defRPr>
+            </a:lvl7pPr>
+            <a:lvl8pPr marL="3200400" algn="l" defTabSz="457200" rtl="0" eaLnBrk="1" latinLnBrk="0" hangingPunct="1">
+              <a:defRPr kern="1200">
+                <a:solidFill>
+                  <a:schemeClr val="tx1"/>
+                </a:solidFill>
+                <a:latin typeface="Arial" charset="0"/>
+                <a:ea typeface="ＭＳ Ｐゴシック" charset="0"/>
+                <a:cs typeface="ＭＳ Ｐゴシック" charset="0"/>
+              </a:defRPr>
+            </a:lvl8pPr>
+            <a:lvl9pPr marL="3657600" algn="l" defTabSz="457200" rtl="0" eaLnBrk="1" latinLnBrk="0" hangingPunct="1">
+              <a:defRPr kern="1200">
+                <a:solidFill>
+                  <a:schemeClr val="tx1"/>
+                </a:solidFill>
+                <a:latin typeface="Arial" charset="0"/>
+                <a:ea typeface="ＭＳ Ｐゴシック" charset="0"/>
+                <a:cs typeface="ＭＳ Ｐゴシック" charset="0"/>
+              </a:defRPr>
+            </a:lvl9pPr>
+          </a:lstStyle>
+          <a:p>
+            <a:r>
+              <a:rPr lang="en-US" dirty="0">
+                <a:latin typeface="FreightMicro Pro Book" panose="02000603020000020004" pitchFamily="2" charset="0"/>
+              </a:rPr>
+              <a:t>Michael Ball | UC Berkeley | https://c88c.org | © CC BY-NC-SA</a:t>
+            </a:r>
           </a:p>
         </p:txBody>
       </p:sp>
     </p:spTree>
     <p:extLst>
       <p:ext uri="{BB962C8B-B14F-4D97-AF65-F5344CB8AC3E}">
-        <p14:creationId xmlns:p14="http://schemas.microsoft.com/office/powerpoint/2010/main" val="65676127"/>
+        <p14:creationId xmlns:p14="http://schemas.microsoft.com/office/powerpoint/2010/main" val="233429612"/>
       </p:ext>
     </p:extLst>
   </p:cSld>
@@ -14163,17 +14774,17 @@
   </p:clrMapOvr>
   <mc:AlternateContent xmlns:mc="http://schemas.openxmlformats.org/markup-compatibility/2006" xmlns:p14="http://schemas.microsoft.com/office/powerpoint/2010/main">
     <mc:Choice Requires="p14">
-      <p:transition spd="slow" p14:dur="2000" advTm="109658"/>
+      <p:transition spd="slow" p14:dur="2000" advTm="46147"/>
     </mc:Choice>
     <mc:Fallback xmlns="">
-      <p:transition xmlns:p14="http://schemas.microsoft.com/office/powerpoint/2010/main" spd="slow" advTm="109658"/>
+      <p:transition xmlns:p14="http://schemas.microsoft.com/office/powerpoint/2010/main" spd="slow" advTm="46147"/>
     </mc:Fallback>
   </mc:AlternateContent>
 </p:sld>
 </file>
 
 <file path=ppt/slides/slide2.xml><?xml version="1.0" encoding="utf-8"?>
-<p:sld xmlns:a="http://schemas.openxmlformats.org/drawingml/2006/main" xmlns:r="http://schemas.openxmlformats.org/officeDocument/2006/relationships" xmlns:p="http://schemas.openxmlformats.org/presentationml/2006/main" show="0">
+<p:sld xmlns:a="http://schemas.openxmlformats.org/drawingml/2006/main" xmlns:r="http://schemas.openxmlformats.org/officeDocument/2006/relationships" xmlns:p="http://schemas.openxmlformats.org/presentationml/2006/main">
   <p:cSld>
     <p:spTree>
       <p:nvGrpSpPr>
@@ -14194,7 +14805,7 @@
           <p:cNvPr id="2" name="Title 1">
             <a:extLst>
               <a:ext uri="{FF2B5EF4-FFF2-40B4-BE49-F238E27FC236}">
-                <a16:creationId xmlns:a16="http://schemas.microsoft.com/office/drawing/2014/main" id="{2010EE93-B4E4-B443-AE9E-A85F1D185378}"/>
+                <a16:creationId xmlns:a16="http://schemas.microsoft.com/office/drawing/2014/main" id="{2332C5B2-9DFD-C1DD-1E07-71BD0B221807}"/>
               </a:ext>
             </a:extLst>
           </p:cNvPr>
@@ -14212,17 +14823,17 @@
           <a:p>
             <a:r>
               <a:rPr lang="en-US" dirty="0"/>
-              <a:t>Computing In The News</a:t>
-            </a:r>
-          </a:p>
-        </p:txBody>
-      </p:sp>
-      <p:sp>
-        <p:nvSpPr>
-          <p:cNvPr id="4" name="Content Placeholder 3">
+              <a:t>Announcements</a:t>
+            </a:r>
+          </a:p>
+        </p:txBody>
+      </p:sp>
+      <p:sp>
+        <p:nvSpPr>
+          <p:cNvPr id="3" name="Content Placeholder 2">
             <a:extLst>
               <a:ext uri="{FF2B5EF4-FFF2-40B4-BE49-F238E27FC236}">
-                <a16:creationId xmlns:a16="http://schemas.microsoft.com/office/drawing/2014/main" id="{42EB0D4B-F310-9DD8-2385-1E650B4AEE50}"/>
+                <a16:creationId xmlns:a16="http://schemas.microsoft.com/office/drawing/2014/main" id="{2C0B2E46-66D3-D6B7-5E34-7D5FAC92D8D9}"/>
               </a:ext>
             </a:extLst>
           </p:cNvPr>
@@ -14238,170 +14849,234 @@
           <a:bodyPr/>
           <a:lstStyle/>
           <a:p>
-            <a:endParaRPr lang="en-US"/>
-          </a:p>
-        </p:txBody>
-      </p:sp>
-      <p:sp>
-        <p:nvSpPr>
-          <p:cNvPr id="7" name="TextBox 6">
+            <a:r>
+              <a:rPr lang="en-US" dirty="0"/>
+              <a:t> Lab Attendance: </a:t>
+            </a:r>
+            <a:r>
+              <a:rPr lang="en-US" dirty="0" err="1"/>
+              <a:t>Autograder</a:t>
+            </a:r>
+            <a:r>
+              <a:rPr lang="en-US" dirty="0"/>
+              <a:t> is still a WIP</a:t>
+            </a:r>
+          </a:p>
+          <a:p>
+            <a:pPr lvl="1"/>
+            <a:r>
+              <a:rPr lang="en-US" dirty="0"/>
+              <a:t> But if you attended lab, filled out a code, you only need it to say 2/4</a:t>
+            </a:r>
+          </a:p>
+          <a:p>
+            <a:pPr lvl="1"/>
+            <a:r>
+              <a:rPr lang="en-US" dirty="0"/>
+              <a:t> We're working on making it more clear very son.</a:t>
+            </a:r>
+          </a:p>
+          <a:p>
+            <a:r>
+              <a:rPr lang="en-US" dirty="0"/>
+              <a:t> Earning points is based on </a:t>
+            </a:r>
+            <a:r>
+              <a:rPr lang="en-US" i="1" dirty="0"/>
+              <a:t>correctness</a:t>
+            </a:r>
+          </a:p>
+          <a:p>
+            <a:pPr lvl="1"/>
+            <a:r>
+              <a:rPr lang="en-US" i="1" dirty="0"/>
+              <a:t> </a:t>
+            </a:r>
+            <a:r>
+              <a:rPr lang="en-US" dirty="0"/>
+              <a:t>You get as many tries as you need, but the results must work, at the end of the day.</a:t>
+            </a:r>
+          </a:p>
+          <a:p>
+            <a:pPr lvl="1"/>
+            <a:r>
+              <a:rPr lang="en-US" dirty="0"/>
+              <a:t> If you need an extension, you can ask for one, but be careful with time. </a:t>
+            </a:r>
+            <a:r>
+              <a:rPr lang="en-US" dirty="0">
+                <a:sym typeface="Wingdings" pitchFamily="2" charset="2"/>
+              </a:rPr>
+              <a:t> </a:t>
+            </a:r>
+            <a:endParaRPr lang="en-US" dirty="0"/>
+          </a:p>
+        </p:txBody>
+      </p:sp>
+      <p:sp>
+        <p:nvSpPr>
+          <p:cNvPr id="7" name="Footer Placeholder 2">
             <a:extLst>
               <a:ext uri="{FF2B5EF4-FFF2-40B4-BE49-F238E27FC236}">
-                <a16:creationId xmlns:a16="http://schemas.microsoft.com/office/drawing/2014/main" id="{A043863B-8260-F84C-9F42-16C41C21AA50}"/>
+                <a16:creationId xmlns:a16="http://schemas.microsoft.com/office/drawing/2014/main" id="{9819B794-74DD-51B5-991B-D31FCC029792}"/>
               </a:ext>
             </a:extLst>
           </p:cNvPr>
-          <p:cNvSpPr txBox="1"/>
+          <p:cNvSpPr txBox="1">
+            <a:spLocks/>
+          </p:cNvSpPr>
           <p:nvPr/>
         </p:nvSpPr>
         <p:spPr>
           <a:xfrm>
-            <a:off x="457200" y="991704"/>
-            <a:ext cx="7010400" cy="5355312"/>
+            <a:off x="4038600" y="6356350"/>
+            <a:ext cx="4953000" cy="365125"/>
           </a:xfrm>
           <a:prstGeom prst="rect">
             <a:avLst/>
           </a:prstGeom>
-          <a:noFill/>
         </p:spPr>
         <p:txBody>
-          <a:bodyPr wrap="square">
-            <a:spAutoFit/>
-          </a:bodyPr>
-          <a:lstStyle/>
-          <a:p>
-            <a:r>
-              <a:rPr lang="en-US" u="none" strike="noStrike" dirty="0">
-                <a:solidFill>
-                  <a:srgbClr val="005985"/>
-                </a:solidFill>
-                <a:effectLst/>
-                <a:latin typeface="Open Sans" panose="020B0606030504020204" pitchFamily="34" charset="0"/>
-                <a:hlinkClick r:id="rId2"/>
+          <a:bodyPr vert="horz" lIns="91440" tIns="45720" rIns="91440" bIns="45720" rtlCol="0" anchor="ctr"/>
+          <a:lstStyle>
+            <a:defPPr>
+              <a:defRPr lang="en-US"/>
+            </a:defPPr>
+            <a:lvl1pPr algn="ctr" rtl="0" eaLnBrk="0" fontAlgn="base" hangingPunct="0">
+              <a:spcBef>
+                <a:spcPct val="0"/>
+              </a:spcBef>
+              <a:spcAft>
+                <a:spcPct val="0"/>
+              </a:spcAft>
+              <a:defRPr sz="1200" kern="1200">
+                <a:solidFill>
+                  <a:schemeClr val="accent3"/>
+                </a:solidFill>
+                <a:latin typeface="Arial" charset="0"/>
+                <a:ea typeface="ＭＳ Ｐゴシック" charset="0"/>
+                <a:cs typeface="ＭＳ Ｐゴシック" charset="0"/>
+              </a:defRPr>
+            </a:lvl1pPr>
+            <a:lvl2pPr marL="457200" algn="l" rtl="0" eaLnBrk="0" fontAlgn="base" hangingPunct="0">
+              <a:spcBef>
+                <a:spcPct val="0"/>
+              </a:spcBef>
+              <a:spcAft>
+                <a:spcPct val="0"/>
+              </a:spcAft>
+              <a:defRPr kern="1200">
+                <a:solidFill>
+                  <a:schemeClr val="tx1"/>
+                </a:solidFill>
+                <a:latin typeface="Arial" charset="0"/>
+                <a:ea typeface="ＭＳ Ｐゴシック" charset="0"/>
+                <a:cs typeface="ＭＳ Ｐゴシック" charset="0"/>
+              </a:defRPr>
+            </a:lvl2pPr>
+            <a:lvl3pPr marL="914400" algn="l" rtl="0" eaLnBrk="0" fontAlgn="base" hangingPunct="0">
+              <a:spcBef>
+                <a:spcPct val="0"/>
+              </a:spcBef>
+              <a:spcAft>
+                <a:spcPct val="0"/>
+              </a:spcAft>
+              <a:defRPr kern="1200">
+                <a:solidFill>
+                  <a:schemeClr val="tx1"/>
+                </a:solidFill>
+                <a:latin typeface="Arial" charset="0"/>
+                <a:ea typeface="ＭＳ Ｐゴシック" charset="0"/>
+                <a:cs typeface="ＭＳ Ｐゴシック" charset="0"/>
+              </a:defRPr>
+            </a:lvl3pPr>
+            <a:lvl4pPr marL="1371600" algn="l" rtl="0" eaLnBrk="0" fontAlgn="base" hangingPunct="0">
+              <a:spcBef>
+                <a:spcPct val="0"/>
+              </a:spcBef>
+              <a:spcAft>
+                <a:spcPct val="0"/>
+              </a:spcAft>
+              <a:defRPr kern="1200">
+                <a:solidFill>
+                  <a:schemeClr val="tx1"/>
+                </a:solidFill>
+                <a:latin typeface="Arial" charset="0"/>
+                <a:ea typeface="ＭＳ Ｐゴシック" charset="0"/>
+                <a:cs typeface="ＭＳ Ｐゴシック" charset="0"/>
+              </a:defRPr>
+            </a:lvl4pPr>
+            <a:lvl5pPr marL="1828800" algn="l" rtl="0" eaLnBrk="0" fontAlgn="base" hangingPunct="0">
+              <a:spcBef>
+                <a:spcPct val="0"/>
+              </a:spcBef>
+              <a:spcAft>
+                <a:spcPct val="0"/>
+              </a:spcAft>
+              <a:defRPr kern="1200">
+                <a:solidFill>
+                  <a:schemeClr val="tx1"/>
+                </a:solidFill>
+                <a:latin typeface="Arial" charset="0"/>
+                <a:ea typeface="ＭＳ Ｐゴシック" charset="0"/>
+                <a:cs typeface="ＭＳ Ｐゴシック" charset="0"/>
+              </a:defRPr>
+            </a:lvl5pPr>
+            <a:lvl6pPr marL="2286000" algn="l" defTabSz="457200" rtl="0" eaLnBrk="1" latinLnBrk="0" hangingPunct="1">
+              <a:defRPr kern="1200">
+                <a:solidFill>
+                  <a:schemeClr val="tx1"/>
+                </a:solidFill>
+                <a:latin typeface="Arial" charset="0"/>
+                <a:ea typeface="ＭＳ Ｐゴシック" charset="0"/>
+                <a:cs typeface="ＭＳ Ｐゴシック" charset="0"/>
+              </a:defRPr>
+            </a:lvl6pPr>
+            <a:lvl7pPr marL="2743200" algn="l" defTabSz="457200" rtl="0" eaLnBrk="1" latinLnBrk="0" hangingPunct="1">
+              <a:defRPr kern="1200">
+                <a:solidFill>
+                  <a:schemeClr val="tx1"/>
+                </a:solidFill>
+                <a:latin typeface="Arial" charset="0"/>
+                <a:ea typeface="ＭＳ Ｐゴシック" charset="0"/>
+                <a:cs typeface="ＭＳ Ｐゴシック" charset="0"/>
+              </a:defRPr>
+            </a:lvl7pPr>
+            <a:lvl8pPr marL="3200400" algn="l" defTabSz="457200" rtl="0" eaLnBrk="1" latinLnBrk="0" hangingPunct="1">
+              <a:defRPr kern="1200">
+                <a:solidFill>
+                  <a:schemeClr val="tx1"/>
+                </a:solidFill>
+                <a:latin typeface="Arial" charset="0"/>
+                <a:ea typeface="ＭＳ Ｐゴシック" charset="0"/>
+                <a:cs typeface="ＭＳ Ｐゴシック" charset="0"/>
+              </a:defRPr>
+            </a:lvl8pPr>
+            <a:lvl9pPr marL="3657600" algn="l" defTabSz="457200" rtl="0" eaLnBrk="1" latinLnBrk="0" hangingPunct="1">
+              <a:defRPr kern="1200">
+                <a:solidFill>
+                  <a:schemeClr val="tx1"/>
+                </a:solidFill>
+                <a:latin typeface="Arial" charset="0"/>
+                <a:ea typeface="ＭＳ Ｐゴシック" charset="0"/>
+                <a:cs typeface="ＭＳ Ｐゴシック" charset="0"/>
+              </a:defRPr>
+            </a:lvl9pPr>
+          </a:lstStyle>
+          <a:p>
+            <a:r>
+              <a:rPr lang="en-US" dirty="0">
+                <a:latin typeface="FreightMicro Pro Book" panose="02000603020000020004" pitchFamily="2" charset="0"/>
               </a:rPr>
-              <a:t>Face Recognition Struggles to Recognize Us After Five Years of Aging </a:t>
-            </a:r>
-            <a:br>
-              <a:rPr lang="en-US" dirty="0">
-                <a:latin typeface="Open Sans" panose="020B0606030504020204" pitchFamily="34" charset="0"/>
-                <a:hlinkClick r:id="rId2"/>
-              </a:rPr>
-            </a:br>
-            <a:r>
-              <a:rPr lang="en-US" u="none" strike="noStrike" dirty="0">
-                <a:solidFill>
-                  <a:srgbClr val="030303"/>
-                </a:solidFill>
-                <a:effectLst/>
-                <a:latin typeface="Open Sans" panose="020B0606030504020204" pitchFamily="34" charset="0"/>
-                <a:hlinkClick r:id="rId2"/>
-              </a:rPr>
-              <a:t>New Scientist</a:t>
-            </a:r>
-            <a:br>
-              <a:rPr lang="en-US" u="none" strike="noStrike" dirty="0">
-                <a:solidFill>
-                  <a:srgbClr val="666666"/>
-                </a:solidFill>
-                <a:effectLst/>
-                <a:latin typeface="Open Sans" panose="020B0606030504020204" pitchFamily="34" charset="0"/>
-              </a:rPr>
-            </a:br>
-            <a:r>
-              <a:rPr lang="en-US" u="none" strike="noStrike" dirty="0">
-                <a:solidFill>
-                  <a:srgbClr val="666666"/>
-                </a:solidFill>
-                <a:effectLst/>
-                <a:latin typeface="Open Sans" panose="020B0606030504020204" pitchFamily="34" charset="0"/>
-              </a:rPr>
-              <a:t>Matthew Sparkes August 24, 2022</a:t>
-            </a:r>
-            <a:br>
-              <a:rPr lang="en-US" u="none" strike="noStrike" dirty="0">
-                <a:solidFill>
-                  <a:srgbClr val="030303"/>
-                </a:solidFill>
-                <a:effectLst/>
-                <a:latin typeface="Open Sans" panose="020B0606030504020204" pitchFamily="34" charset="0"/>
-              </a:rPr>
-            </a:br>
-            <a:br>
-              <a:rPr lang="en-US" u="none" strike="noStrike" dirty="0">
-                <a:solidFill>
-                  <a:srgbClr val="030303"/>
-                </a:solidFill>
-                <a:effectLst/>
-                <a:latin typeface="Open Sans" panose="020B0606030504020204" pitchFamily="34" charset="0"/>
-              </a:rPr>
-            </a:br>
-            <a:r>
-              <a:rPr lang="en-US" u="none" strike="noStrike" dirty="0">
-                <a:solidFill>
-                  <a:srgbClr val="000000"/>
-                </a:solidFill>
-                <a:effectLst/>
-                <a:latin typeface="Open Sans" panose="020B0606030504020204" pitchFamily="34" charset="0"/>
-              </a:rPr>
-              <a:t>A test designed by the Norwegian University of Science and Technology's Marcel Grimmer and colleagues found that facial recognition algorithms start running into difficulty identifying people after they have aged five years. The researchers used open-source alternatives to face recognition tools used by police and smartphone manufacturers, as well as artificial intelligence-generated images of 50,000 humans aged synthetically. Grimmer said the tools' accuracy declined continuously from the point the reference image was captured. The algorithms used to age faces synthetically from reference images also proved more effective when the target was between 20 and 40 years, compared to children and older adults. The implication is that new photos may be needed more often to maintain accuracy and security.</a:t>
-            </a:r>
-            <a:endParaRPr lang="en-US" dirty="0">
-              <a:latin typeface="Open Sans" panose="020B0606030504020204" pitchFamily="34" charset="0"/>
-            </a:endParaRPr>
-          </a:p>
-        </p:txBody>
-      </p:sp>
-      <p:pic>
-        <p:nvPicPr>
-          <p:cNvPr id="1026" name="Picture 2" descr="Ageing shown through a selection of photos">
-            <a:extLst>
-              <a:ext uri="{FF2B5EF4-FFF2-40B4-BE49-F238E27FC236}">
-                <a16:creationId xmlns:a16="http://schemas.microsoft.com/office/drawing/2014/main" id="{5C41B363-AB0A-5794-665C-3CBF9607FFA6}"/>
-              </a:ext>
-            </a:extLst>
-          </p:cNvPr>
-          <p:cNvPicPr>
-            <a:picLocks noChangeAspect="1" noChangeArrowheads="1"/>
-          </p:cNvPicPr>
-          <p:nvPr/>
-        </p:nvPicPr>
-        <p:blipFill>
-          <a:blip r:embed="rId3">
-            <a:extLst>
-              <a:ext uri="{28A0092B-C50C-407E-A947-70E740481C1C}">
-                <a14:useLocalDpi xmlns:a14="http://schemas.microsoft.com/office/drawing/2010/main" val="0"/>
-              </a:ext>
-            </a:extLst>
-          </a:blip>
-          <a:srcRect/>
-          <a:stretch>
-            <a:fillRect/>
-          </a:stretch>
-        </p:blipFill>
-        <p:spPr bwMode="auto">
-          <a:xfrm>
-            <a:off x="7289833" y="998631"/>
-            <a:ext cx="4444967" cy="2963769"/>
-          </a:xfrm>
-          <a:prstGeom prst="rect">
-            <a:avLst/>
-          </a:prstGeom>
-          <a:noFill/>
-          <a:extLst>
-            <a:ext uri="{909E8E84-426E-40DD-AFC4-6F175D3DCCD1}">
-              <a14:hiddenFill xmlns:a14="http://schemas.microsoft.com/office/drawing/2010/main">
-                <a:solidFill>
-                  <a:srgbClr val="FFFFFF"/>
-                </a:solidFill>
-              </a14:hiddenFill>
-            </a:ext>
-          </a:extLst>
-        </p:spPr>
-      </p:pic>
+              <a:t>Michael Ball | UC Berkeley | https://c88c.org | © CC BY-NC-SA</a:t>
+            </a:r>
+          </a:p>
+        </p:txBody>
+      </p:sp>
     </p:spTree>
     <p:extLst>
       <p:ext uri="{BB962C8B-B14F-4D97-AF65-F5344CB8AC3E}">
-        <p14:creationId xmlns:p14="http://schemas.microsoft.com/office/powerpoint/2010/main" val="2890302287"/>
+        <p14:creationId xmlns:p14="http://schemas.microsoft.com/office/powerpoint/2010/main" val="2979499085"/>
       </p:ext>
     </p:extLst>
   </p:cSld>
@@ -14430,6 +15105,108 @@
       </p:grpSpPr>
       <p:sp>
         <p:nvSpPr>
+          <p:cNvPr id="7" name="Title 6">
+            <a:extLst>
+              <a:ext uri="{FF2B5EF4-FFF2-40B4-BE49-F238E27FC236}">
+                <a16:creationId xmlns:a16="http://schemas.microsoft.com/office/drawing/2014/main" id="{174F684A-21F3-5E4C-BD4A-9318C588BC15}"/>
+              </a:ext>
+            </a:extLst>
+          </p:cNvPr>
+          <p:cNvSpPr>
+            <a:spLocks noGrp="1"/>
+          </p:cNvSpPr>
+          <p:nvPr>
+            <p:ph type="ctrTitle"/>
+          </p:nvPr>
+        </p:nvSpPr>
+        <p:spPr/>
+        <p:txBody>
+          <a:bodyPr/>
+          <a:lstStyle/>
+          <a:p>
+            <a:r>
+              <a:rPr lang="en-US" dirty="0"/>
+              <a:t>Iteration with </a:t>
+            </a:r>
+            <a:r>
+              <a:rPr lang="en-US" dirty="0">
+                <a:latin typeface="Source Code Pro Medium" panose="020B0309030403020204" pitchFamily="34" charset="0"/>
+                <a:ea typeface="Source Code Pro Medium" panose="020B0309030403020204" pitchFamily="34" charset="0"/>
+              </a:rPr>
+              <a:t>while</a:t>
+            </a:r>
+            <a:r>
+              <a:rPr lang="en-US" dirty="0"/>
+              <a:t> Loops</a:t>
+            </a:r>
+          </a:p>
+        </p:txBody>
+      </p:sp>
+      <p:sp>
+        <p:nvSpPr>
+          <p:cNvPr id="3" name="Subtitle 2">
+            <a:extLst>
+              <a:ext uri="{FF2B5EF4-FFF2-40B4-BE49-F238E27FC236}">
+                <a16:creationId xmlns:a16="http://schemas.microsoft.com/office/drawing/2014/main" id="{B4F9E437-03C2-60B8-5DD5-84B18C53E757}"/>
+              </a:ext>
+            </a:extLst>
+          </p:cNvPr>
+          <p:cNvSpPr>
+            <a:spLocks noGrp="1"/>
+          </p:cNvSpPr>
+          <p:nvPr>
+            <p:ph type="subTitle" idx="1"/>
+          </p:nvPr>
+        </p:nvSpPr>
+        <p:spPr/>
+        <p:txBody>
+          <a:bodyPr/>
+          <a:lstStyle/>
+          <a:p>
+            <a:endParaRPr lang="en-US"/>
+          </a:p>
+        </p:txBody>
+      </p:sp>
+    </p:spTree>
+    <p:extLst>
+      <p:ext uri="{BB962C8B-B14F-4D97-AF65-F5344CB8AC3E}">
+        <p14:creationId xmlns:p14="http://schemas.microsoft.com/office/powerpoint/2010/main" val="65676127"/>
+      </p:ext>
+    </p:extLst>
+  </p:cSld>
+  <p:clrMapOvr>
+    <a:masterClrMapping/>
+  </p:clrMapOvr>
+  <mc:AlternateContent xmlns:mc="http://schemas.openxmlformats.org/markup-compatibility/2006" xmlns:p14="http://schemas.microsoft.com/office/powerpoint/2010/main">
+    <mc:Choice Requires="p14">
+      <p:transition spd="slow" p14:dur="2000" advTm="109658"/>
+    </mc:Choice>
+    <mc:Fallback xmlns="">
+      <p:transition xmlns:p14="http://schemas.microsoft.com/office/powerpoint/2010/main" spd="slow" advTm="109658"/>
+    </mc:Fallback>
+  </mc:AlternateContent>
+</p:sld>
+</file>
+
+<file path=ppt/slides/slide21.xml><?xml version="1.0" encoding="utf-8"?>
+<p:sld xmlns:a="http://schemas.openxmlformats.org/drawingml/2006/main" xmlns:r="http://schemas.openxmlformats.org/officeDocument/2006/relationships" xmlns:p="http://schemas.openxmlformats.org/presentationml/2006/main">
+  <p:cSld>
+    <p:spTree>
+      <p:nvGrpSpPr>
+        <p:cNvPr id="1" name=""/>
+        <p:cNvGrpSpPr/>
+        <p:nvPr/>
+      </p:nvGrpSpPr>
+      <p:grpSpPr>
+        <a:xfrm>
+          <a:off x="0" y="0"/>
+          <a:ext cx="0" cy="0"/>
+          <a:chOff x="0" y="0"/>
+          <a:chExt cx="0" cy="0"/>
+        </a:xfrm>
+      </p:grpSpPr>
+      <p:sp>
+        <p:nvSpPr>
           <p:cNvPr id="2" name="Title 1">
             <a:extLst>
               <a:ext uri="{FF2B5EF4-FFF2-40B4-BE49-F238E27FC236}">
@@ -14663,7 +15440,7 @@
 </p:sld>
 </file>
 
-<file path=ppt/slides/slide21.xml><?xml version="1.0" encoding="utf-8"?>
+<file path=ppt/slides/slide22.xml><?xml version="1.0" encoding="utf-8"?>
 <p:sld xmlns:a="http://schemas.openxmlformats.org/drawingml/2006/main" xmlns:r="http://schemas.openxmlformats.org/officeDocument/2006/relationships" xmlns:p="http://schemas.openxmlformats.org/presentationml/2006/main">
   <p:cSld>
     <p:spTree>
@@ -14988,7 +15765,7 @@
 </p:sld>
 </file>
 
-<file path=ppt/slides/slide22.xml><?xml version="1.0" encoding="utf-8"?>
+<file path=ppt/slides/slide23.xml><?xml version="1.0" encoding="utf-8"?>
 <p:sld xmlns:a="http://schemas.openxmlformats.org/drawingml/2006/main" xmlns:r="http://schemas.openxmlformats.org/officeDocument/2006/relationships" xmlns:p="http://schemas.openxmlformats.org/presentationml/2006/main">
   <p:cSld>
     <p:spTree>
@@ -15311,7 +16088,7 @@
 </p:sld>
 </file>
 
-<file path=ppt/slides/slide23.xml><?xml version="1.0" encoding="utf-8"?>
+<file path=ppt/slides/slide24.xml><?xml version="1.0" encoding="utf-8"?>
 <p:sld xmlns:a="http://schemas.openxmlformats.org/drawingml/2006/main" xmlns:r="http://schemas.openxmlformats.org/officeDocument/2006/relationships" xmlns:p="http://schemas.openxmlformats.org/presentationml/2006/main" show="0">
   <p:cSld>
     <p:spTree>
@@ -15421,7 +16198,7 @@
 </p:sld>
 </file>
 
-<file path=ppt/slides/slide24.xml><?xml version="1.0" encoding="utf-8"?>
+<file path=ppt/slides/slide25.xml><?xml version="1.0" encoding="utf-8"?>
 <p:sld xmlns:a="http://schemas.openxmlformats.org/drawingml/2006/main" xmlns:r="http://schemas.openxmlformats.org/officeDocument/2006/relationships" xmlns:p="http://schemas.openxmlformats.org/presentationml/2006/main" show="0">
   <p:cSld>
     <p:spTree>
@@ -15533,7 +16310,7 @@
               <a:pPr>
                 <a:defRPr/>
               </a:pPr>
-              <a:t>24</a:t>
+              <a:t>25</a:t>
             </a:fld>
             <a:endParaRPr lang="en-US" dirty="0">
               <a:latin typeface="Open Sans" panose="020B0606030504020204" pitchFamily="34" charset="0"/>
@@ -15554,7 +16331,7 @@
 </p:sld>
 </file>
 
-<file path=ppt/slides/slide25.xml><?xml version="1.0" encoding="utf-8"?>
+<file path=ppt/slides/slide26.xml><?xml version="1.0" encoding="utf-8"?>
 <p:sld xmlns:a="http://schemas.openxmlformats.org/drawingml/2006/main" xmlns:r="http://schemas.openxmlformats.org/officeDocument/2006/relationships" xmlns:p="http://schemas.openxmlformats.org/presentationml/2006/main" show="0">
   <p:cSld>
     <p:spTree>
@@ -15675,7 +16452,7 @@
 </p:sld>
 </file>
 
-<file path=ppt/slides/slide26.xml><?xml version="1.0" encoding="utf-8"?>
+<file path=ppt/slides/slide27.xml><?xml version="1.0" encoding="utf-8"?>
 <p:sld xmlns:a="http://schemas.openxmlformats.org/drawingml/2006/main" xmlns:r="http://schemas.openxmlformats.org/officeDocument/2006/relationships" xmlns:p="http://schemas.openxmlformats.org/presentationml/2006/main" show="0">
   <p:cSld>
     <p:spTree>
@@ -16183,7 +16960,7 @@
 </p:sld>
 </file>
 
-<file path=ppt/slides/slide27.xml><?xml version="1.0" encoding="utf-8"?>
+<file path=ppt/slides/slide28.xml><?xml version="1.0" encoding="utf-8"?>
 <p:sld xmlns:a="http://schemas.openxmlformats.org/drawingml/2006/main" xmlns:r="http://schemas.openxmlformats.org/officeDocument/2006/relationships" xmlns:p="http://schemas.openxmlformats.org/presentationml/2006/main" show="0">
   <p:cSld>
     <p:spTree>
@@ -16778,7 +17555,7 @@
 </p:sld>
 </file>
 
-<file path=ppt/slides/slide28.xml><?xml version="1.0" encoding="utf-8"?>
+<file path=ppt/slides/slide29.xml><?xml version="1.0" encoding="utf-8"?>
 <p:sld xmlns:a="http://schemas.openxmlformats.org/drawingml/2006/main" xmlns:r="http://schemas.openxmlformats.org/officeDocument/2006/relationships" xmlns:p="http://schemas.openxmlformats.org/presentationml/2006/main" show="0">
   <p:cSld>
     <p:spTree>
@@ -16921,108 +17698,6 @@
   <p:clrMapOvr>
     <a:masterClrMapping/>
   </p:clrMapOvr>
-</p:sld>
-</file>
-
-<file path=ppt/slides/slide29.xml><?xml version="1.0" encoding="utf-8"?>
-<p:sld xmlns:a="http://schemas.openxmlformats.org/drawingml/2006/main" xmlns:r="http://schemas.openxmlformats.org/officeDocument/2006/relationships" xmlns:p="http://schemas.openxmlformats.org/presentationml/2006/main">
-  <p:cSld>
-    <p:spTree>
-      <p:nvGrpSpPr>
-        <p:cNvPr id="1" name=""/>
-        <p:cNvGrpSpPr/>
-        <p:nvPr/>
-      </p:nvGrpSpPr>
-      <p:grpSpPr>
-        <a:xfrm>
-          <a:off x="0" y="0"/>
-          <a:ext cx="0" cy="0"/>
-          <a:chOff x="0" y="0"/>
-          <a:chExt cx="0" cy="0"/>
-        </a:xfrm>
-      </p:grpSpPr>
-      <p:sp>
-        <p:nvSpPr>
-          <p:cNvPr id="7" name="Title 6">
-            <a:extLst>
-              <a:ext uri="{FF2B5EF4-FFF2-40B4-BE49-F238E27FC236}">
-                <a16:creationId xmlns:a16="http://schemas.microsoft.com/office/drawing/2014/main" id="{174F684A-21F3-5E4C-BD4A-9318C588BC15}"/>
-              </a:ext>
-            </a:extLst>
-          </p:cNvPr>
-          <p:cNvSpPr>
-            <a:spLocks noGrp="1"/>
-          </p:cNvSpPr>
-          <p:nvPr>
-            <p:ph type="ctrTitle"/>
-          </p:nvPr>
-        </p:nvSpPr>
-        <p:spPr/>
-        <p:txBody>
-          <a:bodyPr/>
-          <a:lstStyle/>
-          <a:p>
-            <a:r>
-              <a:rPr lang="en-US" dirty="0"/>
-              <a:t>Iteration With </a:t>
-            </a:r>
-            <a:r>
-              <a:rPr lang="en-US" dirty="0">
-                <a:latin typeface="Source Code Pro Medium" panose="020B0309030403020204" pitchFamily="34" charset="0"/>
-                <a:ea typeface="Source Code Pro Medium" panose="020B0309030403020204" pitchFamily="34" charset="0"/>
-              </a:rPr>
-              <a:t>for</a:t>
-            </a:r>
-            <a:r>
-              <a:rPr lang="en-US" dirty="0"/>
-              <a:t> Loops</a:t>
-            </a:r>
-          </a:p>
-        </p:txBody>
-      </p:sp>
-      <p:sp>
-        <p:nvSpPr>
-          <p:cNvPr id="3" name="Subtitle 2">
-            <a:extLst>
-              <a:ext uri="{FF2B5EF4-FFF2-40B4-BE49-F238E27FC236}">
-                <a16:creationId xmlns:a16="http://schemas.microsoft.com/office/drawing/2014/main" id="{B0EA2332-D95F-E70E-121E-8A74AE69E597}"/>
-              </a:ext>
-            </a:extLst>
-          </p:cNvPr>
-          <p:cNvSpPr>
-            <a:spLocks noGrp="1"/>
-          </p:cNvSpPr>
-          <p:nvPr>
-            <p:ph type="subTitle" idx="1"/>
-          </p:nvPr>
-        </p:nvSpPr>
-        <p:spPr/>
-        <p:txBody>
-          <a:bodyPr/>
-          <a:lstStyle/>
-          <a:p>
-            <a:endParaRPr lang="en-US" dirty="0"/>
-          </a:p>
-        </p:txBody>
-      </p:sp>
-    </p:spTree>
-    <p:extLst>
-      <p:ext uri="{BB962C8B-B14F-4D97-AF65-F5344CB8AC3E}">
-        <p14:creationId xmlns:p14="http://schemas.microsoft.com/office/powerpoint/2010/main" val="772134139"/>
-      </p:ext>
-    </p:extLst>
-  </p:cSld>
-  <p:clrMapOvr>
-    <a:masterClrMapping/>
-  </p:clrMapOvr>
-  <mc:AlternateContent xmlns:mc="http://schemas.openxmlformats.org/markup-compatibility/2006" xmlns:p14="http://schemas.microsoft.com/office/powerpoint/2010/main">
-    <mc:Choice Requires="p14">
-      <p:transition spd="slow" p14:dur="2000" advTm="109658"/>
-    </mc:Choice>
-    <mc:Fallback xmlns="">
-      <p:transition xmlns:p14="http://schemas.microsoft.com/office/powerpoint/2010/main" spd="slow" advTm="109658"/>
-    </mc:Fallback>
-  </mc:AlternateContent>
 </p:sld>
 </file>
 
@@ -17045,10 +17720,10 @@
       </p:grpSpPr>
       <p:sp>
         <p:nvSpPr>
-          <p:cNvPr id="2" name="Title 1">
+          <p:cNvPr id="8" name="Title 7">
             <a:extLst>
               <a:ext uri="{FF2B5EF4-FFF2-40B4-BE49-F238E27FC236}">
-                <a16:creationId xmlns:a16="http://schemas.microsoft.com/office/drawing/2014/main" id="{2332C5B2-9DFD-C1DD-1E07-71BD0B221807}"/>
+                <a16:creationId xmlns:a16="http://schemas.microsoft.com/office/drawing/2014/main" id="{FABE0329-6EA1-B94F-AAEB-606C678EE9CD}"/>
               </a:ext>
             </a:extLst>
           </p:cNvPr>
@@ -17056,7 +17731,7 @@
             <a:spLocks noGrp="1"/>
           </p:cNvSpPr>
           <p:nvPr>
-            <p:ph type="title"/>
+            <p:ph type="ctrTitle"/>
           </p:nvPr>
         </p:nvSpPr>
         <p:spPr/>
@@ -17066,17 +17741,17 @@
           <a:p>
             <a:r>
               <a:rPr lang="en-US" dirty="0"/>
-              <a:t>Announcements</a:t>
-            </a:r>
-          </a:p>
-        </p:txBody>
-      </p:sp>
-      <p:sp>
-        <p:nvSpPr>
-          <p:cNvPr id="3" name="Content Placeholder 2">
+              <a:t>Learning Process &amp; Debugging</a:t>
+            </a:r>
+          </a:p>
+        </p:txBody>
+      </p:sp>
+      <p:sp>
+        <p:nvSpPr>
+          <p:cNvPr id="4" name="Subtitle 3">
             <a:extLst>
               <a:ext uri="{FF2B5EF4-FFF2-40B4-BE49-F238E27FC236}">
-                <a16:creationId xmlns:a16="http://schemas.microsoft.com/office/drawing/2014/main" id="{2C0B2E46-66D3-D6B7-5E34-7D5FAC92D8D9}"/>
+                <a16:creationId xmlns:a16="http://schemas.microsoft.com/office/drawing/2014/main" id="{1A8EC98B-92C8-C2EB-38CB-111FD38F001E}"/>
               </a:ext>
             </a:extLst>
           </p:cNvPr>
@@ -17084,7 +17759,7 @@
             <a:spLocks noGrp="1"/>
           </p:cNvSpPr>
           <p:nvPr>
-            <p:ph idx="1"/>
+            <p:ph type="subTitle" idx="1"/>
           </p:nvPr>
         </p:nvSpPr>
         <p:spPr/>
@@ -17092,241 +17767,14 @@
           <a:bodyPr/>
           <a:lstStyle/>
           <a:p>
-            <a:r>
-              <a:rPr lang="en-US" dirty="0"/>
-              <a:t> Sorry about </a:t>
-            </a:r>
-            <a:r>
-              <a:rPr lang="en-US" dirty="0" err="1"/>
-              <a:t>autograder</a:t>
-            </a:r>
-            <a:r>
-              <a:rPr lang="en-US" dirty="0"/>
-              <a:t> confusion!</a:t>
-            </a:r>
-          </a:p>
-          <a:p>
-            <a:pPr lvl="1"/>
-            <a:r>
-              <a:rPr lang="en-US" dirty="0"/>
-              <a:t> Labs are based primarily on </a:t>
-            </a:r>
-            <a:r>
-              <a:rPr lang="en-US" b="1" dirty="0"/>
-              <a:t>effort.</a:t>
-            </a:r>
-          </a:p>
-          <a:p>
-            <a:pPr lvl="2"/>
-            <a:r>
-              <a:rPr lang="en-US" dirty="0"/>
-              <a:t>You only need to earn 2/4 to get full credit.</a:t>
-            </a:r>
-          </a:p>
-          <a:p>
-            <a:pPr lvl="2"/>
-            <a:r>
-              <a:rPr lang="en-US" dirty="0"/>
-              <a:t> You still need to get </a:t>
-            </a:r>
-            <a:r>
-              <a:rPr lang="en-US" i="1" dirty="0"/>
-              <a:t>something</a:t>
-            </a:r>
-            <a:r>
-              <a:rPr lang="en-US" dirty="0"/>
-              <a:t> correct. </a:t>
-            </a:r>
-          </a:p>
-          <a:p>
-            <a:r>
-              <a:rPr lang="en-US" dirty="0"/>
-              <a:t> HW is on correctness.</a:t>
-            </a:r>
-          </a:p>
-          <a:p>
-            <a:pPr lvl="1"/>
-            <a:r>
-              <a:rPr lang="en-US" dirty="0"/>
-              <a:t> HW1 was released a little early by accident. </a:t>
-            </a:r>
-            <a:r>
-              <a:rPr lang="en-US" dirty="0">
-                <a:sym typeface="Wingdings" pitchFamily="2" charset="2"/>
-              </a:rPr>
-              <a:t> Please re-download.</a:t>
-            </a:r>
-            <a:r>
-              <a:rPr lang="en-US" dirty="0"/>
-              <a:t> based</a:t>
-            </a:r>
-          </a:p>
-        </p:txBody>
-      </p:sp>
-      <p:sp>
-        <p:nvSpPr>
-          <p:cNvPr id="7" name="Footer Placeholder 2">
-            <a:extLst>
-              <a:ext uri="{FF2B5EF4-FFF2-40B4-BE49-F238E27FC236}">
-                <a16:creationId xmlns:a16="http://schemas.microsoft.com/office/drawing/2014/main" id="{9819B794-74DD-51B5-991B-D31FCC029792}"/>
-              </a:ext>
-            </a:extLst>
-          </p:cNvPr>
-          <p:cNvSpPr txBox="1">
-            <a:spLocks/>
-          </p:cNvSpPr>
-          <p:nvPr/>
-        </p:nvSpPr>
-        <p:spPr>
-          <a:xfrm>
-            <a:off x="4038600" y="6356350"/>
-            <a:ext cx="4953000" cy="365125"/>
-          </a:xfrm>
-          <a:prstGeom prst="rect">
-            <a:avLst/>
-          </a:prstGeom>
-        </p:spPr>
-        <p:txBody>
-          <a:bodyPr vert="horz" lIns="91440" tIns="45720" rIns="91440" bIns="45720" rtlCol="0" anchor="ctr"/>
-          <a:lstStyle>
-            <a:defPPr>
-              <a:defRPr lang="en-US"/>
-            </a:defPPr>
-            <a:lvl1pPr algn="ctr" rtl="0" eaLnBrk="0" fontAlgn="base" hangingPunct="0">
-              <a:spcBef>
-                <a:spcPct val="0"/>
-              </a:spcBef>
-              <a:spcAft>
-                <a:spcPct val="0"/>
-              </a:spcAft>
-              <a:defRPr sz="1200" kern="1200">
-                <a:solidFill>
-                  <a:schemeClr val="accent3"/>
-                </a:solidFill>
-                <a:latin typeface="Arial" charset="0"/>
-                <a:ea typeface="ＭＳ Ｐゴシック" charset="0"/>
-                <a:cs typeface="ＭＳ Ｐゴシック" charset="0"/>
-              </a:defRPr>
-            </a:lvl1pPr>
-            <a:lvl2pPr marL="457200" algn="l" rtl="0" eaLnBrk="0" fontAlgn="base" hangingPunct="0">
-              <a:spcBef>
-                <a:spcPct val="0"/>
-              </a:spcBef>
-              <a:spcAft>
-                <a:spcPct val="0"/>
-              </a:spcAft>
-              <a:defRPr kern="1200">
-                <a:solidFill>
-                  <a:schemeClr val="tx1"/>
-                </a:solidFill>
-                <a:latin typeface="Arial" charset="0"/>
-                <a:ea typeface="ＭＳ Ｐゴシック" charset="0"/>
-                <a:cs typeface="ＭＳ Ｐゴシック" charset="0"/>
-              </a:defRPr>
-            </a:lvl2pPr>
-            <a:lvl3pPr marL="914400" algn="l" rtl="0" eaLnBrk="0" fontAlgn="base" hangingPunct="0">
-              <a:spcBef>
-                <a:spcPct val="0"/>
-              </a:spcBef>
-              <a:spcAft>
-                <a:spcPct val="0"/>
-              </a:spcAft>
-              <a:defRPr kern="1200">
-                <a:solidFill>
-                  <a:schemeClr val="tx1"/>
-                </a:solidFill>
-                <a:latin typeface="Arial" charset="0"/>
-                <a:ea typeface="ＭＳ Ｐゴシック" charset="0"/>
-                <a:cs typeface="ＭＳ Ｐゴシック" charset="0"/>
-              </a:defRPr>
-            </a:lvl3pPr>
-            <a:lvl4pPr marL="1371600" algn="l" rtl="0" eaLnBrk="0" fontAlgn="base" hangingPunct="0">
-              <a:spcBef>
-                <a:spcPct val="0"/>
-              </a:spcBef>
-              <a:spcAft>
-                <a:spcPct val="0"/>
-              </a:spcAft>
-              <a:defRPr kern="1200">
-                <a:solidFill>
-                  <a:schemeClr val="tx1"/>
-                </a:solidFill>
-                <a:latin typeface="Arial" charset="0"/>
-                <a:ea typeface="ＭＳ Ｐゴシック" charset="0"/>
-                <a:cs typeface="ＭＳ Ｐゴシック" charset="0"/>
-              </a:defRPr>
-            </a:lvl4pPr>
-            <a:lvl5pPr marL="1828800" algn="l" rtl="0" eaLnBrk="0" fontAlgn="base" hangingPunct="0">
-              <a:spcBef>
-                <a:spcPct val="0"/>
-              </a:spcBef>
-              <a:spcAft>
-                <a:spcPct val="0"/>
-              </a:spcAft>
-              <a:defRPr kern="1200">
-                <a:solidFill>
-                  <a:schemeClr val="tx1"/>
-                </a:solidFill>
-                <a:latin typeface="Arial" charset="0"/>
-                <a:ea typeface="ＭＳ Ｐゴシック" charset="0"/>
-                <a:cs typeface="ＭＳ Ｐゴシック" charset="0"/>
-              </a:defRPr>
-            </a:lvl5pPr>
-            <a:lvl6pPr marL="2286000" algn="l" defTabSz="457200" rtl="0" eaLnBrk="1" latinLnBrk="0" hangingPunct="1">
-              <a:defRPr kern="1200">
-                <a:solidFill>
-                  <a:schemeClr val="tx1"/>
-                </a:solidFill>
-                <a:latin typeface="Arial" charset="0"/>
-                <a:ea typeface="ＭＳ Ｐゴシック" charset="0"/>
-                <a:cs typeface="ＭＳ Ｐゴシック" charset="0"/>
-              </a:defRPr>
-            </a:lvl6pPr>
-            <a:lvl7pPr marL="2743200" algn="l" defTabSz="457200" rtl="0" eaLnBrk="1" latinLnBrk="0" hangingPunct="1">
-              <a:defRPr kern="1200">
-                <a:solidFill>
-                  <a:schemeClr val="tx1"/>
-                </a:solidFill>
-                <a:latin typeface="Arial" charset="0"/>
-                <a:ea typeface="ＭＳ Ｐゴシック" charset="0"/>
-                <a:cs typeface="ＭＳ Ｐゴシック" charset="0"/>
-              </a:defRPr>
-            </a:lvl7pPr>
-            <a:lvl8pPr marL="3200400" algn="l" defTabSz="457200" rtl="0" eaLnBrk="1" latinLnBrk="0" hangingPunct="1">
-              <a:defRPr kern="1200">
-                <a:solidFill>
-                  <a:schemeClr val="tx1"/>
-                </a:solidFill>
-                <a:latin typeface="Arial" charset="0"/>
-                <a:ea typeface="ＭＳ Ｐゴシック" charset="0"/>
-                <a:cs typeface="ＭＳ Ｐゴシック" charset="0"/>
-              </a:defRPr>
-            </a:lvl8pPr>
-            <a:lvl9pPr marL="3657600" algn="l" defTabSz="457200" rtl="0" eaLnBrk="1" latinLnBrk="0" hangingPunct="1">
-              <a:defRPr kern="1200">
-                <a:solidFill>
-                  <a:schemeClr val="tx1"/>
-                </a:solidFill>
-                <a:latin typeface="Arial" charset="0"/>
-                <a:ea typeface="ＭＳ Ｐゴシック" charset="0"/>
-                <a:cs typeface="ＭＳ Ｐゴシック" charset="0"/>
-              </a:defRPr>
-            </a:lvl9pPr>
-          </a:lstStyle>
-          <a:p>
-            <a:r>
-              <a:rPr lang="en-US" dirty="0">
-                <a:latin typeface="FreightMicro Pro Book" panose="02000603020000020004" pitchFamily="2" charset="0"/>
-              </a:rPr>
-              <a:t>Michael Ball | UC Berkeley | https://c88c.org | © CC BY-NC-SA</a:t>
-            </a:r>
+            <a:endParaRPr lang="en-US"/>
           </a:p>
         </p:txBody>
       </p:sp>
     </p:spTree>
     <p:extLst>
       <p:ext uri="{BB962C8B-B14F-4D97-AF65-F5344CB8AC3E}">
-        <p14:creationId xmlns:p14="http://schemas.microsoft.com/office/powerpoint/2010/main" val="2979499085"/>
+        <p14:creationId xmlns:p14="http://schemas.microsoft.com/office/powerpoint/2010/main" val="2999003581"/>
       </p:ext>
     </p:extLst>
   </p:cSld>
@@ -17355,6 +17803,108 @@
       </p:grpSpPr>
       <p:sp>
         <p:nvSpPr>
+          <p:cNvPr id="7" name="Title 6">
+            <a:extLst>
+              <a:ext uri="{FF2B5EF4-FFF2-40B4-BE49-F238E27FC236}">
+                <a16:creationId xmlns:a16="http://schemas.microsoft.com/office/drawing/2014/main" id="{174F684A-21F3-5E4C-BD4A-9318C588BC15}"/>
+              </a:ext>
+            </a:extLst>
+          </p:cNvPr>
+          <p:cNvSpPr>
+            <a:spLocks noGrp="1"/>
+          </p:cNvSpPr>
+          <p:nvPr>
+            <p:ph type="ctrTitle"/>
+          </p:nvPr>
+        </p:nvSpPr>
+        <p:spPr/>
+        <p:txBody>
+          <a:bodyPr/>
+          <a:lstStyle/>
+          <a:p>
+            <a:r>
+              <a:rPr lang="en-US" dirty="0"/>
+              <a:t>Iteration With </a:t>
+            </a:r>
+            <a:r>
+              <a:rPr lang="en-US" dirty="0">
+                <a:latin typeface="Source Code Pro Medium" panose="020B0309030403020204" pitchFamily="34" charset="0"/>
+                <a:ea typeface="Source Code Pro Medium" panose="020B0309030403020204" pitchFamily="34" charset="0"/>
+              </a:rPr>
+              <a:t>for</a:t>
+            </a:r>
+            <a:r>
+              <a:rPr lang="en-US" dirty="0"/>
+              <a:t> Loops</a:t>
+            </a:r>
+          </a:p>
+        </p:txBody>
+      </p:sp>
+      <p:sp>
+        <p:nvSpPr>
+          <p:cNvPr id="3" name="Subtitle 2">
+            <a:extLst>
+              <a:ext uri="{FF2B5EF4-FFF2-40B4-BE49-F238E27FC236}">
+                <a16:creationId xmlns:a16="http://schemas.microsoft.com/office/drawing/2014/main" id="{B0EA2332-D95F-E70E-121E-8A74AE69E597}"/>
+              </a:ext>
+            </a:extLst>
+          </p:cNvPr>
+          <p:cNvSpPr>
+            <a:spLocks noGrp="1"/>
+          </p:cNvSpPr>
+          <p:nvPr>
+            <p:ph type="subTitle" idx="1"/>
+          </p:nvPr>
+        </p:nvSpPr>
+        <p:spPr/>
+        <p:txBody>
+          <a:bodyPr/>
+          <a:lstStyle/>
+          <a:p>
+            <a:endParaRPr lang="en-US" dirty="0"/>
+          </a:p>
+        </p:txBody>
+      </p:sp>
+    </p:spTree>
+    <p:extLst>
+      <p:ext uri="{BB962C8B-B14F-4D97-AF65-F5344CB8AC3E}">
+        <p14:creationId xmlns:p14="http://schemas.microsoft.com/office/powerpoint/2010/main" val="772134139"/>
+      </p:ext>
+    </p:extLst>
+  </p:cSld>
+  <p:clrMapOvr>
+    <a:masterClrMapping/>
+  </p:clrMapOvr>
+  <mc:AlternateContent xmlns:mc="http://schemas.openxmlformats.org/markup-compatibility/2006" xmlns:p14="http://schemas.microsoft.com/office/powerpoint/2010/main">
+    <mc:Choice Requires="p14">
+      <p:transition spd="slow" p14:dur="2000" advTm="109658"/>
+    </mc:Choice>
+    <mc:Fallback xmlns="">
+      <p:transition xmlns:p14="http://schemas.microsoft.com/office/powerpoint/2010/main" spd="slow" advTm="109658"/>
+    </mc:Fallback>
+  </mc:AlternateContent>
+</p:sld>
+</file>
+
+<file path=ppt/slides/slide31.xml><?xml version="1.0" encoding="utf-8"?>
+<p:sld xmlns:a="http://schemas.openxmlformats.org/drawingml/2006/main" xmlns:r="http://schemas.openxmlformats.org/officeDocument/2006/relationships" xmlns:p="http://schemas.openxmlformats.org/presentationml/2006/main">
+  <p:cSld>
+    <p:spTree>
+      <p:nvGrpSpPr>
+        <p:cNvPr id="1" name=""/>
+        <p:cNvGrpSpPr/>
+        <p:nvPr/>
+      </p:nvGrpSpPr>
+      <p:grpSpPr>
+        <a:xfrm>
+          <a:off x="0" y="0"/>
+          <a:ext cx="0" cy="0"/>
+          <a:chOff x="0" y="0"/>
+          <a:chExt cx="0" cy="0"/>
+        </a:xfrm>
+      </p:grpSpPr>
+      <p:sp>
+        <p:nvSpPr>
           <p:cNvPr id="2" name="Title 1">
             <a:extLst>
               <a:ext uri="{FF2B5EF4-FFF2-40B4-BE49-F238E27FC236}">
@@ -17594,7 +18144,7 @@
 </p:sld>
 </file>
 
-<file path=ppt/slides/slide31.xml><?xml version="1.0" encoding="utf-8"?>
+<file path=ppt/slides/slide32.xml><?xml version="1.0" encoding="utf-8"?>
 <p:sld xmlns:a="http://schemas.openxmlformats.org/drawingml/2006/main" xmlns:r="http://schemas.openxmlformats.org/officeDocument/2006/relationships" xmlns:p="http://schemas.openxmlformats.org/presentationml/2006/main">
   <p:cSld>
     <p:spTree>
@@ -17939,7 +18489,7 @@
 </p:sld>
 </file>
 
-<file path=ppt/slides/slide32.xml><?xml version="1.0" encoding="utf-8"?>
+<file path=ppt/slides/slide33.xml><?xml version="1.0" encoding="utf-8"?>
 <p:sld xmlns:a="http://schemas.openxmlformats.org/drawingml/2006/main" xmlns:r="http://schemas.openxmlformats.org/officeDocument/2006/relationships" xmlns:p="http://schemas.openxmlformats.org/presentationml/2006/main">
   <p:cSld>
     <p:spTree>
@@ -18283,7 +18833,7 @@
 </p:sld>
 </file>
 
-<file path=ppt/slides/slide33.xml><?xml version="1.0" encoding="utf-8"?>
+<file path=ppt/slides/slide34.xml><?xml version="1.0" encoding="utf-8"?>
 <p:sld xmlns:a="http://schemas.openxmlformats.org/drawingml/2006/main" xmlns:r="http://schemas.openxmlformats.org/officeDocument/2006/relationships" xmlns:p="http://schemas.openxmlformats.org/presentationml/2006/main">
   <p:cSld>
     <p:spTree>
@@ -18919,7 +19469,7 @@
           <a:p>
             <a:r>
               <a:rPr lang="en-US" dirty="0"/>
-              <a:t>Python: Definitions and Control</a:t>
+              <a:t>Python: Definition</a:t>
             </a:r>
           </a:p>
         </p:txBody>
@@ -18945,7 +19495,7 @@
           <a:bodyPr/>
           <a:lstStyle/>
           <a:p>
-            <a:endParaRPr lang="en-US"/>
+            <a:endParaRPr lang="en-US" dirty="0"/>
           </a:p>
         </p:txBody>
       </p:sp>
@@ -19291,7 +19841,7 @@
         <p:spPr>
           <a:xfrm>
             <a:off x="381000" y="1066800"/>
-            <a:ext cx="9753600" cy="5257800"/>
+            <a:ext cx="11811000" cy="5257800"/>
           </a:xfrm>
         </p:spPr>
         <p:txBody>
@@ -19304,11 +19854,11 @@
               </a:tabLst>
             </a:pPr>
             <a:r>
-              <a:rPr lang="en-US" b="1" dirty="0"/>
+              <a:rPr lang="en-US" dirty="0"/>
               <a:t>Expression	</a:t>
             </a:r>
             <a:r>
-              <a:rPr lang="en-US" b="1" dirty="0">
+              <a:rPr lang="en-US" dirty="0">
                 <a:latin typeface="Courier New"/>
                 <a:cs typeface="Courier New"/>
               </a:rPr>
@@ -19322,15 +19872,15 @@
               </a:tabLst>
             </a:pPr>
             <a:r>
-              <a:rPr lang="en-US" b="1" i="1" dirty="0"/>
+              <a:rPr lang="en-US" i="1" dirty="0"/>
               <a:t>Call</a:t>
             </a:r>
             <a:r>
-              <a:rPr lang="en-US" b="1" dirty="0"/>
+              <a:rPr lang="en-US" dirty="0"/>
               <a:t> expression	</a:t>
             </a:r>
             <a:r>
-              <a:rPr lang="en-US" b="1" dirty="0">
+              <a:rPr lang="en-US" dirty="0">
                 <a:latin typeface="Courier New"/>
                 <a:cs typeface="Courier New"/>
               </a:rPr>
@@ -19388,42 +19938,42 @@
               </a:tabLst>
             </a:pPr>
             <a:r>
-              <a:rPr lang="en-US" b="1" dirty="0"/>
+              <a:rPr lang="en-US" dirty="0"/>
               <a:t>Define Statement:	</a:t>
             </a:r>
             <a:r>
-              <a:rPr lang="en-US" b="1" dirty="0">
+              <a:rPr lang="en-US" dirty="0">
                 <a:latin typeface="Source Code Pro" panose="020B0509030403020204" pitchFamily="49" charset="77"/>
                 <a:cs typeface="Courier"/>
               </a:rPr>
               <a:t>def</a:t>
             </a:r>
             <a:r>
-              <a:rPr lang="en-US" b="1" dirty="0">
+              <a:rPr lang="en-US" dirty="0">
                 <a:latin typeface="Source Code Pro" panose="020B0509030403020204" pitchFamily="49" charset="77"/>
               </a:rPr>
               <a:t> </a:t>
             </a:r>
             <a:r>
-              <a:rPr lang="en-US" b="1" dirty="0" err="1">
+              <a:rPr lang="en-US" dirty="0" err="1">
                 <a:latin typeface="Source Code Pro" panose="020B0509030403020204" pitchFamily="49" charset="77"/>
               </a:rPr>
               <a:t>function_name</a:t>
             </a:r>
             <a:r>
-              <a:rPr lang="en-US" b="1" dirty="0">
+              <a:rPr lang="en-US" dirty="0">
                 <a:latin typeface="Source Code Pro" panose="020B0509030403020204" pitchFamily="49" charset="77"/>
                 <a:cs typeface="Courier"/>
               </a:rPr>
               <a:t>(</a:t>
             </a:r>
             <a:r>
-              <a:rPr lang="en-US" b="1" dirty="0">
+              <a:rPr lang="en-US" dirty="0">
                 <a:latin typeface="Source Code Pro" panose="020B0509030403020204" pitchFamily="49" charset="77"/>
               </a:rPr>
               <a:t>&lt;arguments&gt;):</a:t>
             </a:r>
-            <a:endParaRPr lang="en-US" b="1" dirty="0"/>
+            <a:endParaRPr lang="en-US" dirty="0"/>
           </a:p>
           <a:p>
             <a:pPr>
@@ -19433,7 +19983,7 @@
             </a:pPr>
             <a:r>
               <a:rPr lang="en-US" dirty="0"/>
-              <a:t>Control Statements:            </a:t>
+              <a:t>Control Statements:          </a:t>
             </a:r>
             <a:r>
               <a:rPr lang="en-US" b="0" dirty="0">
@@ -19696,6 +20246,13 @@
             <a:endParaRPr lang="en-US" dirty="0"/>
           </a:p>
           <a:p>
+            <a:r>
+              <a:rPr lang="en-US" dirty="0">
+                <a:latin typeface="Source Code Pro" panose="020B0309030403020204" pitchFamily="34" charset="0"/>
+                <a:ea typeface="Source Code Pro" panose="020B0309030403020204" pitchFamily="34" charset="0"/>
+              </a:rPr>
+              <a:t> </a:t>
+            </a:r>
             <a:r>
               <a:rPr lang="en-US" dirty="0" err="1">
                 <a:latin typeface="Source Code Pro" panose="020B0309030403020204" pitchFamily="34" charset="0"/>
@@ -20266,7 +20823,7 @@
 </file>
 
 <file path=ppt/theme/theme1.xml><?xml version="1.0" encoding="utf-8"?>
-<a:theme xmlns:a="http://schemas.openxmlformats.org/drawingml/2006/main" name="3_Main C88C">
+<a:theme xmlns:a="http://schemas.openxmlformats.org/drawingml/2006/main" name="4_Main C88C">
   <a:themeElements>
     <a:clrScheme name="UC Berkeley C88C">
       <a:dk1>

</xml_diff>

<commit_message>
Deploy website Tue Jan 30 21:58:38 PST 2024
</commit_message>
<xml_diff>
--- a/assets/slides/sp24/03-Loops.pptx
+++ b/assets/slides/sp24/03-Loops.pptx
@@ -14216,7 +14216,7 @@
                 <a:latin typeface="Source Code Pro Medium" panose="020B0309030403020204" pitchFamily="34" charset="0"/>
                 <a:ea typeface="Source Code Pro Medium" panose="020B0309030403020204" pitchFamily="34" charset="0"/>
               </a:rPr>
-              <a:t>time = '2:00'</a:t>
+              <a:t>time = '3:00'</a:t>
             </a:r>
           </a:p>
           <a:p>
@@ -14583,7 +14583,7 @@
                 <a:latin typeface="Courier New"/>
                 <a:cs typeface="Courier New"/>
               </a:rPr>
-              <a:t> temperature &gt; 85</a:t>
+              <a:t> temperature &gt; 85 else</a:t>
             </a:r>
             <a:r>
               <a:rPr lang="en-US" sz="2400" b="1" dirty="0">

</xml_diff>